<commit_message>
Closures and Higher-Order Functions
</commit_message>
<xml_diff>
--- a/Scala_Away_Day.pptx
+++ b/Scala_Away_Day.pptx
@@ -5,7 +5,7 @@
     <p:sldMasterId id="2147483648" r:id="rId1"/>
   </p:sldMasterIdLst>
   <p:notesMasterIdLst>
-    <p:notesMasterId r:id="rId15"/>
+    <p:notesMasterId r:id="rId23"/>
   </p:notesMasterIdLst>
   <p:sldIdLst>
     <p:sldId id="256" r:id="rId2"/>
@@ -16,11 +16,19 @@
     <p:sldId id="260" r:id="rId7"/>
     <p:sldId id="261" r:id="rId8"/>
     <p:sldId id="263" r:id="rId9"/>
-    <p:sldId id="265" r:id="rId10"/>
-    <p:sldId id="266" r:id="rId11"/>
-    <p:sldId id="267" r:id="rId12"/>
-    <p:sldId id="268" r:id="rId13"/>
-    <p:sldId id="262" r:id="rId14"/>
+    <p:sldId id="273" r:id="rId10"/>
+    <p:sldId id="274" r:id="rId11"/>
+    <p:sldId id="275" r:id="rId12"/>
+    <p:sldId id="276" r:id="rId13"/>
+    <p:sldId id="265" r:id="rId14"/>
+    <p:sldId id="266" r:id="rId15"/>
+    <p:sldId id="267" r:id="rId16"/>
+    <p:sldId id="268" r:id="rId17"/>
+    <p:sldId id="269" r:id="rId18"/>
+    <p:sldId id="270" r:id="rId19"/>
+    <p:sldId id="271" r:id="rId20"/>
+    <p:sldId id="272" r:id="rId21"/>
+    <p:sldId id="262" r:id="rId22"/>
   </p:sldIdLst>
   <p:sldSz cx="9144000" cy="6858000" type="screen4x3"/>
   <p:notesSz cx="6858000" cy="9144000"/>
@@ -204,7 +212,8 @@
           <a:p>
             <a:fld id="{0369B58C-3524-9B4E-AA23-6BD0D96BE4E7}" type="datetimeFigureOut">
               <a:rPr lang="en-US" smtClean="0"/>
-              <a:t>6/12/12</a:t>
+              <a:pPr/>
+              <a:t>6/15/12</a:t>
             </a:fld>
             <a:endParaRPr lang="en-US"/>
           </a:p>
@@ -365,6 +374,7 @@
           <a:p>
             <a:fld id="{765C5218-4828-B544-9955-A4B6719EC9E2}" type="slidenum">
               <a:rPr lang="en-US" smtClean="0"/>
+              <a:pPr/>
               <a:t>‹#›</a:t>
             </a:fld>
             <a:endParaRPr lang="en-US"/>
@@ -560,6 +570,7 @@
           <a:p>
             <a:fld id="{765C5218-4828-B544-9955-A4B6719EC9E2}" type="slidenum">
               <a:rPr lang="en-US" smtClean="0"/>
+              <a:pPr/>
               <a:t>2</a:t>
             </a:fld>
             <a:endParaRPr lang="en-US"/>
@@ -666,6 +677,7 @@
           <a:p>
             <a:fld id="{765C5218-4828-B544-9955-A4B6719EC9E2}" type="slidenum">
               <a:rPr lang="en-US" smtClean="0"/>
+              <a:pPr/>
               <a:t>4</a:t>
             </a:fld>
             <a:endParaRPr lang="en-US"/>
@@ -755,6 +767,7 @@
           <a:p>
             <a:fld id="{765C5218-4828-B544-9955-A4B6719EC9E2}" type="slidenum">
               <a:rPr lang="en-US" smtClean="0"/>
+              <a:pPr/>
               <a:t>5</a:t>
             </a:fld>
             <a:endParaRPr lang="en-US"/>
@@ -817,29 +830,40 @@
           <a:p>
             <a:r>
               <a:rPr lang="en-US" dirty="0" smtClean="0"/>
-              <a:t>* focus on </a:t>
-            </a:r>
-            <a:r>
-              <a:rPr lang="en-US" dirty="0" err="1" smtClean="0"/>
-              <a:t>DRYness</a:t>
-            </a:r>
-            <a:r>
-              <a:rPr lang="en-US" dirty="0" smtClean="0"/>
-              <a:t> - reducing boilerplate code</a:t>
-            </a:r>
-          </a:p>
-          <a:p>
-            <a:r>
-              <a:rPr lang="en-US" dirty="0" smtClean="0"/>
-              <a:t>	** less wordy - simple for loop doesn't require type and also </a:t>
-            </a:r>
-            <a:r>
-              <a:rPr lang="en-US" dirty="0" err="1" smtClean="0"/>
-              <a:t>val</a:t>
-            </a:r>
-            <a:endParaRPr lang="en-US" dirty="0" smtClean="0"/>
-          </a:p>
-          <a:p>
+              <a:t>In Ruby, blocks</a:t>
+            </a:r>
+            <a:r>
+              <a:rPr lang="en-US" baseline="0" dirty="0" smtClean="0"/>
+              <a:t> cannot live on their own. They need to be converted to </a:t>
+            </a:r>
+            <a:r>
+              <a:rPr lang="en-US" baseline="0" dirty="0" err="1" smtClean="0"/>
+              <a:t>Procs</a:t>
+            </a:r>
+            <a:r>
+              <a:rPr lang="en-US" baseline="0" dirty="0" smtClean="0"/>
+              <a:t> using </a:t>
+            </a:r>
+            <a:r>
+              <a:rPr lang="en-US" baseline="0" dirty="0" err="1" smtClean="0"/>
+              <a:t>Proc.new</a:t>
+            </a:r>
+            <a:r>
+              <a:rPr lang="en-US" baseline="0" dirty="0" smtClean="0"/>
+              <a:t> or lambda, which is a shorthand for </a:t>
+            </a:r>
+            <a:r>
+              <a:rPr lang="en-US" baseline="0" dirty="0" err="1" smtClean="0"/>
+              <a:t>Proc.new</a:t>
+            </a:r>
+            <a:r>
+              <a:rPr lang="en-US" baseline="0" dirty="0" smtClean="0"/>
+              <a:t> with subtle difference like lambda checks for number </a:t>
+            </a:r>
+            <a:r>
+              <a:rPr lang="en-US" baseline="0" smtClean="0"/>
+              <a:t>of arguments.</a:t>
+            </a:r>
             <a:endParaRPr lang="en-US" dirty="0"/>
           </a:p>
         </p:txBody>
@@ -861,7 +885,8 @@
           <a:p>
             <a:fld id="{765C5218-4828-B544-9955-A4B6719EC9E2}" type="slidenum">
               <a:rPr lang="en-US" smtClean="0"/>
-              <a:t>11</a:t>
+              <a:pPr/>
+              <a:t>8</a:t>
             </a:fld>
             <a:endParaRPr lang="en-US"/>
           </a:p>
@@ -923,6 +948,203 @@
           <a:p>
             <a:r>
               <a:rPr lang="en-US" dirty="0" smtClean="0"/>
+              <a:t>Consistency:</a:t>
+            </a:r>
+            <a:r>
+              <a:rPr lang="en-US" baseline="0" dirty="0" smtClean="0"/>
+              <a:t> Language itself uses implicit conversions</a:t>
+            </a:r>
+            <a:endParaRPr lang="en-US" dirty="0"/>
+          </a:p>
+        </p:txBody>
+      </p:sp>
+      <p:sp>
+        <p:nvSpPr>
+          <p:cNvPr id="4" name="Slide Number Placeholder 3"/>
+          <p:cNvSpPr>
+            <a:spLocks noGrp="1"/>
+          </p:cNvSpPr>
+          <p:nvPr>
+            <p:ph type="sldNum" sz="quarter" idx="10"/>
+          </p:nvPr>
+        </p:nvSpPr>
+        <p:spPr/>
+        <p:txBody>
+          <a:bodyPr/>
+          <a:lstStyle/>
+          <a:p>
+            <a:fld id="{765C5218-4828-B544-9955-A4B6719EC9E2}" type="slidenum">
+              <a:rPr lang="en-US" smtClean="0"/>
+              <a:pPr/>
+              <a:t>14</a:t>
+            </a:fld>
+            <a:endParaRPr lang="en-US"/>
+          </a:p>
+        </p:txBody>
+      </p:sp>
+    </p:spTree>
+  </p:cSld>
+  <p:clrMapOvr>
+    <a:masterClrMapping/>
+  </p:clrMapOvr>
+</p:notes>
+</file>
+
+<file path=ppt/notesSlides/notesSlide6.xml><?xml version="1.0" encoding="utf-8"?>
+<p:notes xmlns:a="http://schemas.openxmlformats.org/drawingml/2006/main" xmlns:r="http://schemas.openxmlformats.org/officeDocument/2006/relationships" xmlns:mc="http://schemas.openxmlformats.org/markup-compatibility/2006" xmlns:mv="urn:schemas-microsoft-com:mac:vml" xmlns:p="http://schemas.openxmlformats.org/presentationml/2006/main" mc:Ignorable="mv" mc:PreserveAttributes="mv:*">
+  <p:cSld>
+    <p:spTree>
+      <p:nvGrpSpPr>
+        <p:cNvPr id="1" name=""/>
+        <p:cNvGrpSpPr/>
+        <p:nvPr/>
+      </p:nvGrpSpPr>
+      <p:grpSpPr>
+        <a:xfrm>
+          <a:off x="0" y="0"/>
+          <a:ext cx="0" cy="0"/>
+          <a:chOff x="0" y="0"/>
+          <a:chExt cx="0" cy="0"/>
+        </a:xfrm>
+      </p:grpSpPr>
+      <p:sp>
+        <p:nvSpPr>
+          <p:cNvPr id="2" name="Slide Image Placeholder 1"/>
+          <p:cNvSpPr>
+            <a:spLocks noGrp="1" noRot="1" noChangeAspect="1"/>
+          </p:cNvSpPr>
+          <p:nvPr>
+            <p:ph type="sldImg"/>
+          </p:nvPr>
+        </p:nvSpPr>
+        <p:spPr/>
+      </p:sp>
+      <p:sp>
+        <p:nvSpPr>
+          <p:cNvPr id="3" name="Notes Placeholder 2"/>
+          <p:cNvSpPr>
+            <a:spLocks noGrp="1"/>
+          </p:cNvSpPr>
+          <p:nvPr>
+            <p:ph type="body" idx="1"/>
+          </p:nvPr>
+        </p:nvSpPr>
+        <p:spPr/>
+        <p:txBody>
+          <a:bodyPr>
+            <a:normAutofit/>
+          </a:bodyPr>
+          <a:lstStyle/>
+          <a:p>
+            <a:r>
+              <a:rPr lang="en-US" dirty="0" smtClean="0"/>
+              <a:t>* focus on </a:t>
+            </a:r>
+            <a:r>
+              <a:rPr lang="en-US" dirty="0" err="1" smtClean="0"/>
+              <a:t>DRYness</a:t>
+            </a:r>
+            <a:r>
+              <a:rPr lang="en-US" dirty="0" smtClean="0"/>
+              <a:t> - reducing boilerplate code</a:t>
+            </a:r>
+          </a:p>
+          <a:p>
+            <a:r>
+              <a:rPr lang="en-US" dirty="0" smtClean="0"/>
+              <a:t>	** less wordy - simple for loop doesn't require type and also </a:t>
+            </a:r>
+            <a:r>
+              <a:rPr lang="en-US" dirty="0" err="1" smtClean="0"/>
+              <a:t>val</a:t>
+            </a:r>
+            <a:endParaRPr lang="en-US" dirty="0" smtClean="0"/>
+          </a:p>
+          <a:p>
+            <a:endParaRPr lang="en-US" dirty="0"/>
+          </a:p>
+        </p:txBody>
+      </p:sp>
+      <p:sp>
+        <p:nvSpPr>
+          <p:cNvPr id="4" name="Slide Number Placeholder 3"/>
+          <p:cNvSpPr>
+            <a:spLocks noGrp="1"/>
+          </p:cNvSpPr>
+          <p:nvPr>
+            <p:ph type="sldNum" sz="quarter" idx="10"/>
+          </p:nvPr>
+        </p:nvSpPr>
+        <p:spPr/>
+        <p:txBody>
+          <a:bodyPr/>
+          <a:lstStyle/>
+          <a:p>
+            <a:fld id="{765C5218-4828-B544-9955-A4B6719EC9E2}" type="slidenum">
+              <a:rPr lang="en-US" smtClean="0"/>
+              <a:pPr/>
+              <a:t>15</a:t>
+            </a:fld>
+            <a:endParaRPr lang="en-US"/>
+          </a:p>
+        </p:txBody>
+      </p:sp>
+    </p:spTree>
+  </p:cSld>
+  <p:clrMapOvr>
+    <a:masterClrMapping/>
+  </p:clrMapOvr>
+</p:notes>
+</file>
+
+<file path=ppt/notesSlides/notesSlide7.xml><?xml version="1.0" encoding="utf-8"?>
+<p:notes xmlns:a="http://schemas.openxmlformats.org/drawingml/2006/main" xmlns:r="http://schemas.openxmlformats.org/officeDocument/2006/relationships" xmlns:mc="http://schemas.openxmlformats.org/markup-compatibility/2006" xmlns:mv="urn:schemas-microsoft-com:mac:vml" xmlns:p="http://schemas.openxmlformats.org/presentationml/2006/main" mc:Ignorable="mv" mc:PreserveAttributes="mv:*">
+  <p:cSld>
+    <p:spTree>
+      <p:nvGrpSpPr>
+        <p:cNvPr id="1" name=""/>
+        <p:cNvGrpSpPr/>
+        <p:nvPr/>
+      </p:nvGrpSpPr>
+      <p:grpSpPr>
+        <a:xfrm>
+          <a:off x="0" y="0"/>
+          <a:ext cx="0" cy="0"/>
+          <a:chOff x="0" y="0"/>
+          <a:chExt cx="0" cy="0"/>
+        </a:xfrm>
+      </p:grpSpPr>
+      <p:sp>
+        <p:nvSpPr>
+          <p:cNvPr id="2" name="Slide Image Placeholder 1"/>
+          <p:cNvSpPr>
+            <a:spLocks noGrp="1" noRot="1" noChangeAspect="1"/>
+          </p:cNvSpPr>
+          <p:nvPr>
+            <p:ph type="sldImg"/>
+          </p:nvPr>
+        </p:nvSpPr>
+        <p:spPr/>
+      </p:sp>
+      <p:sp>
+        <p:nvSpPr>
+          <p:cNvPr id="3" name="Notes Placeholder 2"/>
+          <p:cNvSpPr>
+            <a:spLocks noGrp="1"/>
+          </p:cNvSpPr>
+          <p:nvPr>
+            <p:ph type="body" idx="1"/>
+          </p:nvPr>
+        </p:nvSpPr>
+        <p:spPr/>
+        <p:txBody>
+          <a:bodyPr>
+            <a:normAutofit/>
+          </a:bodyPr>
+          <a:lstStyle/>
+          <a:p>
+            <a:r>
+              <a:rPr lang="en-US" dirty="0" smtClean="0"/>
               <a:t>I visited</a:t>
             </a:r>
             <a:r>
@@ -966,7 +1188,8 @@
           <a:p>
             <a:fld id="{765C5218-4828-B544-9955-A4B6719EC9E2}" type="slidenum">
               <a:rPr lang="en-US" smtClean="0"/>
-              <a:t>13</a:t>
+              <a:pPr/>
+              <a:t>21</a:t>
             </a:fld>
             <a:endParaRPr lang="en-US"/>
           </a:p>
@@ -1162,7 +1385,7 @@
             <a:fld id="{A753D463-393C-F44B-8A21-44DFAD823718}" type="datetimeFigureOut">
               <a:rPr lang="en-US" smtClean="0"/>
               <a:pPr/>
-              <a:t>6/12/12</a:t>
+              <a:t>6/15/12</a:t>
             </a:fld>
             <a:endParaRPr lang="en-US"/>
           </a:p>
@@ -1329,7 +1552,7 @@
             <a:fld id="{A753D463-393C-F44B-8A21-44DFAD823718}" type="datetimeFigureOut">
               <a:rPr lang="en-US" smtClean="0"/>
               <a:pPr/>
-              <a:t>6/12/12</a:t>
+              <a:t>6/15/12</a:t>
             </a:fld>
             <a:endParaRPr lang="en-US"/>
           </a:p>
@@ -1506,7 +1729,7 @@
             <a:fld id="{A753D463-393C-F44B-8A21-44DFAD823718}" type="datetimeFigureOut">
               <a:rPr lang="en-US" smtClean="0"/>
               <a:pPr/>
-              <a:t>6/12/12</a:t>
+              <a:t>6/15/12</a:t>
             </a:fld>
             <a:endParaRPr lang="en-US"/>
           </a:p>
@@ -1673,7 +1896,7 @@
             <a:fld id="{A753D463-393C-F44B-8A21-44DFAD823718}" type="datetimeFigureOut">
               <a:rPr lang="en-US" smtClean="0"/>
               <a:pPr/>
-              <a:t>6/12/12</a:t>
+              <a:t>6/15/12</a:t>
             </a:fld>
             <a:endParaRPr lang="en-US"/>
           </a:p>
@@ -1916,7 +2139,7 @@
             <a:fld id="{A753D463-393C-F44B-8A21-44DFAD823718}" type="datetimeFigureOut">
               <a:rPr lang="en-US" smtClean="0"/>
               <a:pPr/>
-              <a:t>6/12/12</a:t>
+              <a:t>6/15/12</a:t>
             </a:fld>
             <a:endParaRPr lang="en-US"/>
           </a:p>
@@ -2201,7 +2424,7 @@
             <a:fld id="{A753D463-393C-F44B-8A21-44DFAD823718}" type="datetimeFigureOut">
               <a:rPr lang="en-US" smtClean="0"/>
               <a:pPr/>
-              <a:t>6/12/12</a:t>
+              <a:t>6/15/12</a:t>
             </a:fld>
             <a:endParaRPr lang="en-US"/>
           </a:p>
@@ -2620,7 +2843,7 @@
             <a:fld id="{A753D463-393C-F44B-8A21-44DFAD823718}" type="datetimeFigureOut">
               <a:rPr lang="en-US" smtClean="0"/>
               <a:pPr/>
-              <a:t>6/12/12</a:t>
+              <a:t>6/15/12</a:t>
             </a:fld>
             <a:endParaRPr lang="en-US"/>
           </a:p>
@@ -2735,7 +2958,7 @@
             <a:fld id="{A753D463-393C-F44B-8A21-44DFAD823718}" type="datetimeFigureOut">
               <a:rPr lang="en-US" smtClean="0"/>
               <a:pPr/>
-              <a:t>6/12/12</a:t>
+              <a:t>6/15/12</a:t>
             </a:fld>
             <a:endParaRPr lang="en-US"/>
           </a:p>
@@ -2827,7 +3050,7 @@
             <a:fld id="{A753D463-393C-F44B-8A21-44DFAD823718}" type="datetimeFigureOut">
               <a:rPr lang="en-US" smtClean="0"/>
               <a:pPr/>
-              <a:t>6/12/12</a:t>
+              <a:t>6/15/12</a:t>
             </a:fld>
             <a:endParaRPr lang="en-US"/>
           </a:p>
@@ -3101,7 +3324,7 @@
             <a:fld id="{A753D463-393C-F44B-8A21-44DFAD823718}" type="datetimeFigureOut">
               <a:rPr lang="en-US" smtClean="0"/>
               <a:pPr/>
-              <a:t>6/12/12</a:t>
+              <a:t>6/15/12</a:t>
             </a:fld>
             <a:endParaRPr lang="en-US"/>
           </a:p>
@@ -3351,7 +3574,7 @@
             <a:fld id="{A753D463-393C-F44B-8A21-44DFAD823718}" type="datetimeFigureOut">
               <a:rPr lang="en-US" smtClean="0"/>
               <a:pPr/>
-              <a:t>6/12/12</a:t>
+              <a:t>6/15/12</a:t>
             </a:fld>
             <a:endParaRPr lang="en-US"/>
           </a:p>
@@ -3561,7 +3784,7 @@
             <a:fld id="{A753D463-393C-F44B-8A21-44DFAD823718}" type="datetimeFigureOut">
               <a:rPr lang="en-US" smtClean="0"/>
               <a:pPr/>
-              <a:t>6/12/12</a:t>
+              <a:t>6/15/12</a:t>
             </a:fld>
             <a:endParaRPr lang="en-US"/>
           </a:p>
@@ -4034,48 +4257,45 @@
           <a:lstStyle/>
           <a:p>
             <a:r>
+              <a:rPr lang="en-US" dirty="0" smtClean="0"/>
+              <a:t>Closures (in </a:t>
+            </a:r>
+            <a:r>
               <a:rPr lang="en-US" dirty="0" err="1" smtClean="0"/>
               <a:t>Scala</a:t>
             </a:r>
             <a:r>
               <a:rPr lang="en-US" dirty="0" smtClean="0"/>
-              <a:t> implicit conversions</a:t>
+              <a:t>)</a:t>
             </a:r>
             <a:endParaRPr lang="en-US" dirty="0"/>
           </a:p>
         </p:txBody>
       </p:sp>
-      <p:pic>
-        <p:nvPicPr>
-          <p:cNvPr id="4" name="Content Placeholder 3" descr="scala_implicits.tiff"/>
-          <p:cNvPicPr>
-            <a:picLocks noGrp="1" noChangeAspect="1"/>
-          </p:cNvPicPr>
+      <p:sp>
+        <p:nvSpPr>
+          <p:cNvPr id="3" name="Content Placeholder 2"/>
+          <p:cNvSpPr>
+            <a:spLocks noGrp="1"/>
+          </p:cNvSpPr>
           <p:nvPr>
             <p:ph idx="1"/>
           </p:nvPr>
-        </p:nvPicPr>
-        <p:blipFill>
-          <a:blip r:embed="rId2"/>
-          <a:srcRect t="-22241" b="-22241"/>
-          <a:stretch>
-            <a:fillRect/>
-          </a:stretch>
-        </p:blipFill>
-        <p:spPr/>
-      </p:pic>
+        </p:nvSpPr>
+        <p:spPr/>
+        <p:txBody>
+          <a:bodyPr/>
+          <a:lstStyle/>
+          <a:p>
+            <a:endParaRPr lang="en-US"/>
+          </a:p>
+        </p:txBody>
+      </p:sp>
     </p:spTree>
   </p:cSld>
   <p:clrMapOvr>
     <a:masterClrMapping/>
   </p:clrMapOvr>
-  <p:timing>
-    <p:tnLst>
-      <p:par>
-        <p:cTn id="1" dur="indefinite" restart="never" nodeType="tmRoot"/>
-      </p:par>
-    </p:tnLst>
-  </p:timing>
 </p:sld>
 </file>
 
@@ -4113,45 +4333,36 @@
           <a:p>
             <a:r>
               <a:rPr lang="en-US" dirty="0" smtClean="0"/>
-              <a:t>Performance</a:t>
+              <a:t>Higher-Order Function -  Ruby</a:t>
             </a:r>
             <a:endParaRPr lang="en-US" dirty="0"/>
           </a:p>
         </p:txBody>
       </p:sp>
-      <p:sp>
-        <p:nvSpPr>
-          <p:cNvPr id="3" name="Content Placeholder 2"/>
-          <p:cNvSpPr>
-            <a:spLocks noGrp="1"/>
-          </p:cNvSpPr>
+      <p:pic>
+        <p:nvPicPr>
+          <p:cNvPr id="4" name="Content Placeholder 3" descr="ruby_higher_order_function.tiff"/>
+          <p:cNvPicPr>
+            <a:picLocks noGrp="1" noChangeAspect="1"/>
+          </p:cNvPicPr>
           <p:nvPr>
             <p:ph idx="1"/>
           </p:nvPr>
-        </p:nvSpPr>
-        <p:spPr/>
-        <p:txBody>
-          <a:bodyPr>
-            <a:normAutofit/>
-          </a:bodyPr>
-          <a:lstStyle/>
-          <a:p>
-            <a:endParaRPr lang="en-US" sz="4400" dirty="0" smtClean="0"/>
-          </a:p>
-        </p:txBody>
-      </p:sp>
+        </p:nvPicPr>
+        <p:blipFill>
+          <a:blip r:embed="rId2"/>
+          <a:srcRect t="-37338" b="-37338"/>
+          <a:stretch>
+            <a:fillRect/>
+          </a:stretch>
+        </p:blipFill>
+        <p:spPr/>
+      </p:pic>
     </p:spTree>
   </p:cSld>
   <p:clrMapOvr>
     <a:masterClrMapping/>
   </p:clrMapOvr>
-  <p:timing>
-    <p:tnLst>
-      <p:par>
-        <p:cTn id="1" dur="indefinite" restart="never" nodeType="tmRoot"/>
-      </p:par>
-    </p:tnLst>
-  </p:timing>
 </p:sld>
 </file>
 
@@ -4188,32 +4399,36 @@
           <a:lstStyle/>
           <a:p>
             <a:r>
-              <a:rPr lang="en-US" smtClean="0"/>
-              <a:t>Tail recursion</a:t>
-            </a:r>
-            <a:endParaRPr lang="en-US"/>
-          </a:p>
-        </p:txBody>
-      </p:sp>
-      <p:sp>
-        <p:nvSpPr>
-          <p:cNvPr id="3" name="Content Placeholder 2"/>
-          <p:cNvSpPr>
-            <a:spLocks noGrp="1"/>
-          </p:cNvSpPr>
+              <a:rPr lang="en-US" dirty="0" smtClean="0"/>
+              <a:t>Higher-Order Functions - </a:t>
+            </a:r>
+            <a:r>
+              <a:rPr lang="en-US" dirty="0" err="1" smtClean="0"/>
+              <a:t>Scala</a:t>
+            </a:r>
+            <a:endParaRPr lang="en-US" dirty="0"/>
+          </a:p>
+        </p:txBody>
+      </p:sp>
+      <p:pic>
+        <p:nvPicPr>
+          <p:cNvPr id="4" name="Content Placeholder 3" descr="scala_higher_order_function.tiff"/>
+          <p:cNvPicPr>
+            <a:picLocks noGrp="1" noChangeAspect="1"/>
+          </p:cNvPicPr>
           <p:nvPr>
             <p:ph idx="1"/>
           </p:nvPr>
-        </p:nvSpPr>
-        <p:spPr/>
-        <p:txBody>
-          <a:bodyPr/>
-          <a:lstStyle/>
-          <a:p>
-            <a:endParaRPr lang="en-US"/>
-          </a:p>
-        </p:txBody>
-      </p:sp>
+        </p:nvPicPr>
+        <p:blipFill>
+          <a:blip r:embed="rId2"/>
+          <a:srcRect t="-85744" b="-85744"/>
+          <a:stretch>
+            <a:fillRect/>
+          </a:stretch>
+        </p:blipFill>
+        <p:spPr/>
+      </p:pic>
     </p:spTree>
   </p:cSld>
   <p:clrMapOvr>
@@ -4256,7 +4471,7 @@
           <a:p>
             <a:r>
               <a:rPr lang="en-US" dirty="0" smtClean="0"/>
-              <a:t>Functional yet beautiful</a:t>
+              <a:t>Ruby monkey patching</a:t>
             </a:r>
             <a:endParaRPr lang="en-US" dirty="0"/>
           </a:p>
@@ -4264,7 +4479,7 @@
       </p:sp>
       <p:pic>
         <p:nvPicPr>
-          <p:cNvPr id="4" name="Content Placeholder 3" descr="qum_round_persian_rugs_1.JPG"/>
+          <p:cNvPr id="4" name="Content Placeholder 3" descr="ruby_monkey.tiff"/>
           <p:cNvPicPr>
             <a:picLocks noGrp="1" noChangeAspect="1"/>
           </p:cNvPicPr>
@@ -4273,44 +4488,14 @@
           </p:nvPr>
         </p:nvPicPr>
         <p:blipFill>
-          <a:blip r:embed="rId3"/>
-          <a:srcRect l="-42539" r="-42539"/>
+          <a:blip r:embed="rId2"/>
+          <a:srcRect l="-5795" r="-5795"/>
           <a:stretch>
             <a:fillRect/>
           </a:stretch>
         </p:blipFill>
         <p:spPr/>
       </p:pic>
-      <p:sp>
-        <p:nvSpPr>
-          <p:cNvPr id="5" name="TextBox 4"/>
-          <p:cNvSpPr txBox="1"/>
-          <p:nvPr/>
-        </p:nvSpPr>
-        <p:spPr>
-          <a:xfrm>
-            <a:off x="5232121" y="6307080"/>
-            <a:ext cx="3911879" cy="261610"/>
-          </a:xfrm>
-          <a:prstGeom prst="rect">
-            <a:avLst/>
-          </a:prstGeom>
-          <a:noFill/>
-        </p:spPr>
-        <p:txBody>
-          <a:bodyPr wrap="square" rtlCol="0">
-            <a:spAutoFit/>
-          </a:bodyPr>
-          <a:lstStyle/>
-          <a:p>
-            <a:r>
-              <a:rPr lang="en-US" sz="1100" dirty="0" smtClean="0"/>
-              <a:t>http://www.orientalpersianrug.com/qum_persian_rugs.html</a:t>
-            </a:r>
-            <a:endParaRPr lang="en-US" sz="1100" dirty="0"/>
-          </a:p>
-        </p:txBody>
-      </p:sp>
     </p:spTree>
   </p:cSld>
   <p:clrMapOvr>
@@ -4323,6 +4508,444 @@
       </p:par>
     </p:tnLst>
   </p:timing>
+</p:sld>
+</file>
+
+<file path=ppt/slides/slide14.xml><?xml version="1.0" encoding="utf-8"?>
+<p:sld xmlns:a="http://schemas.openxmlformats.org/drawingml/2006/main" xmlns:r="http://schemas.openxmlformats.org/officeDocument/2006/relationships" xmlns:mc="http://schemas.openxmlformats.org/markup-compatibility/2006" xmlns:mv="urn:schemas-microsoft-com:mac:vml" xmlns:p="http://schemas.openxmlformats.org/presentationml/2006/main" mc:Ignorable="mv" mc:PreserveAttributes="mv:*">
+  <p:cSld>
+    <p:spTree>
+      <p:nvGrpSpPr>
+        <p:cNvPr id="1" name=""/>
+        <p:cNvGrpSpPr/>
+        <p:nvPr/>
+      </p:nvGrpSpPr>
+      <p:grpSpPr>
+        <a:xfrm>
+          <a:off x="0" y="0"/>
+          <a:ext cx="0" cy="0"/>
+          <a:chOff x="0" y="0"/>
+          <a:chExt cx="0" cy="0"/>
+        </a:xfrm>
+      </p:grpSpPr>
+      <p:sp>
+        <p:nvSpPr>
+          <p:cNvPr id="2" name="Title 1"/>
+          <p:cNvSpPr>
+            <a:spLocks noGrp="1"/>
+          </p:cNvSpPr>
+          <p:nvPr>
+            <p:ph type="title"/>
+          </p:nvPr>
+        </p:nvSpPr>
+        <p:spPr/>
+        <p:txBody>
+          <a:bodyPr/>
+          <a:lstStyle/>
+          <a:p>
+            <a:r>
+              <a:rPr lang="en-US" dirty="0" err="1" smtClean="0"/>
+              <a:t>Scala</a:t>
+            </a:r>
+            <a:r>
+              <a:rPr lang="en-US" dirty="0" smtClean="0"/>
+              <a:t> implicit conversions</a:t>
+            </a:r>
+            <a:endParaRPr lang="en-US" dirty="0"/>
+          </a:p>
+        </p:txBody>
+      </p:sp>
+      <p:pic>
+        <p:nvPicPr>
+          <p:cNvPr id="4" name="Content Placeholder 3" descr="scala_implicits.tiff"/>
+          <p:cNvPicPr>
+            <a:picLocks noGrp="1" noChangeAspect="1"/>
+          </p:cNvPicPr>
+          <p:nvPr>
+            <p:ph idx="1"/>
+          </p:nvPr>
+        </p:nvPicPr>
+        <p:blipFill>
+          <a:blip r:embed="rId3"/>
+          <a:srcRect t="-22241" b="-22241"/>
+          <a:stretch>
+            <a:fillRect/>
+          </a:stretch>
+        </p:blipFill>
+        <p:spPr/>
+      </p:pic>
+    </p:spTree>
+  </p:cSld>
+  <p:clrMapOvr>
+    <a:masterClrMapping/>
+  </p:clrMapOvr>
+  <p:timing>
+    <p:tnLst>
+      <p:par>
+        <p:cTn id="1" dur="indefinite" restart="never" nodeType="tmRoot"/>
+      </p:par>
+    </p:tnLst>
+  </p:timing>
+</p:sld>
+</file>
+
+<file path=ppt/slides/slide15.xml><?xml version="1.0" encoding="utf-8"?>
+<p:sld xmlns:a="http://schemas.openxmlformats.org/drawingml/2006/main" xmlns:r="http://schemas.openxmlformats.org/officeDocument/2006/relationships" xmlns:mc="http://schemas.openxmlformats.org/markup-compatibility/2006" xmlns:mv="urn:schemas-microsoft-com:mac:vml" xmlns:p="http://schemas.openxmlformats.org/presentationml/2006/main" mc:Ignorable="mv" mc:PreserveAttributes="mv:*">
+  <p:cSld>
+    <p:spTree>
+      <p:nvGrpSpPr>
+        <p:cNvPr id="1" name=""/>
+        <p:cNvGrpSpPr/>
+        <p:nvPr/>
+      </p:nvGrpSpPr>
+      <p:grpSpPr>
+        <a:xfrm>
+          <a:off x="0" y="0"/>
+          <a:ext cx="0" cy="0"/>
+          <a:chOff x="0" y="0"/>
+          <a:chExt cx="0" cy="0"/>
+        </a:xfrm>
+      </p:grpSpPr>
+      <p:sp>
+        <p:nvSpPr>
+          <p:cNvPr id="2" name="Title 1"/>
+          <p:cNvSpPr>
+            <a:spLocks noGrp="1"/>
+          </p:cNvSpPr>
+          <p:nvPr>
+            <p:ph type="title"/>
+          </p:nvPr>
+        </p:nvSpPr>
+        <p:spPr/>
+        <p:txBody>
+          <a:bodyPr/>
+          <a:lstStyle/>
+          <a:p>
+            <a:r>
+              <a:rPr lang="en-US" dirty="0" smtClean="0"/>
+              <a:t>Performance</a:t>
+            </a:r>
+            <a:endParaRPr lang="en-US" dirty="0"/>
+          </a:p>
+        </p:txBody>
+      </p:sp>
+      <p:sp>
+        <p:nvSpPr>
+          <p:cNvPr id="3" name="Content Placeholder 2"/>
+          <p:cNvSpPr>
+            <a:spLocks noGrp="1"/>
+          </p:cNvSpPr>
+          <p:nvPr>
+            <p:ph idx="1"/>
+          </p:nvPr>
+        </p:nvSpPr>
+        <p:spPr/>
+        <p:txBody>
+          <a:bodyPr>
+            <a:normAutofit/>
+          </a:bodyPr>
+          <a:lstStyle/>
+          <a:p>
+            <a:endParaRPr lang="en-US" sz="4400" dirty="0" smtClean="0"/>
+          </a:p>
+        </p:txBody>
+      </p:sp>
+    </p:spTree>
+  </p:cSld>
+  <p:clrMapOvr>
+    <a:masterClrMapping/>
+  </p:clrMapOvr>
+  <p:timing>
+    <p:tnLst>
+      <p:par>
+        <p:cTn id="1" dur="indefinite" restart="never" nodeType="tmRoot"/>
+      </p:par>
+    </p:tnLst>
+  </p:timing>
+</p:sld>
+</file>
+
+<file path=ppt/slides/slide16.xml><?xml version="1.0" encoding="utf-8"?>
+<p:sld xmlns:a="http://schemas.openxmlformats.org/drawingml/2006/main" xmlns:r="http://schemas.openxmlformats.org/officeDocument/2006/relationships" xmlns:mc="http://schemas.openxmlformats.org/markup-compatibility/2006" xmlns:mv="urn:schemas-microsoft-com:mac:vml" xmlns:p="http://schemas.openxmlformats.org/presentationml/2006/main" mc:Ignorable="mv" mc:PreserveAttributes="mv:*">
+  <p:cSld>
+    <p:spTree>
+      <p:nvGrpSpPr>
+        <p:cNvPr id="1" name=""/>
+        <p:cNvGrpSpPr/>
+        <p:nvPr/>
+      </p:nvGrpSpPr>
+      <p:grpSpPr>
+        <a:xfrm>
+          <a:off x="0" y="0"/>
+          <a:ext cx="0" cy="0"/>
+          <a:chOff x="0" y="0"/>
+          <a:chExt cx="0" cy="0"/>
+        </a:xfrm>
+      </p:grpSpPr>
+      <p:sp>
+        <p:nvSpPr>
+          <p:cNvPr id="2" name="Title 1"/>
+          <p:cNvSpPr>
+            <a:spLocks noGrp="1"/>
+          </p:cNvSpPr>
+          <p:nvPr>
+            <p:ph type="title"/>
+          </p:nvPr>
+        </p:nvSpPr>
+        <p:spPr/>
+        <p:txBody>
+          <a:bodyPr/>
+          <a:lstStyle/>
+          <a:p>
+            <a:r>
+              <a:rPr lang="en-US" smtClean="0"/>
+              <a:t>Tail recursion</a:t>
+            </a:r>
+            <a:endParaRPr lang="en-US"/>
+          </a:p>
+        </p:txBody>
+      </p:sp>
+      <p:sp>
+        <p:nvSpPr>
+          <p:cNvPr id="3" name="Content Placeholder 2"/>
+          <p:cNvSpPr>
+            <a:spLocks noGrp="1"/>
+          </p:cNvSpPr>
+          <p:nvPr>
+            <p:ph idx="1"/>
+          </p:nvPr>
+        </p:nvSpPr>
+        <p:spPr/>
+        <p:txBody>
+          <a:bodyPr/>
+          <a:lstStyle/>
+          <a:p>
+            <a:endParaRPr lang="en-US"/>
+          </a:p>
+        </p:txBody>
+      </p:sp>
+    </p:spTree>
+  </p:cSld>
+  <p:clrMapOvr>
+    <a:masterClrMapping/>
+  </p:clrMapOvr>
+</p:sld>
+</file>
+
+<file path=ppt/slides/slide17.xml><?xml version="1.0" encoding="utf-8"?>
+<p:sld xmlns:a="http://schemas.openxmlformats.org/drawingml/2006/main" xmlns:r="http://schemas.openxmlformats.org/officeDocument/2006/relationships" xmlns:mc="http://schemas.openxmlformats.org/markup-compatibility/2006" xmlns:mv="urn:schemas-microsoft-com:mac:vml" xmlns:p="http://schemas.openxmlformats.org/presentationml/2006/main" mc:Ignorable="mv" mc:PreserveAttributes="mv:*">
+  <p:cSld>
+    <p:spTree>
+      <p:nvGrpSpPr>
+        <p:cNvPr id="1" name=""/>
+        <p:cNvGrpSpPr/>
+        <p:nvPr/>
+      </p:nvGrpSpPr>
+      <p:grpSpPr>
+        <a:xfrm>
+          <a:off x="0" y="0"/>
+          <a:ext cx="0" cy="0"/>
+          <a:chOff x="0" y="0"/>
+          <a:chExt cx="0" cy="0"/>
+        </a:xfrm>
+      </p:grpSpPr>
+      <p:sp>
+        <p:nvSpPr>
+          <p:cNvPr id="2" name="Title 1"/>
+          <p:cNvSpPr>
+            <a:spLocks noGrp="1"/>
+          </p:cNvSpPr>
+          <p:nvPr>
+            <p:ph type="title"/>
+          </p:nvPr>
+        </p:nvSpPr>
+        <p:spPr/>
+        <p:txBody>
+          <a:bodyPr/>
+          <a:lstStyle/>
+          <a:p>
+            <a:r>
+              <a:rPr lang="en-US" dirty="0" smtClean="0"/>
+              <a:t>Parallel collections</a:t>
+            </a:r>
+            <a:endParaRPr lang="en-US" dirty="0"/>
+          </a:p>
+        </p:txBody>
+      </p:sp>
+      <p:sp>
+        <p:nvSpPr>
+          <p:cNvPr id="3" name="Content Placeholder 2"/>
+          <p:cNvSpPr>
+            <a:spLocks noGrp="1"/>
+          </p:cNvSpPr>
+          <p:nvPr>
+            <p:ph idx="1"/>
+          </p:nvPr>
+        </p:nvSpPr>
+        <p:spPr/>
+        <p:txBody>
+          <a:bodyPr/>
+          <a:lstStyle/>
+          <a:p>
+            <a:endParaRPr lang="en-US"/>
+          </a:p>
+        </p:txBody>
+      </p:sp>
+    </p:spTree>
+  </p:cSld>
+  <p:clrMapOvr>
+    <a:masterClrMapping/>
+  </p:clrMapOvr>
+</p:sld>
+</file>
+
+<file path=ppt/slides/slide18.xml><?xml version="1.0" encoding="utf-8"?>
+<p:sld xmlns:a="http://schemas.openxmlformats.org/drawingml/2006/main" xmlns:r="http://schemas.openxmlformats.org/officeDocument/2006/relationships" xmlns:mc="http://schemas.openxmlformats.org/markup-compatibility/2006" xmlns:mv="urn:schemas-microsoft-com:mac:vml" xmlns:p="http://schemas.openxmlformats.org/presentationml/2006/main" mc:Ignorable="mv" mc:PreserveAttributes="mv:*">
+  <p:cSld>
+    <p:spTree>
+      <p:nvGrpSpPr>
+        <p:cNvPr id="1" name=""/>
+        <p:cNvGrpSpPr/>
+        <p:nvPr/>
+      </p:nvGrpSpPr>
+      <p:grpSpPr>
+        <a:xfrm>
+          <a:off x="0" y="0"/>
+          <a:ext cx="0" cy="0"/>
+          <a:chOff x="0" y="0"/>
+          <a:chExt cx="0" cy="0"/>
+        </a:xfrm>
+      </p:grpSpPr>
+      <p:sp>
+        <p:nvSpPr>
+          <p:cNvPr id="2" name="Title 1"/>
+          <p:cNvSpPr>
+            <a:spLocks noGrp="1"/>
+          </p:cNvSpPr>
+          <p:nvPr>
+            <p:ph type="title"/>
+          </p:nvPr>
+        </p:nvSpPr>
+        <p:spPr/>
+        <p:txBody>
+          <a:bodyPr/>
+          <a:lstStyle/>
+          <a:p>
+            <a:r>
+              <a:rPr lang="en-US" dirty="0" smtClean="0"/>
+              <a:t>Actors</a:t>
+            </a:r>
+            <a:endParaRPr lang="en-US" dirty="0"/>
+          </a:p>
+        </p:txBody>
+      </p:sp>
+      <p:sp>
+        <p:nvSpPr>
+          <p:cNvPr id="3" name="Content Placeholder 2"/>
+          <p:cNvSpPr>
+            <a:spLocks noGrp="1"/>
+          </p:cNvSpPr>
+          <p:nvPr>
+            <p:ph idx="1"/>
+          </p:nvPr>
+        </p:nvSpPr>
+        <p:spPr/>
+        <p:txBody>
+          <a:bodyPr/>
+          <a:lstStyle/>
+          <a:p>
+            <a:endParaRPr lang="en-US"/>
+          </a:p>
+        </p:txBody>
+      </p:sp>
+    </p:spTree>
+  </p:cSld>
+  <p:clrMapOvr>
+    <a:masterClrMapping/>
+  </p:clrMapOvr>
+</p:sld>
+</file>
+
+<file path=ppt/slides/slide19.xml><?xml version="1.0" encoding="utf-8"?>
+<p:sld xmlns:a="http://schemas.openxmlformats.org/drawingml/2006/main" xmlns:r="http://schemas.openxmlformats.org/officeDocument/2006/relationships" xmlns:mc="http://schemas.openxmlformats.org/markup-compatibility/2006" xmlns:mv="urn:schemas-microsoft-com:mac:vml" xmlns:p="http://schemas.openxmlformats.org/presentationml/2006/main" mc:Ignorable="mv" mc:PreserveAttributes="mv:*">
+  <p:cSld>
+    <p:spTree>
+      <p:nvGrpSpPr>
+        <p:cNvPr id="1" name=""/>
+        <p:cNvGrpSpPr/>
+        <p:nvPr/>
+      </p:nvGrpSpPr>
+      <p:grpSpPr>
+        <a:xfrm>
+          <a:off x="0" y="0"/>
+          <a:ext cx="0" cy="0"/>
+          <a:chOff x="0" y="0"/>
+          <a:chExt cx="0" cy="0"/>
+        </a:xfrm>
+      </p:grpSpPr>
+      <p:sp>
+        <p:nvSpPr>
+          <p:cNvPr id="2" name="Title 1"/>
+          <p:cNvSpPr>
+            <a:spLocks noGrp="1"/>
+          </p:cNvSpPr>
+          <p:nvPr>
+            <p:ph type="title"/>
+          </p:nvPr>
+        </p:nvSpPr>
+        <p:spPr/>
+        <p:txBody>
+          <a:bodyPr/>
+          <a:lstStyle/>
+          <a:p>
+            <a:r>
+              <a:rPr lang="en-US" dirty="0" smtClean="0"/>
+              <a:t>Criticism</a:t>
+            </a:r>
+            <a:endParaRPr lang="en-US" dirty="0"/>
+          </a:p>
+        </p:txBody>
+      </p:sp>
+      <p:sp>
+        <p:nvSpPr>
+          <p:cNvPr id="3" name="Content Placeholder 2"/>
+          <p:cNvSpPr>
+            <a:spLocks noGrp="1"/>
+          </p:cNvSpPr>
+          <p:nvPr>
+            <p:ph idx="1"/>
+          </p:nvPr>
+        </p:nvSpPr>
+        <p:spPr/>
+        <p:txBody>
+          <a:bodyPr/>
+          <a:lstStyle/>
+          <a:p>
+            <a:r>
+              <a:rPr lang="en-US" dirty="0" smtClean="0"/>
+              <a:t>Slow compiler</a:t>
+            </a:r>
+          </a:p>
+          <a:p>
+            <a:r>
+              <a:rPr lang="en-US" dirty="0" smtClean="0"/>
+              <a:t>Too many features</a:t>
+            </a:r>
+          </a:p>
+          <a:p>
+            <a:r>
+              <a:rPr lang="en-US" dirty="0" smtClean="0"/>
+              <a:t>Many different ways to call a method</a:t>
+            </a:r>
+            <a:endParaRPr lang="en-US" dirty="0"/>
+          </a:p>
+        </p:txBody>
+      </p:sp>
+    </p:spTree>
+  </p:cSld>
+  <p:clrMapOvr>
+    <a:masterClrMapping/>
+  </p:clrMapOvr>
 </p:sld>
 </file>
 
@@ -4401,6 +5024,181 @@
               <a:t>Why am I comparing with Ruby and Java?</a:t>
             </a:r>
             <a:endParaRPr lang="en-US" dirty="0"/>
+          </a:p>
+        </p:txBody>
+      </p:sp>
+    </p:spTree>
+  </p:cSld>
+  <p:clrMapOvr>
+    <a:masterClrMapping/>
+  </p:clrMapOvr>
+  <p:timing>
+    <p:tnLst>
+      <p:par>
+        <p:cTn id="1" dur="indefinite" restart="never" nodeType="tmRoot"/>
+      </p:par>
+    </p:tnLst>
+  </p:timing>
+</p:sld>
+</file>
+
+<file path=ppt/slides/slide20.xml><?xml version="1.0" encoding="utf-8"?>
+<p:sld xmlns:a="http://schemas.openxmlformats.org/drawingml/2006/main" xmlns:r="http://schemas.openxmlformats.org/officeDocument/2006/relationships" xmlns:mc="http://schemas.openxmlformats.org/markup-compatibility/2006" xmlns:mv="urn:schemas-microsoft-com:mac:vml" xmlns:p="http://schemas.openxmlformats.org/presentationml/2006/main" mc:Ignorable="mv" mc:PreserveAttributes="mv:*">
+  <p:cSld>
+    <p:spTree>
+      <p:nvGrpSpPr>
+        <p:cNvPr id="1" name=""/>
+        <p:cNvGrpSpPr/>
+        <p:nvPr/>
+      </p:nvGrpSpPr>
+      <p:grpSpPr>
+        <a:xfrm>
+          <a:off x="0" y="0"/>
+          <a:ext cx="0" cy="0"/>
+          <a:chOff x="0" y="0"/>
+          <a:chExt cx="0" cy="0"/>
+        </a:xfrm>
+      </p:grpSpPr>
+      <p:sp>
+        <p:nvSpPr>
+          <p:cNvPr id="2" name="Title 1"/>
+          <p:cNvSpPr>
+            <a:spLocks noGrp="1"/>
+          </p:cNvSpPr>
+          <p:nvPr>
+            <p:ph type="title"/>
+          </p:nvPr>
+        </p:nvSpPr>
+        <p:spPr/>
+        <p:txBody>
+          <a:bodyPr/>
+          <a:lstStyle/>
+          <a:p>
+            <a:r>
+              <a:rPr lang="en-US" dirty="0" smtClean="0"/>
+              <a:t>Other items of interest</a:t>
+            </a:r>
+            <a:endParaRPr lang="en-US" dirty="0"/>
+          </a:p>
+        </p:txBody>
+      </p:sp>
+      <p:sp>
+        <p:nvSpPr>
+          <p:cNvPr id="3" name="Content Placeholder 2"/>
+          <p:cNvSpPr>
+            <a:spLocks noGrp="1"/>
+          </p:cNvSpPr>
+          <p:nvPr>
+            <p:ph idx="1"/>
+          </p:nvPr>
+        </p:nvSpPr>
+        <p:spPr/>
+        <p:txBody>
+          <a:bodyPr/>
+          <a:lstStyle/>
+          <a:p>
+            <a:r>
+              <a:rPr lang="en-US" dirty="0" smtClean="0"/>
+              <a:t>REPL</a:t>
+            </a:r>
+            <a:endParaRPr lang="en-US" dirty="0"/>
+          </a:p>
+        </p:txBody>
+      </p:sp>
+    </p:spTree>
+  </p:cSld>
+  <p:clrMapOvr>
+    <a:masterClrMapping/>
+  </p:clrMapOvr>
+</p:sld>
+</file>
+
+<file path=ppt/slides/slide21.xml><?xml version="1.0" encoding="utf-8"?>
+<p:sld xmlns:a="http://schemas.openxmlformats.org/drawingml/2006/main" xmlns:r="http://schemas.openxmlformats.org/officeDocument/2006/relationships" xmlns:mc="http://schemas.openxmlformats.org/markup-compatibility/2006" xmlns:mv="urn:schemas-microsoft-com:mac:vml" xmlns:p="http://schemas.openxmlformats.org/presentationml/2006/main" mc:Ignorable="mv" mc:PreserveAttributes="mv:*">
+  <p:cSld>
+    <p:spTree>
+      <p:nvGrpSpPr>
+        <p:cNvPr id="1" name=""/>
+        <p:cNvGrpSpPr/>
+        <p:nvPr/>
+      </p:nvGrpSpPr>
+      <p:grpSpPr>
+        <a:xfrm>
+          <a:off x="0" y="0"/>
+          <a:ext cx="0" cy="0"/>
+          <a:chOff x="0" y="0"/>
+          <a:chExt cx="0" cy="0"/>
+        </a:xfrm>
+      </p:grpSpPr>
+      <p:sp>
+        <p:nvSpPr>
+          <p:cNvPr id="2" name="Title 1"/>
+          <p:cNvSpPr>
+            <a:spLocks noGrp="1"/>
+          </p:cNvSpPr>
+          <p:nvPr>
+            <p:ph type="title"/>
+          </p:nvPr>
+        </p:nvSpPr>
+        <p:spPr/>
+        <p:txBody>
+          <a:bodyPr/>
+          <a:lstStyle/>
+          <a:p>
+            <a:r>
+              <a:rPr lang="en-US" dirty="0" smtClean="0"/>
+              <a:t>Functional yet beautiful</a:t>
+            </a:r>
+            <a:endParaRPr lang="en-US" dirty="0"/>
+          </a:p>
+        </p:txBody>
+      </p:sp>
+      <p:pic>
+        <p:nvPicPr>
+          <p:cNvPr id="4" name="Content Placeholder 3" descr="qum_round_persian_rugs_1.JPG"/>
+          <p:cNvPicPr>
+            <a:picLocks noGrp="1" noChangeAspect="1"/>
+          </p:cNvPicPr>
+          <p:nvPr>
+            <p:ph idx="1"/>
+          </p:nvPr>
+        </p:nvPicPr>
+        <p:blipFill>
+          <a:blip r:embed="rId3"/>
+          <a:srcRect l="-42539" r="-42539"/>
+          <a:stretch>
+            <a:fillRect/>
+          </a:stretch>
+        </p:blipFill>
+        <p:spPr/>
+      </p:pic>
+      <p:sp>
+        <p:nvSpPr>
+          <p:cNvPr id="5" name="TextBox 4"/>
+          <p:cNvSpPr txBox="1"/>
+          <p:nvPr/>
+        </p:nvSpPr>
+        <p:spPr>
+          <a:xfrm>
+            <a:off x="5232121" y="6307080"/>
+            <a:ext cx="3911879" cy="261610"/>
+          </a:xfrm>
+          <a:prstGeom prst="rect">
+            <a:avLst/>
+          </a:prstGeom>
+          <a:noFill/>
+        </p:spPr>
+        <p:txBody>
+          <a:bodyPr wrap="square" rtlCol="0">
+            <a:spAutoFit/>
+          </a:bodyPr>
+          <a:lstStyle/>
+          <a:p>
+            <a:r>
+              <a:rPr lang="en-US" sz="1100" dirty="0" smtClean="0"/>
+              <a:t>http://www.orientalpersianrug.com/qum_persian_rugs.html</a:t>
+            </a:r>
+            <a:endParaRPr lang="en-US" sz="1100" dirty="0"/>
           </a:p>
         </p:txBody>
       </p:sp>
@@ -4478,26 +5276,13 @@
           <a:p>
             <a:r>
               <a:rPr lang="en-US" sz="4400" dirty="0" smtClean="0"/>
-              <a:t>Professionally </a:t>
-            </a:r>
+              <a:t>Professionally a Ruby and Java developer</a:t>
+            </a:r>
+          </a:p>
+          <a:p>
             <a:r>
               <a:rPr lang="en-US" sz="4400" dirty="0" smtClean="0"/>
-              <a:t>a Ruby and Java </a:t>
-            </a:r>
-            <a:r>
-              <a:rPr lang="en-US" sz="4400" dirty="0" smtClean="0"/>
-              <a:t>developer</a:t>
-            </a:r>
-            <a:endParaRPr lang="en-US" sz="4400" dirty="0" smtClean="0"/>
-          </a:p>
-          <a:p>
-            <a:r>
-              <a:rPr lang="en-US" sz="4400" dirty="0" smtClean="0"/>
-              <a:t>Haven’t </a:t>
-            </a:r>
-            <a:r>
-              <a:rPr lang="en-US" sz="4400" dirty="0" smtClean="0"/>
-              <a:t>worked with </a:t>
+              <a:t>Haven’t worked with </a:t>
             </a:r>
             <a:r>
               <a:rPr lang="en-US" sz="4400" dirty="0" err="1" smtClean="0"/>
@@ -4507,16 +5292,11 @@
               <a:rPr lang="en-US" sz="4400" dirty="0" smtClean="0"/>
               <a:t> on a “real” project</a:t>
             </a:r>
-            <a:endParaRPr lang="en-US" sz="4400" dirty="0" smtClean="0"/>
           </a:p>
           <a:p>
             <a:r>
               <a:rPr lang="en-US" sz="4400" dirty="0" smtClean="0"/>
-              <a:t>Based on my experience working with </a:t>
-            </a:r>
-            <a:r>
-              <a:rPr lang="en-US" sz="4400" dirty="0" smtClean="0"/>
-              <a:t>the Credit Union </a:t>
+              <a:t>Based on my experience working with the Credit Union </a:t>
             </a:r>
             <a:r>
               <a:rPr lang="en-US" sz="4400" dirty="0" err="1" smtClean="0"/>
@@ -4907,7 +5687,7 @@
           <a:p>
             <a:r>
               <a:rPr lang="en-US" dirty="0" smtClean="0"/>
-              <a:t>Function closures</a:t>
+              <a:t>Closures &amp; Higher-Order Functions</a:t>
             </a:r>
             <a:endParaRPr lang="en-US" dirty="0"/>
           </a:p>
@@ -4928,6 +5708,20 @@
           <a:bodyPr/>
           <a:lstStyle/>
           <a:p>
+            <a:r>
+              <a:rPr lang="en-US" dirty="0" smtClean="0"/>
+              <a:t>Closures are blocks of code </a:t>
+            </a:r>
+            <a:r>
+              <a:rPr lang="en-US" dirty="0" smtClean="0"/>
+              <a:t>that can be passed around as parameters</a:t>
+            </a:r>
+          </a:p>
+          <a:p>
+            <a:r>
+              <a:rPr lang="en-US" dirty="0" smtClean="0"/>
+              <a:t>Higher-Order Functions are functions that either input or output functions.</a:t>
+            </a:r>
             <a:endParaRPr lang="en-US" dirty="0"/>
           </a:p>
         </p:txBody>
@@ -4981,43 +5775,36 @@
           <a:p>
             <a:r>
               <a:rPr lang="en-US" dirty="0" smtClean="0"/>
-              <a:t>Ruby monkey patching</a:t>
+              <a:t>Closures (in Ruby)</a:t>
             </a:r>
             <a:endParaRPr lang="en-US" dirty="0"/>
           </a:p>
         </p:txBody>
       </p:sp>
-      <p:pic>
-        <p:nvPicPr>
-          <p:cNvPr id="4" name="Content Placeholder 3" descr="ruby_monkey.tiff"/>
-          <p:cNvPicPr>
-            <a:picLocks noGrp="1" noChangeAspect="1"/>
-          </p:cNvPicPr>
+      <p:sp>
+        <p:nvSpPr>
+          <p:cNvPr id="3" name="Content Placeholder 2"/>
+          <p:cNvSpPr>
+            <a:spLocks noGrp="1"/>
+          </p:cNvSpPr>
           <p:nvPr>
             <p:ph idx="1"/>
           </p:nvPr>
-        </p:nvPicPr>
-        <p:blipFill>
-          <a:blip r:embed="rId2"/>
-          <a:srcRect l="-5795" r="-5795"/>
-          <a:stretch>
-            <a:fillRect/>
-          </a:stretch>
-        </p:blipFill>
-        <p:spPr/>
-      </p:pic>
+        </p:nvSpPr>
+        <p:spPr/>
+        <p:txBody>
+          <a:bodyPr/>
+          <a:lstStyle/>
+          <a:p>
+            <a:endParaRPr lang="en-US"/>
+          </a:p>
+        </p:txBody>
+      </p:sp>
     </p:spTree>
   </p:cSld>
   <p:clrMapOvr>
     <a:masterClrMapping/>
   </p:clrMapOvr>
-  <p:timing>
-    <p:tnLst>
-      <p:par>
-        <p:cTn id="1" dur="indefinite" restart="never" nodeType="tmRoot"/>
-      </p:par>
-    </p:tnLst>
-  </p:timing>
 </p:sld>
 </file>
 

</xml_diff>

<commit_message>
Higher-Order functions and Scala implicits
</commit_message>
<xml_diff>
--- a/Scala_Away_Day.pptx
+++ b/Scala_Away_Day.pptx
@@ -5,7 +5,7 @@
     <p:sldMasterId id="2147483648" r:id="rId1"/>
   </p:sldMasterIdLst>
   <p:notesMasterIdLst>
-    <p:notesMasterId r:id="rId25"/>
+    <p:notesMasterId r:id="rId24"/>
   </p:notesMasterIdLst>
   <p:sldIdLst>
     <p:sldId id="256" r:id="rId2"/>
@@ -18,19 +18,18 @@
     <p:sldId id="263" r:id="rId9"/>
     <p:sldId id="273" r:id="rId10"/>
     <p:sldId id="274" r:id="rId11"/>
-    <p:sldId id="275" r:id="rId12"/>
-    <p:sldId id="277" r:id="rId13"/>
+    <p:sldId id="277" r:id="rId12"/>
+    <p:sldId id="275" r:id="rId13"/>
     <p:sldId id="278" r:id="rId14"/>
-    <p:sldId id="276" r:id="rId15"/>
-    <p:sldId id="265" r:id="rId16"/>
-    <p:sldId id="266" r:id="rId17"/>
-    <p:sldId id="267" r:id="rId18"/>
-    <p:sldId id="268" r:id="rId19"/>
-    <p:sldId id="269" r:id="rId20"/>
-    <p:sldId id="270" r:id="rId21"/>
-    <p:sldId id="271" r:id="rId22"/>
-    <p:sldId id="272" r:id="rId23"/>
-    <p:sldId id="262" r:id="rId24"/>
+    <p:sldId id="265" r:id="rId15"/>
+    <p:sldId id="266" r:id="rId16"/>
+    <p:sldId id="267" r:id="rId17"/>
+    <p:sldId id="268" r:id="rId18"/>
+    <p:sldId id="269" r:id="rId19"/>
+    <p:sldId id="270" r:id="rId20"/>
+    <p:sldId id="271" r:id="rId21"/>
+    <p:sldId id="272" r:id="rId22"/>
+    <p:sldId id="262" r:id="rId23"/>
   </p:sldIdLst>
   <p:sldSz cx="9144000" cy="6858000" type="screen4x3"/>
   <p:notesSz cx="6858000" cy="9144000"/>
@@ -215,7 +214,7 @@
             <a:fld id="{0369B58C-3524-9B4E-AA23-6BD0D96BE4E7}" type="datetimeFigureOut">
               <a:rPr lang="en-US" smtClean="0"/>
               <a:pPr/>
-              <a:t>6/15/12</a:t>
+              <a:t>6/18/12</a:t>
             </a:fld>
             <a:endParaRPr lang="en-US"/>
           </a:p>
@@ -832,7 +831,24 @@
           <a:p>
             <a:r>
               <a:rPr lang="en-US" dirty="0" smtClean="0"/>
-              <a:t>In Ruby, blocks</a:t>
+              <a:t>When</a:t>
+            </a:r>
+            <a:r>
+              <a:rPr lang="en-US" baseline="0" dirty="0" smtClean="0"/>
+              <a:t> I first came to Ruby, the thing that really impressed me was closures. I was thinking this is great. Clean and concise.</a:t>
+            </a:r>
+          </a:p>
+          <a:p>
+            <a:endParaRPr lang="en-US" dirty="0" smtClean="0"/>
+          </a:p>
+          <a:p>
+            <a:r>
+              <a:rPr lang="en-US" dirty="0" smtClean="0"/>
+              <a:t>In </a:t>
+            </a:r>
+            <a:r>
+              <a:rPr lang="en-US" dirty="0" smtClean="0"/>
+              <a:t>Ruby, blocks</a:t>
             </a:r>
             <a:r>
               <a:rPr lang="en-US" baseline="0" dirty="0" smtClean="0"/>
@@ -860,11 +876,7 @@
             </a:r>
             <a:r>
               <a:rPr lang="en-US" baseline="0" dirty="0" smtClean="0"/>
-              <a:t> with subtle difference like lambda checks for number </a:t>
-            </a:r>
-            <a:r>
-              <a:rPr lang="en-US" baseline="0" smtClean="0"/>
-              <a:t>of arguments.</a:t>
+              <a:t> with subtle difference like lambda checks for number of arguments.</a:t>
             </a:r>
             <a:endParaRPr lang="en-US" dirty="0"/>
           </a:p>
@@ -1080,7 +1092,7 @@
             <a:fld id="{765C5218-4828-B544-9955-A4B6719EC9E2}" type="slidenum">
               <a:rPr lang="en-US" smtClean="0"/>
               <a:pPr/>
-              <a:t>16</a:t>
+              <a:t>15</a:t>
             </a:fld>
             <a:endParaRPr lang="en-US"/>
           </a:p>
@@ -1187,7 +1199,7 @@
             <a:fld id="{765C5218-4828-B544-9955-A4B6719EC9E2}" type="slidenum">
               <a:rPr lang="en-US" smtClean="0"/>
               <a:pPr/>
-              <a:t>17</a:t>
+              <a:t>16</a:t>
             </a:fld>
             <a:endParaRPr lang="en-US"/>
           </a:p>
@@ -1293,7 +1305,7 @@
             <a:fld id="{765C5218-4828-B544-9955-A4B6719EC9E2}" type="slidenum">
               <a:rPr lang="en-US" smtClean="0"/>
               <a:pPr/>
-              <a:t>23</a:t>
+              <a:t>22</a:t>
             </a:fld>
             <a:endParaRPr lang="en-US"/>
           </a:p>
@@ -1489,7 +1501,7 @@
             <a:fld id="{A753D463-393C-F44B-8A21-44DFAD823718}" type="datetimeFigureOut">
               <a:rPr lang="en-US" smtClean="0"/>
               <a:pPr/>
-              <a:t>6/15/12</a:t>
+              <a:t>6/18/12</a:t>
             </a:fld>
             <a:endParaRPr lang="en-US"/>
           </a:p>
@@ -1656,7 +1668,7 @@
             <a:fld id="{A753D463-393C-F44B-8A21-44DFAD823718}" type="datetimeFigureOut">
               <a:rPr lang="en-US" smtClean="0"/>
               <a:pPr/>
-              <a:t>6/15/12</a:t>
+              <a:t>6/18/12</a:t>
             </a:fld>
             <a:endParaRPr lang="en-US"/>
           </a:p>
@@ -1833,7 +1845,7 @@
             <a:fld id="{A753D463-393C-F44B-8A21-44DFAD823718}" type="datetimeFigureOut">
               <a:rPr lang="en-US" smtClean="0"/>
               <a:pPr/>
-              <a:t>6/15/12</a:t>
+              <a:t>6/18/12</a:t>
             </a:fld>
             <a:endParaRPr lang="en-US"/>
           </a:p>
@@ -2000,7 +2012,7 @@
             <a:fld id="{A753D463-393C-F44B-8A21-44DFAD823718}" type="datetimeFigureOut">
               <a:rPr lang="en-US" smtClean="0"/>
               <a:pPr/>
-              <a:t>6/15/12</a:t>
+              <a:t>6/18/12</a:t>
             </a:fld>
             <a:endParaRPr lang="en-US"/>
           </a:p>
@@ -2243,7 +2255,7 @@
             <a:fld id="{A753D463-393C-F44B-8A21-44DFAD823718}" type="datetimeFigureOut">
               <a:rPr lang="en-US" smtClean="0"/>
               <a:pPr/>
-              <a:t>6/15/12</a:t>
+              <a:t>6/18/12</a:t>
             </a:fld>
             <a:endParaRPr lang="en-US"/>
           </a:p>
@@ -2528,7 +2540,7 @@
             <a:fld id="{A753D463-393C-F44B-8A21-44DFAD823718}" type="datetimeFigureOut">
               <a:rPr lang="en-US" smtClean="0"/>
               <a:pPr/>
-              <a:t>6/15/12</a:t>
+              <a:t>6/18/12</a:t>
             </a:fld>
             <a:endParaRPr lang="en-US"/>
           </a:p>
@@ -2947,7 +2959,7 @@
             <a:fld id="{A753D463-393C-F44B-8A21-44DFAD823718}" type="datetimeFigureOut">
               <a:rPr lang="en-US" smtClean="0"/>
               <a:pPr/>
-              <a:t>6/15/12</a:t>
+              <a:t>6/18/12</a:t>
             </a:fld>
             <a:endParaRPr lang="en-US"/>
           </a:p>
@@ -3062,7 +3074,7 @@
             <a:fld id="{A753D463-393C-F44B-8A21-44DFAD823718}" type="datetimeFigureOut">
               <a:rPr lang="en-US" smtClean="0"/>
               <a:pPr/>
-              <a:t>6/15/12</a:t>
+              <a:t>6/18/12</a:t>
             </a:fld>
             <a:endParaRPr lang="en-US"/>
           </a:p>
@@ -3154,7 +3166,7 @@
             <a:fld id="{A753D463-393C-F44B-8A21-44DFAD823718}" type="datetimeFigureOut">
               <a:rPr lang="en-US" smtClean="0"/>
               <a:pPr/>
-              <a:t>6/15/12</a:t>
+              <a:t>6/18/12</a:t>
             </a:fld>
             <a:endParaRPr lang="en-US"/>
           </a:p>
@@ -3428,7 +3440,7 @@
             <a:fld id="{A753D463-393C-F44B-8A21-44DFAD823718}" type="datetimeFigureOut">
               <a:rPr lang="en-US" smtClean="0"/>
               <a:pPr/>
-              <a:t>6/15/12</a:t>
+              <a:t>6/18/12</a:t>
             </a:fld>
             <a:endParaRPr lang="en-US"/>
           </a:p>
@@ -3678,7 +3690,7 @@
             <a:fld id="{A753D463-393C-F44B-8A21-44DFAD823718}" type="datetimeFigureOut">
               <a:rPr lang="en-US" smtClean="0"/>
               <a:pPr/>
-              <a:t>6/15/12</a:t>
+              <a:t>6/18/12</a:t>
             </a:fld>
             <a:endParaRPr lang="en-US"/>
           </a:p>
@@ -3888,7 +3900,7 @@
             <a:fld id="{A753D463-393C-F44B-8A21-44DFAD823718}" type="datetimeFigureOut">
               <a:rPr lang="en-US" smtClean="0"/>
               <a:pPr/>
-              <a:t>6/15/12</a:t>
+              <a:t>6/18/12</a:t>
             </a:fld>
             <a:endParaRPr lang="en-US"/>
           </a:p>
@@ -4400,6 +4412,13 @@
   <p:clrMapOvr>
     <a:masterClrMapping/>
   </p:clrMapOvr>
+  <p:timing>
+    <p:tnLst>
+      <p:par>
+        <p:cTn id="1" dur="indefinite" restart="never" nodeType="tmRoot"/>
+      </p:par>
+    </p:tnLst>
+  </p:timing>
 </p:sld>
 </file>
 
@@ -4437,36 +4456,49 @@
           <a:p>
             <a:r>
               <a:rPr lang="en-US" dirty="0" smtClean="0"/>
-              <a:t>Higher-Order Function -  Ruby</a:t>
+              <a:t>Higher-Order Functions</a:t>
             </a:r>
             <a:endParaRPr lang="en-US" dirty="0"/>
           </a:p>
         </p:txBody>
       </p:sp>
-      <p:pic>
-        <p:nvPicPr>
-          <p:cNvPr id="4" name="Content Placeholder 3" descr="ruby_higher_order_function.tiff"/>
-          <p:cNvPicPr>
-            <a:picLocks noGrp="1" noChangeAspect="1"/>
-          </p:cNvPicPr>
+      <p:sp>
+        <p:nvSpPr>
+          <p:cNvPr id="3" name="Content Placeholder 2"/>
+          <p:cNvSpPr>
+            <a:spLocks noGrp="1"/>
+          </p:cNvSpPr>
           <p:nvPr>
             <p:ph idx="1"/>
           </p:nvPr>
-        </p:nvPicPr>
-        <p:blipFill>
-          <a:blip r:embed="rId2"/>
-          <a:srcRect t="-37338" b="-37338"/>
-          <a:stretch>
-            <a:fillRect/>
-          </a:stretch>
-        </p:blipFill>
-        <p:spPr/>
-      </p:pic>
+        </p:nvSpPr>
+        <p:spPr/>
+        <p:txBody>
+          <a:bodyPr/>
+          <a:lstStyle/>
+          <a:p>
+            <a:r>
+              <a:rPr lang="en-US" dirty="0" smtClean="0"/>
+              <a:t>Higher-Order Functions are functions that either input or output functions.</a:t>
+            </a:r>
+          </a:p>
+          <a:p>
+            <a:endParaRPr lang="en-US" dirty="0"/>
+          </a:p>
+        </p:txBody>
+      </p:sp>
     </p:spTree>
   </p:cSld>
   <p:clrMapOvr>
     <a:masterClrMapping/>
   </p:clrMapOvr>
+  <p:timing>
+    <p:tnLst>
+      <p:par>
+        <p:cTn id="1" dur="indefinite" restart="never" nodeType="tmRoot"/>
+      </p:par>
+    </p:tnLst>
+  </p:timing>
 </p:sld>
 </file>
 
@@ -4504,46 +4536,51 @@
           <a:p>
             <a:r>
               <a:rPr lang="en-US" dirty="0" smtClean="0"/>
-              <a:t>Higher</a:t>
+              <a:t>Higher-Order </a:t>
             </a:r>
             <a:r>
               <a:rPr lang="en-US" dirty="0" smtClean="0"/>
-              <a:t>-Order Functions</a:t>
+              <a:t>Functions in Ruby</a:t>
             </a:r>
             <a:endParaRPr lang="en-US" dirty="0"/>
           </a:p>
         </p:txBody>
       </p:sp>
-      <p:sp>
-        <p:nvSpPr>
-          <p:cNvPr id="3" name="Content Placeholder 2"/>
-          <p:cNvSpPr>
-            <a:spLocks noGrp="1"/>
-          </p:cNvSpPr>
+      <p:pic>
+        <p:nvPicPr>
+          <p:cNvPr id="4" name="Content Placeholder 3" descr="ruby_higher_order_function.tiff"/>
+          <p:cNvPicPr>
+            <a:picLocks noGrp="1" noChangeAspect="1"/>
+          </p:cNvPicPr>
           <p:nvPr>
             <p:ph idx="1"/>
           </p:nvPr>
-        </p:nvSpPr>
-        <p:spPr/>
-        <p:txBody>
-          <a:bodyPr/>
-          <a:lstStyle/>
-          <a:p>
-            <a:r>
-              <a:rPr lang="en-US" dirty="0" smtClean="0"/>
-              <a:t>Higher-Order Functions are functions that either input or output functions.</a:t>
-            </a:r>
-          </a:p>
-          <a:p>
-            <a:endParaRPr lang="en-US" dirty="0"/>
-          </a:p>
-        </p:txBody>
-      </p:sp>
+        </p:nvPicPr>
+        <p:blipFill>
+          <a:blip r:embed="rId2"/>
+          <a:stretch>
+            <a:fillRect/>
+          </a:stretch>
+        </p:blipFill>
+        <p:spPr>
+          <a:xfrm>
+            <a:off x="457200" y="1879499"/>
+            <a:ext cx="8229600" cy="3967364"/>
+          </a:xfrm>
+        </p:spPr>
+      </p:pic>
     </p:spTree>
   </p:cSld>
   <p:clrMapOvr>
     <a:masterClrMapping/>
   </p:clrMapOvr>
+  <p:timing>
+    <p:tnLst>
+      <p:par>
+        <p:cTn id="1" dur="indefinite" restart="never" nodeType="tmRoot"/>
+      </p:par>
+    </p:tnLst>
+  </p:timing>
 </p:sld>
 </file>
 
@@ -4581,36 +4618,51 @@
           <a:p>
             <a:r>
               <a:rPr lang="en-US" dirty="0" smtClean="0"/>
-              <a:t>Higher-Order functions in Ruby</a:t>
+              <a:t>Higher-Order functions in</a:t>
+            </a:r>
+            <a:r>
+              <a:rPr lang="en-US" dirty="0" smtClean="0"/>
+              <a:t> </a:t>
+            </a:r>
+            <a:r>
+              <a:rPr lang="en-US" dirty="0" err="1" smtClean="0"/>
+              <a:t>Scala</a:t>
             </a:r>
             <a:endParaRPr lang="en-US" dirty="0"/>
           </a:p>
         </p:txBody>
       </p:sp>
-      <p:sp>
-        <p:nvSpPr>
-          <p:cNvPr id="3" name="Content Placeholder 2"/>
-          <p:cNvSpPr>
-            <a:spLocks noGrp="1"/>
-          </p:cNvSpPr>
+      <p:pic>
+        <p:nvPicPr>
+          <p:cNvPr id="4" name="Content Placeholder 3" descr="scala_higher_order_function.tiff"/>
+          <p:cNvPicPr>
+            <a:picLocks noGrp="1" noChangeAspect="1"/>
+          </p:cNvPicPr>
           <p:nvPr>
             <p:ph idx="1"/>
           </p:nvPr>
-        </p:nvSpPr>
-        <p:spPr/>
-        <p:txBody>
-          <a:bodyPr/>
-          <a:lstStyle/>
-          <a:p>
-            <a:endParaRPr lang="en-US" dirty="0"/>
-          </a:p>
-        </p:txBody>
-      </p:sp>
+        </p:nvPicPr>
+        <p:blipFill>
+          <a:blip r:embed="rId2"/>
+          <a:srcRect t="-55529" b="-55529"/>
+          <a:stretch>
+            <a:fillRect/>
+          </a:stretch>
+        </p:blipFill>
+        <p:spPr/>
+      </p:pic>
     </p:spTree>
   </p:cSld>
   <p:clrMapOvr>
     <a:masterClrMapping/>
   </p:clrMapOvr>
+  <p:timing>
+    <p:tnLst>
+      <p:par>
+        <p:cTn id="1" dur="indefinite" restart="never" nodeType="tmRoot"/>
+      </p:par>
+    </p:tnLst>
+  </p:timing>
 </p:sld>
 </file>
 
@@ -4648,11 +4700,7 @@
           <a:p>
             <a:r>
               <a:rPr lang="en-US" dirty="0" smtClean="0"/>
-              <a:t>Higher-Order Functions in </a:t>
-            </a:r>
-            <a:r>
-              <a:rPr lang="en-US" dirty="0" err="1" smtClean="0"/>
-              <a:t>Scala</a:t>
+              <a:t>Ruby monkey patching</a:t>
             </a:r>
             <a:endParaRPr lang="en-US" dirty="0"/>
           </a:p>
@@ -4660,7 +4708,7 @@
       </p:sp>
       <p:pic>
         <p:nvPicPr>
-          <p:cNvPr id="4" name="Content Placeholder 3" descr="scala_higher_order_function.tiff"/>
+          <p:cNvPr id="4" name="Content Placeholder 3" descr="ruby_monkey.tiff"/>
           <p:cNvPicPr>
             <a:picLocks noGrp="1" noChangeAspect="1"/>
           </p:cNvPicPr>
@@ -4670,7 +4718,7 @@
         </p:nvPicPr>
         <p:blipFill>
           <a:blip r:embed="rId2"/>
-          <a:srcRect t="-85744" b="-85744"/>
+          <a:srcRect l="-5795" r="-5795"/>
           <a:stretch>
             <a:fillRect/>
           </a:stretch>
@@ -4682,6 +4730,13 @@
   <p:clrMapOvr>
     <a:masterClrMapping/>
   </p:clrMapOvr>
+  <p:timing>
+    <p:tnLst>
+      <p:par>
+        <p:cTn id="1" dur="indefinite" restart="never" nodeType="tmRoot"/>
+      </p:par>
+    </p:tnLst>
+  </p:timing>
 </p:sld>
 </file>
 
@@ -4718,8 +4773,12 @@
           <a:lstStyle/>
           <a:p>
             <a:r>
+              <a:rPr lang="en-US" dirty="0" err="1" smtClean="0"/>
+              <a:t>Scala</a:t>
+            </a:r>
+            <a:r>
               <a:rPr lang="en-US" dirty="0" smtClean="0"/>
-              <a:t>Ruby monkey patching</a:t>
+              <a:t> implicit conversions</a:t>
             </a:r>
             <a:endParaRPr lang="en-US" dirty="0"/>
           </a:p>
@@ -4727,7 +4786,7 @@
       </p:sp>
       <p:pic>
         <p:nvPicPr>
-          <p:cNvPr id="4" name="Content Placeholder 3" descr="ruby_monkey.tiff"/>
+          <p:cNvPr id="4" name="Content Placeholder 3" descr="scala_implicits.tiff"/>
           <p:cNvPicPr>
             <a:picLocks noGrp="1" noChangeAspect="1"/>
           </p:cNvPicPr>
@@ -4736,13 +4795,17 @@
           </p:nvPr>
         </p:nvPicPr>
         <p:blipFill>
-          <a:blip r:embed="rId2"/>
-          <a:srcRect l="-5795" r="-5795"/>
+          <a:blip r:embed="rId3"/>
           <a:stretch>
             <a:fillRect/>
           </a:stretch>
         </p:blipFill>
-        <p:spPr/>
+        <p:spPr>
+          <a:xfrm>
+            <a:off x="457200" y="2218362"/>
+            <a:ext cx="8229600" cy="3289639"/>
+          </a:xfrm>
+        </p:spPr>
       </p:pic>
     </p:spTree>
   </p:cSld>
@@ -4792,36 +4855,34 @@
           <a:lstStyle/>
           <a:p>
             <a:r>
-              <a:rPr lang="en-US" dirty="0" err="1" smtClean="0"/>
-              <a:t>Scala</a:t>
-            </a:r>
-            <a:r>
               <a:rPr lang="en-US" dirty="0" smtClean="0"/>
-              <a:t> implicit conversions</a:t>
+              <a:t>Performance</a:t>
             </a:r>
             <a:endParaRPr lang="en-US" dirty="0"/>
           </a:p>
         </p:txBody>
       </p:sp>
-      <p:pic>
-        <p:nvPicPr>
-          <p:cNvPr id="4" name="Content Placeholder 3" descr="scala_implicits.tiff"/>
-          <p:cNvPicPr>
-            <a:picLocks noGrp="1" noChangeAspect="1"/>
-          </p:cNvPicPr>
+      <p:sp>
+        <p:nvSpPr>
+          <p:cNvPr id="3" name="Content Placeholder 2"/>
+          <p:cNvSpPr>
+            <a:spLocks noGrp="1"/>
+          </p:cNvSpPr>
           <p:nvPr>
             <p:ph idx="1"/>
           </p:nvPr>
-        </p:nvPicPr>
-        <p:blipFill>
-          <a:blip r:embed="rId3"/>
-          <a:srcRect t="-22241" b="-22241"/>
-          <a:stretch>
-            <a:fillRect/>
-          </a:stretch>
-        </p:blipFill>
-        <p:spPr/>
-      </p:pic>
+        </p:nvSpPr>
+        <p:spPr/>
+        <p:txBody>
+          <a:bodyPr>
+            <a:normAutofit/>
+          </a:bodyPr>
+          <a:lstStyle/>
+          <a:p>
+            <a:endParaRPr lang="en-US" sz="4400" dirty="0" smtClean="0"/>
+          </a:p>
+        </p:txBody>
+      </p:sp>
     </p:spTree>
   </p:cSld>
   <p:clrMapOvr>
@@ -4870,10 +4931,10 @@
           <a:lstStyle/>
           <a:p>
             <a:r>
-              <a:rPr lang="en-US" dirty="0" smtClean="0"/>
-              <a:t>Performance</a:t>
-            </a:r>
-            <a:endParaRPr lang="en-US" dirty="0"/>
+              <a:rPr lang="en-US" smtClean="0"/>
+              <a:t>Tail recursion</a:t>
+            </a:r>
+            <a:endParaRPr lang="en-US"/>
           </a:p>
         </p:txBody>
       </p:sp>
@@ -4889,12 +4950,10 @@
         </p:nvSpPr>
         <p:spPr/>
         <p:txBody>
-          <a:bodyPr>
-            <a:normAutofit/>
-          </a:bodyPr>
-          <a:lstStyle/>
-          <a:p>
-            <a:endParaRPr lang="en-US" sz="4400" dirty="0" smtClean="0"/>
+          <a:bodyPr/>
+          <a:lstStyle/>
+          <a:p>
+            <a:endParaRPr lang="en-US"/>
           </a:p>
         </p:txBody>
       </p:sp>
@@ -4946,10 +5005,10 @@
           <a:lstStyle/>
           <a:p>
             <a:r>
-              <a:rPr lang="en-US" smtClean="0"/>
-              <a:t>Tail recursion</a:t>
-            </a:r>
-            <a:endParaRPr lang="en-US"/>
+              <a:rPr lang="en-US" dirty="0" smtClean="0"/>
+              <a:t>Parallel collections</a:t>
+            </a:r>
+            <a:endParaRPr lang="en-US" dirty="0"/>
           </a:p>
         </p:txBody>
       </p:sp>
@@ -4977,6 +5036,13 @@
   <p:clrMapOvr>
     <a:masterClrMapping/>
   </p:clrMapOvr>
+  <p:timing>
+    <p:tnLst>
+      <p:par>
+        <p:cTn id="1" dur="indefinite" restart="never" nodeType="tmRoot"/>
+      </p:par>
+    </p:tnLst>
+  </p:timing>
 </p:sld>
 </file>
 
@@ -5014,7 +5080,7 @@
           <a:p>
             <a:r>
               <a:rPr lang="en-US" dirty="0" smtClean="0"/>
-              <a:t>Parallel collections</a:t>
+              <a:t>Actors</a:t>
             </a:r>
             <a:endParaRPr lang="en-US" dirty="0"/>
           </a:p>
@@ -5044,6 +5110,13 @@
   <p:clrMapOvr>
     <a:masterClrMapping/>
   </p:clrMapOvr>
+  <p:timing>
+    <p:tnLst>
+      <p:par>
+        <p:cTn id="1" dur="indefinite" restart="never" nodeType="tmRoot"/>
+      </p:par>
+    </p:tnLst>
+  </p:timing>
 </p:sld>
 </file>
 
@@ -5174,7 +5247,7 @@
           <a:p>
             <a:r>
               <a:rPr lang="en-US" dirty="0" smtClean="0"/>
-              <a:t>Actors</a:t>
+              <a:t>Criticism</a:t>
             </a:r>
             <a:endParaRPr lang="en-US" dirty="0"/>
           </a:p>
@@ -5195,7 +5268,23 @@
           <a:bodyPr/>
           <a:lstStyle/>
           <a:p>
-            <a:endParaRPr lang="en-US"/>
+            <a:r>
+              <a:rPr lang="en-US" dirty="0" smtClean="0"/>
+              <a:t>Slow compiler</a:t>
+            </a:r>
+          </a:p>
+          <a:p>
+            <a:r>
+              <a:rPr lang="en-US" dirty="0" smtClean="0"/>
+              <a:t>Too many features</a:t>
+            </a:r>
+          </a:p>
+          <a:p>
+            <a:r>
+              <a:rPr lang="en-US" dirty="0" smtClean="0"/>
+              <a:t>Many different ways to call a method</a:t>
+            </a:r>
+            <a:endParaRPr lang="en-US" dirty="0"/>
           </a:p>
         </p:txBody>
       </p:sp>
@@ -5204,6 +5293,13 @@
   <p:clrMapOvr>
     <a:masterClrMapping/>
   </p:clrMapOvr>
+  <p:timing>
+    <p:tnLst>
+      <p:par>
+        <p:cTn id="1" dur="indefinite" restart="never" nodeType="tmRoot"/>
+      </p:par>
+    </p:tnLst>
+  </p:timing>
 </p:sld>
 </file>
 
@@ -5241,7 +5337,7 @@
           <a:p>
             <a:r>
               <a:rPr lang="en-US" dirty="0" smtClean="0"/>
-              <a:t>Criticism</a:t>
+              <a:t>Other items of interest</a:t>
             </a:r>
             <a:endParaRPr lang="en-US" dirty="0"/>
           </a:p>
@@ -5264,19 +5360,7 @@
           <a:p>
             <a:r>
               <a:rPr lang="en-US" dirty="0" smtClean="0"/>
-              <a:t>Slow compiler</a:t>
-            </a:r>
-          </a:p>
-          <a:p>
-            <a:r>
-              <a:rPr lang="en-US" dirty="0" smtClean="0"/>
-              <a:t>Too many features</a:t>
-            </a:r>
-          </a:p>
-          <a:p>
-            <a:r>
-              <a:rPr lang="en-US" dirty="0" smtClean="0"/>
-              <a:t>Many different ways to call a method</a:t>
+              <a:t>REPL</a:t>
             </a:r>
             <a:endParaRPr lang="en-US" dirty="0"/>
           </a:p>
@@ -5287,81 +5371,17 @@
   <p:clrMapOvr>
     <a:masterClrMapping/>
   </p:clrMapOvr>
+  <p:timing>
+    <p:tnLst>
+      <p:par>
+        <p:cTn id="1" dur="indefinite" restart="never" nodeType="tmRoot"/>
+      </p:par>
+    </p:tnLst>
+  </p:timing>
 </p:sld>
 </file>
 
 <file path=ppt/slides/slide22.xml><?xml version="1.0" encoding="utf-8"?>
-<p:sld xmlns:a="http://schemas.openxmlformats.org/drawingml/2006/main" xmlns:r="http://schemas.openxmlformats.org/officeDocument/2006/relationships" xmlns:mc="http://schemas.openxmlformats.org/markup-compatibility/2006" xmlns:mv="urn:schemas-microsoft-com:mac:vml" xmlns:p="http://schemas.openxmlformats.org/presentationml/2006/main" mc:Ignorable="mv" mc:PreserveAttributes="mv:*">
-  <p:cSld>
-    <p:spTree>
-      <p:nvGrpSpPr>
-        <p:cNvPr id="1" name=""/>
-        <p:cNvGrpSpPr/>
-        <p:nvPr/>
-      </p:nvGrpSpPr>
-      <p:grpSpPr>
-        <a:xfrm>
-          <a:off x="0" y="0"/>
-          <a:ext cx="0" cy="0"/>
-          <a:chOff x="0" y="0"/>
-          <a:chExt cx="0" cy="0"/>
-        </a:xfrm>
-      </p:grpSpPr>
-      <p:sp>
-        <p:nvSpPr>
-          <p:cNvPr id="2" name="Title 1"/>
-          <p:cNvSpPr>
-            <a:spLocks noGrp="1"/>
-          </p:cNvSpPr>
-          <p:nvPr>
-            <p:ph type="title"/>
-          </p:nvPr>
-        </p:nvSpPr>
-        <p:spPr/>
-        <p:txBody>
-          <a:bodyPr/>
-          <a:lstStyle/>
-          <a:p>
-            <a:r>
-              <a:rPr lang="en-US" dirty="0" smtClean="0"/>
-              <a:t>Other items of interest</a:t>
-            </a:r>
-            <a:endParaRPr lang="en-US" dirty="0"/>
-          </a:p>
-        </p:txBody>
-      </p:sp>
-      <p:sp>
-        <p:nvSpPr>
-          <p:cNvPr id="3" name="Content Placeholder 2"/>
-          <p:cNvSpPr>
-            <a:spLocks noGrp="1"/>
-          </p:cNvSpPr>
-          <p:nvPr>
-            <p:ph idx="1"/>
-          </p:nvPr>
-        </p:nvSpPr>
-        <p:spPr/>
-        <p:txBody>
-          <a:bodyPr/>
-          <a:lstStyle/>
-          <a:p>
-            <a:r>
-              <a:rPr lang="en-US" dirty="0" smtClean="0"/>
-              <a:t>REPL</a:t>
-            </a:r>
-            <a:endParaRPr lang="en-US" dirty="0"/>
-          </a:p>
-        </p:txBody>
-      </p:sp>
-    </p:spTree>
-  </p:cSld>
-  <p:clrMapOvr>
-    <a:masterClrMapping/>
-  </p:clrMapOvr>
-</p:sld>
-</file>
-
-<file path=ppt/slides/slide23.xml><?xml version="1.0" encoding="utf-8"?>
 <p:sld xmlns:a="http://schemas.openxmlformats.org/drawingml/2006/main" xmlns:r="http://schemas.openxmlformats.org/officeDocument/2006/relationships" xmlns:mc="http://schemas.openxmlformats.org/markup-compatibility/2006" xmlns:mv="urn:schemas-microsoft-com:mac:vml" xmlns:p="http://schemas.openxmlformats.org/presentationml/2006/main" mc:Ignorable="mv" mc:PreserveAttributes="mv:*">
   <p:cSld>
     <p:spTree>
@@ -5646,21 +5666,13 @@
           <a:p>
             <a:r>
               <a:rPr lang="en-US" sz="4400" dirty="0" smtClean="0"/>
-              <a:t>Less code to deal with &amp; </a:t>
-            </a:r>
+              <a:t>Less code to deal with &amp; maintain</a:t>
+            </a:r>
+          </a:p>
+          <a:p>
             <a:r>
               <a:rPr lang="en-US" sz="4400" dirty="0" smtClean="0"/>
-              <a:t>maintain</a:t>
-            </a:r>
-          </a:p>
-          <a:p>
-            <a:r>
-              <a:rPr lang="en-US" sz="4400" dirty="0" smtClean="0"/>
-              <a:t>Elegant solution</a:t>
-            </a:r>
-            <a:r>
-              <a:rPr lang="en-US" sz="4400" dirty="0" smtClean="0"/>
-              <a:t> </a:t>
+              <a:t>Elegant solution </a:t>
             </a:r>
             <a:endParaRPr lang="en-US" sz="4400" dirty="0"/>
           </a:p>
@@ -5972,11 +5984,7 @@
           <a:p>
             <a:r>
               <a:rPr lang="en-US" dirty="0" smtClean="0"/>
-              <a:t>Closures are blocks of code </a:t>
-            </a:r>
-            <a:r>
-              <a:rPr lang="en-US" dirty="0" smtClean="0"/>
-              <a:t>that can be passed around as parameters</a:t>
+              <a:t>Closures are blocks of code that can be passed around as parameters</a:t>
             </a:r>
           </a:p>
           <a:p>
@@ -6066,6 +6074,13 @@
   <p:clrMapOvr>
     <a:masterClrMapping/>
   </p:clrMapOvr>
+  <p:timing>
+    <p:tnLst>
+      <p:par>
+        <p:cTn id="1" dur="indefinite" restart="never" nodeType="tmRoot"/>
+      </p:par>
+    </p:tnLst>
+  </p:timing>
 </p:sld>
 </file>
 

</xml_diff>

<commit_message>
Parallel Collections and ruby implementation
</commit_message>
<xml_diff>
--- a/Scala_Away_Day.pptx
+++ b/Scala_Away_Day.pptx
@@ -1214,6 +1214,362 @@
 </file>
 
 <file path=ppt/notesSlides/notesSlide8.xml><?xml version="1.0" encoding="utf-8"?>
+<p:notes xmlns:a="http://schemas.openxmlformats.org/drawingml/2006/main" xmlns:r="http://schemas.openxmlformats.org/officeDocument/2006/relationships" xmlns:mc="http://schemas.openxmlformats.org/markup-compatibility/2006" xmlns:mv="urn:schemas-microsoft-com:mac:vml" xmlns:p="http://schemas.openxmlformats.org/presentationml/2006/main" mc:Ignorable="mv" mc:PreserveAttributes="mv:*">
+  <p:cSld>
+    <p:spTree>
+      <p:nvGrpSpPr>
+        <p:cNvPr id="1" name=""/>
+        <p:cNvGrpSpPr/>
+        <p:nvPr/>
+      </p:nvGrpSpPr>
+      <p:grpSpPr>
+        <a:xfrm>
+          <a:off x="0" y="0"/>
+          <a:ext cx="0" cy="0"/>
+          <a:chOff x="0" y="0"/>
+          <a:chExt cx="0" cy="0"/>
+        </a:xfrm>
+      </p:grpSpPr>
+      <p:sp>
+        <p:nvSpPr>
+          <p:cNvPr id="2" name="Slide Image Placeholder 1"/>
+          <p:cNvSpPr>
+            <a:spLocks noGrp="1" noRot="1" noChangeAspect="1"/>
+          </p:cNvSpPr>
+          <p:nvPr>
+            <p:ph type="sldImg"/>
+          </p:nvPr>
+        </p:nvSpPr>
+        <p:spPr/>
+      </p:sp>
+      <p:sp>
+        <p:nvSpPr>
+          <p:cNvPr id="3" name="Notes Placeholder 2"/>
+          <p:cNvSpPr>
+            <a:spLocks noGrp="1"/>
+          </p:cNvSpPr>
+          <p:nvPr>
+            <p:ph type="body" idx="1"/>
+          </p:nvPr>
+        </p:nvSpPr>
+        <p:spPr/>
+        <p:txBody>
+          <a:bodyPr>
+            <a:normAutofit fontScale="92500" lnSpcReduction="10000"/>
+          </a:bodyPr>
+          <a:lstStyle/>
+          <a:p>
+            <a:r>
+              <a:rPr lang="en-US" dirty="0" smtClean="0"/>
+              <a:t>Examples</a:t>
+            </a:r>
+            <a:r>
+              <a:rPr lang="en-US" baseline="0" dirty="0" smtClean="0"/>
+              <a:t> of parallel operations: filtering a collection, removing certain elements, searching elements from a collection, sorting a collection, selecting max of </a:t>
+            </a:r>
+            <a:r>
+              <a:rPr lang="en-US" baseline="0" smtClean="0"/>
+              <a:t>an array</a:t>
+            </a:r>
+          </a:p>
+          <a:p>
+            <a:endParaRPr lang="en-US" dirty="0" smtClean="0"/>
+          </a:p>
+          <a:p>
+            <a:r>
+              <a:rPr lang="en-US" dirty="0" err="1" smtClean="0"/>
+              <a:t>Scala</a:t>
+            </a:r>
+            <a:r>
+              <a:rPr lang="en-US" dirty="0" smtClean="0"/>
+              <a:t> by default uses </a:t>
+            </a:r>
+            <a:r>
+              <a:rPr lang="en-US" sz="1200" kern="1200" dirty="0" err="1" smtClean="0">
+                <a:solidFill>
+                  <a:schemeClr val="tx1"/>
+                </a:solidFill>
+                <a:latin typeface="+mn-lt"/>
+                <a:ea typeface="+mn-ea"/>
+                <a:cs typeface="+mn-cs"/>
+              </a:rPr>
+              <a:t>ForkJoin</a:t>
+            </a:r>
+            <a:r>
+              <a:rPr lang="en-US" sz="1200" kern="1200" baseline="0" dirty="0" smtClean="0">
+                <a:solidFill>
+                  <a:schemeClr val="tx1"/>
+                </a:solidFill>
+                <a:latin typeface="+mn-lt"/>
+                <a:ea typeface="+mn-ea"/>
+                <a:cs typeface="+mn-cs"/>
+              </a:rPr>
+              <a:t> framework underneath on Java 1.6 and greater. For 1.5 it falls back to </a:t>
+            </a:r>
+            <a:r>
+              <a:rPr lang="en-US" sz="1200" kern="1200" baseline="0" dirty="0" err="1" smtClean="0">
+                <a:solidFill>
+                  <a:schemeClr val="tx1"/>
+                </a:solidFill>
+                <a:latin typeface="+mn-lt"/>
+                <a:ea typeface="+mn-ea"/>
+                <a:cs typeface="+mn-cs"/>
+              </a:rPr>
+              <a:t>ThreadPoolExecutor</a:t>
+            </a:r>
+            <a:r>
+              <a:rPr lang="en-US" sz="1200" kern="1200" baseline="0" dirty="0" smtClean="0">
+                <a:solidFill>
+                  <a:schemeClr val="tx1"/>
+                </a:solidFill>
+                <a:latin typeface="+mn-lt"/>
+                <a:ea typeface="+mn-ea"/>
+                <a:cs typeface="+mn-cs"/>
+              </a:rPr>
+              <a:t>.</a:t>
+            </a:r>
+          </a:p>
+          <a:p>
+            <a:endParaRPr lang="en-US" sz="1200" kern="1200" baseline="0" dirty="0" smtClean="0">
+              <a:solidFill>
+                <a:schemeClr val="tx1"/>
+              </a:solidFill>
+              <a:latin typeface="+mn-lt"/>
+              <a:ea typeface="+mn-ea"/>
+              <a:cs typeface="+mn-cs"/>
+            </a:endParaRPr>
+          </a:p>
+          <a:p>
+            <a:r>
+              <a:rPr lang="en-US" sz="1200" kern="1200" baseline="0" dirty="0" smtClean="0">
+                <a:solidFill>
+                  <a:schemeClr val="tx1"/>
+                </a:solidFill>
+                <a:latin typeface="+mn-lt"/>
+                <a:ea typeface="+mn-ea"/>
+                <a:cs typeface="+mn-cs"/>
+              </a:rPr>
+              <a:t>The collection is broken down in partitions and will be generally reassembled in the same order.</a:t>
+            </a:r>
+          </a:p>
+          <a:p>
+            <a:endParaRPr lang="en-US" sz="1200" kern="1200" baseline="0" dirty="0" smtClean="0">
+              <a:solidFill>
+                <a:schemeClr val="tx1"/>
+              </a:solidFill>
+              <a:latin typeface="+mn-lt"/>
+              <a:ea typeface="+mn-ea"/>
+              <a:cs typeface="+mn-cs"/>
+            </a:endParaRPr>
+          </a:p>
+          <a:p>
+            <a:r>
+              <a:rPr lang="en-US" sz="1200" kern="1200" baseline="0" dirty="0" smtClean="0">
+                <a:solidFill>
+                  <a:schemeClr val="tx1"/>
+                </a:solidFill>
+                <a:latin typeface="+mn-lt"/>
+                <a:ea typeface="+mn-ea"/>
+                <a:cs typeface="+mn-cs"/>
+              </a:rPr>
+              <a:t>Remember this is a framework not a set of collections. You could create your own if you implement the combiner and splitter.</a:t>
+            </a:r>
+          </a:p>
+          <a:p>
+            <a:endParaRPr lang="en-US" sz="1200" kern="1200" baseline="0" dirty="0" smtClean="0">
+              <a:solidFill>
+                <a:schemeClr val="tx1"/>
+              </a:solidFill>
+              <a:latin typeface="+mn-lt"/>
+              <a:ea typeface="+mn-ea"/>
+              <a:cs typeface="+mn-cs"/>
+            </a:endParaRPr>
+          </a:p>
+          <a:p>
+            <a:r>
+              <a:rPr lang="en-US" sz="1200" kern="1200" baseline="0" dirty="0" smtClean="0">
+                <a:solidFill>
+                  <a:schemeClr val="tx1"/>
+                </a:solidFill>
+                <a:latin typeface="+mn-lt"/>
+                <a:ea typeface="+mn-ea"/>
+                <a:cs typeface="+mn-cs"/>
+              </a:rPr>
+              <a:t>Sometimes sequential processing is going to be faster because in parallel processing there is a cost associated with spitting the input and combining the results.</a:t>
+            </a:r>
+          </a:p>
+          <a:p>
+            <a:endParaRPr lang="en-US" sz="1200" kern="1200" baseline="0" dirty="0" smtClean="0">
+              <a:solidFill>
+                <a:schemeClr val="tx1"/>
+              </a:solidFill>
+              <a:latin typeface="+mn-lt"/>
+              <a:ea typeface="+mn-ea"/>
+              <a:cs typeface="+mn-cs"/>
+            </a:endParaRPr>
+          </a:p>
+          <a:p>
+            <a:r>
+              <a:rPr lang="en-US" sz="1200" kern="1200" baseline="0" dirty="0" smtClean="0">
+                <a:solidFill>
+                  <a:schemeClr val="tx1"/>
+                </a:solidFill>
+                <a:latin typeface="+mn-lt"/>
+                <a:ea typeface="+mn-ea"/>
+                <a:cs typeface="+mn-cs"/>
+              </a:rPr>
+              <a:t>Concurrent collections are collections that can be concurrently modified. Parallel collections are collections that can be processed in </a:t>
+            </a:r>
+            <a:r>
+              <a:rPr lang="en-US" sz="1200" kern="1200" baseline="0" dirty="0" err="1" smtClean="0">
+                <a:solidFill>
+                  <a:schemeClr val="tx1"/>
+                </a:solidFill>
+                <a:latin typeface="+mn-lt"/>
+                <a:ea typeface="+mn-ea"/>
+                <a:cs typeface="+mn-cs"/>
+              </a:rPr>
+              <a:t>parallell</a:t>
+            </a:r>
+            <a:r>
+              <a:rPr lang="en-US" sz="1200" kern="1200" baseline="0" dirty="0" smtClean="0">
+                <a:solidFill>
+                  <a:schemeClr val="tx1"/>
+                </a:solidFill>
+                <a:latin typeface="+mn-lt"/>
+                <a:ea typeface="+mn-ea"/>
+                <a:cs typeface="+mn-cs"/>
+              </a:rPr>
+              <a:t>.</a:t>
+            </a:r>
+          </a:p>
+          <a:p>
+            <a:endParaRPr lang="en-US" sz="1200" kern="1200" baseline="0" dirty="0" smtClean="0">
+              <a:solidFill>
+                <a:schemeClr val="tx1"/>
+              </a:solidFill>
+              <a:latin typeface="+mn-lt"/>
+              <a:ea typeface="+mn-ea"/>
+              <a:cs typeface="+mn-cs"/>
+            </a:endParaRPr>
+          </a:p>
+          <a:p>
+            <a:r>
+              <a:rPr lang="en-US" sz="1200" kern="1200" baseline="0" dirty="0" smtClean="0">
+                <a:solidFill>
+                  <a:schemeClr val="tx1"/>
+                </a:solidFill>
+                <a:latin typeface="+mn-lt"/>
+                <a:ea typeface="+mn-ea"/>
+                <a:cs typeface="+mn-cs"/>
+              </a:rPr>
+              <a:t>One key difference is that F-J seems to be designed to work on a single Java VM, while M-R is explicitly designed to work on a large cluster of machines. These are very different scenarios.</a:t>
+            </a:r>
+          </a:p>
+          <a:p>
+            <a:endParaRPr lang="en-US" sz="1200" kern="1200" baseline="0" dirty="0" smtClean="0">
+              <a:solidFill>
+                <a:schemeClr val="tx1"/>
+              </a:solidFill>
+              <a:latin typeface="+mn-lt"/>
+              <a:ea typeface="+mn-ea"/>
+              <a:cs typeface="+mn-cs"/>
+            </a:endParaRPr>
+          </a:p>
+          <a:p>
+            <a:r>
+              <a:rPr lang="en-US" sz="1200" kern="1200" baseline="0" dirty="0" smtClean="0">
+                <a:solidFill>
+                  <a:schemeClr val="tx1"/>
+                </a:solidFill>
+                <a:latin typeface="+mn-lt"/>
+                <a:ea typeface="+mn-ea"/>
+                <a:cs typeface="+mn-cs"/>
+              </a:rPr>
+              <a:t>F-J = Fork/Join; M-R = Map/Reduce</a:t>
+            </a:r>
+          </a:p>
+          <a:p>
+            <a:endParaRPr lang="en-US" sz="1200" kern="1200" baseline="0" dirty="0" smtClean="0">
+              <a:solidFill>
+                <a:schemeClr val="tx1"/>
+              </a:solidFill>
+              <a:latin typeface="+mn-lt"/>
+              <a:ea typeface="+mn-ea"/>
+              <a:cs typeface="+mn-cs"/>
+            </a:endParaRPr>
+          </a:p>
+          <a:p>
+            <a:r>
+              <a:rPr lang="en-US" sz="1200" kern="1200" baseline="0" dirty="0" smtClean="0">
+                <a:solidFill>
+                  <a:schemeClr val="tx1"/>
+                </a:solidFill>
+                <a:latin typeface="+mn-lt"/>
+                <a:ea typeface="+mn-ea"/>
+                <a:cs typeface="+mn-cs"/>
+              </a:rPr>
+              <a:t>F-J offers facilities to partition a task into several subtasks, in a recursive-looking fashion; more tiers, possibility of 'inter-fork' communication at this stage, much more traditional programming. Does not extend (at least in the paper) beyond a single machine. Great for taking advantage of your eight-core.</a:t>
+            </a:r>
+          </a:p>
+          <a:p>
+            <a:endParaRPr lang="en-US" sz="1200" kern="1200" baseline="0" dirty="0" smtClean="0">
+              <a:solidFill>
+                <a:schemeClr val="tx1"/>
+              </a:solidFill>
+              <a:latin typeface="+mn-lt"/>
+              <a:ea typeface="+mn-ea"/>
+              <a:cs typeface="+mn-cs"/>
+            </a:endParaRPr>
+          </a:p>
+          <a:p>
+            <a:r>
+              <a:rPr lang="en-US" sz="1200" kern="1200" baseline="0" dirty="0" smtClean="0">
+                <a:solidFill>
+                  <a:schemeClr val="tx1"/>
+                </a:solidFill>
+                <a:latin typeface="+mn-lt"/>
+                <a:ea typeface="+mn-ea"/>
+                <a:cs typeface="+mn-cs"/>
+              </a:rPr>
+              <a:t>M-R only does one big split, with the mapped splits not talking between each other at all, and then reduces everything together. A single tier, no inter-split communication until reduce, and massively scalable. Great for taking advantage of your share of the cloud.</a:t>
+            </a:r>
+          </a:p>
+        </p:txBody>
+      </p:sp>
+      <p:sp>
+        <p:nvSpPr>
+          <p:cNvPr id="4" name="Slide Number Placeholder 3"/>
+          <p:cNvSpPr>
+            <a:spLocks noGrp="1"/>
+          </p:cNvSpPr>
+          <p:nvPr>
+            <p:ph type="sldNum" sz="quarter" idx="10"/>
+          </p:nvPr>
+        </p:nvSpPr>
+        <p:spPr/>
+        <p:txBody>
+          <a:bodyPr/>
+          <a:lstStyle/>
+          <a:p>
+            <a:fld id="{765C5218-4828-B544-9955-A4B6719EC9E2}" type="slidenum">
+              <a:rPr lang="en-US" smtClean="0"/>
+              <a:pPr/>
+              <a:t>18</a:t>
+            </a:fld>
+            <a:endParaRPr lang="en-US"/>
+          </a:p>
+        </p:txBody>
+      </p:sp>
+    </p:spTree>
+  </p:cSld>
+  <p:clrMapOvr>
+    <a:masterClrMapping/>
+  </p:clrMapOvr>
+</p:notes>
+</file>
+
+<file path=ppt/notesSlides/notesSlide9.xml><?xml version="1.0" encoding="utf-8"?>
 <p:notes xmlns:a="http://schemas.openxmlformats.org/drawingml/2006/main" xmlns:r="http://schemas.openxmlformats.org/officeDocument/2006/relationships" xmlns:mc="http://schemas.openxmlformats.org/markup-compatibility/2006" xmlns:mv="urn:schemas-microsoft-com:mac:vml" xmlns:p="http://schemas.openxmlformats.org/presentationml/2006/main" mc:Ignorable="mv" mc:PreserveAttributes="mv:*">
   <p:cSld>
     <p:spTree>
@@ -5012,25 +5368,30 @@
           </a:p>
         </p:txBody>
       </p:sp>
-      <p:sp>
-        <p:nvSpPr>
-          <p:cNvPr id="3" name="Content Placeholder 2"/>
-          <p:cNvSpPr>
-            <a:spLocks noGrp="1"/>
-          </p:cNvSpPr>
+      <p:pic>
+        <p:nvPicPr>
+          <p:cNvPr id="4" name="Content Placeholder 3" descr="scala_parallel_collections.tiff"/>
+          <p:cNvPicPr>
+            <a:picLocks noGrp="1" noChangeAspect="1"/>
+          </p:cNvPicPr>
           <p:nvPr>
             <p:ph idx="1"/>
           </p:nvPr>
-        </p:nvSpPr>
-        <p:spPr/>
-        <p:txBody>
-          <a:bodyPr/>
-          <a:lstStyle/>
-          <a:p>
-            <a:endParaRPr lang="en-US"/>
-          </a:p>
-        </p:txBody>
-      </p:sp>
+        </p:nvPicPr>
+        <p:blipFill>
+          <a:blip r:embed="rId3"/>
+          <a:srcRect t="-81710" b="-81710"/>
+          <a:stretch>
+            <a:fillRect/>
+          </a:stretch>
+        </p:blipFill>
+        <p:spPr>
+          <a:xfrm>
+            <a:off x="457200" y="1628738"/>
+            <a:ext cx="8229600" cy="4525963"/>
+          </a:xfrm>
+        </p:spPr>
+      </p:pic>
     </p:spTree>
   </p:cSld>
   <p:clrMapOvr>
@@ -5270,8 +5631,31 @@
           <a:p>
             <a:r>
               <a:rPr lang="en-US" dirty="0" smtClean="0"/>
-              <a:t>Slow compiler</a:t>
-            </a:r>
+              <a:t>Slow </a:t>
+            </a:r>
+            <a:r>
+              <a:rPr lang="en-US" dirty="0" smtClean="0"/>
+              <a:t>compiler</a:t>
+            </a:r>
+          </a:p>
+          <a:p>
+            <a:pPr lvl="1"/>
+            <a:r>
+              <a:rPr lang="en-US" dirty="0" smtClean="0"/>
+              <a:t>Daemon compiler</a:t>
+            </a:r>
+          </a:p>
+          <a:p>
+            <a:pPr lvl="1"/>
+            <a:r>
+              <a:rPr lang="en-US" dirty="0" err="1" smtClean="0"/>
+              <a:t>sbt</a:t>
+            </a:r>
+            <a:r>
+              <a:rPr lang="en-US" dirty="0" smtClean="0"/>
+              <a:t> incremental compilation</a:t>
+            </a:r>
+            <a:endParaRPr lang="en-US" dirty="0" smtClean="0"/>
           </a:p>
           <a:p>
             <a:r>

</xml_diff>

<commit_message>
super awesome actor program
</commit_message>
<xml_diff>
--- a/Scala_Away_Day.pptx
+++ b/Scala_Away_Day.pptx
@@ -586,6 +586,112 @@
 </p:notes>
 </file>
 
+<file path=ppt/notesSlides/notesSlide10.xml><?xml version="1.0" encoding="utf-8"?>
+<p:notes xmlns:a="http://schemas.openxmlformats.org/drawingml/2006/main" xmlns:r="http://schemas.openxmlformats.org/officeDocument/2006/relationships" xmlns:mc="http://schemas.openxmlformats.org/markup-compatibility/2006" xmlns:mv="urn:schemas-microsoft-com:mac:vml" xmlns:p="http://schemas.openxmlformats.org/presentationml/2006/main" mc:Ignorable="mv" mc:PreserveAttributes="mv:*">
+  <p:cSld>
+    <p:spTree>
+      <p:nvGrpSpPr>
+        <p:cNvPr id="1" name=""/>
+        <p:cNvGrpSpPr/>
+        <p:nvPr/>
+      </p:nvGrpSpPr>
+      <p:grpSpPr>
+        <a:xfrm>
+          <a:off x="0" y="0"/>
+          <a:ext cx="0" cy="0"/>
+          <a:chOff x="0" y="0"/>
+          <a:chExt cx="0" cy="0"/>
+        </a:xfrm>
+      </p:grpSpPr>
+      <p:sp>
+        <p:nvSpPr>
+          <p:cNvPr id="2" name="Slide Image Placeholder 1"/>
+          <p:cNvSpPr>
+            <a:spLocks noGrp="1" noRot="1" noChangeAspect="1"/>
+          </p:cNvSpPr>
+          <p:nvPr>
+            <p:ph type="sldImg"/>
+          </p:nvPr>
+        </p:nvSpPr>
+        <p:spPr/>
+      </p:sp>
+      <p:sp>
+        <p:nvSpPr>
+          <p:cNvPr id="3" name="Notes Placeholder 2"/>
+          <p:cNvSpPr>
+            <a:spLocks noGrp="1"/>
+          </p:cNvSpPr>
+          <p:nvPr>
+            <p:ph type="body" idx="1"/>
+          </p:nvPr>
+        </p:nvSpPr>
+        <p:spPr/>
+        <p:txBody>
+          <a:bodyPr>
+            <a:normAutofit/>
+          </a:bodyPr>
+          <a:lstStyle/>
+          <a:p>
+            <a:r>
+              <a:rPr lang="en-US" dirty="0" smtClean="0"/>
+              <a:t>I visited</a:t>
+            </a:r>
+            <a:r>
+              <a:rPr lang="en-US" baseline="0" dirty="0" smtClean="0"/>
+              <a:t> the Met a couple of months ago and I saw this intricately hand woven Persian rug. What caught my eye was this phrase “Functional yet beautiful”. I like how the attribute of being functional came before beautiful. Something has to be functional first before being beautiful. And just because it is functional does not mean it has to be any less beautiful. And that is what </a:t>
+            </a:r>
+            <a:r>
+              <a:rPr lang="en-US" baseline="0" dirty="0" err="1" smtClean="0"/>
+              <a:t>Scala</a:t>
+            </a:r>
+            <a:r>
+              <a:rPr lang="en-US" baseline="0" dirty="0" smtClean="0"/>
+              <a:t> means to me. Functional (pun intended), </a:t>
+            </a:r>
+            <a:r>
+              <a:rPr lang="en-US" baseline="0" dirty="0" err="1" smtClean="0"/>
+              <a:t>performant</a:t>
+            </a:r>
+            <a:r>
+              <a:rPr lang="en-US" baseline="0" dirty="0" smtClean="0"/>
+              <a:t> yet beautiful.</a:t>
+            </a:r>
+            <a:endParaRPr lang="en-US" dirty="0"/>
+          </a:p>
+        </p:txBody>
+      </p:sp>
+      <p:sp>
+        <p:nvSpPr>
+          <p:cNvPr id="4" name="Slide Number Placeholder 3"/>
+          <p:cNvSpPr>
+            <a:spLocks noGrp="1"/>
+          </p:cNvSpPr>
+          <p:nvPr>
+            <p:ph type="sldNum" sz="quarter" idx="10"/>
+          </p:nvPr>
+        </p:nvSpPr>
+        <p:spPr/>
+        <p:txBody>
+          <a:bodyPr/>
+          <a:lstStyle/>
+          <a:p>
+            <a:fld id="{765C5218-4828-B544-9955-A4B6719EC9E2}" type="slidenum">
+              <a:rPr lang="en-US" smtClean="0"/>
+              <a:pPr/>
+              <a:t>22</a:t>
+            </a:fld>
+            <a:endParaRPr lang="en-US"/>
+          </a:p>
+        </p:txBody>
+      </p:sp>
+    </p:spTree>
+  </p:cSld>
+  <p:clrMapOvr>
+    <a:masterClrMapping/>
+  </p:clrMapOvr>
+</p:notes>
+</file>
+
 <file path=ppt/notesSlides/notesSlide2.xml><?xml version="1.0" encoding="utf-8"?>
 <p:notes xmlns:a="http://schemas.openxmlformats.org/drawingml/2006/main" xmlns:r="http://schemas.openxmlformats.org/officeDocument/2006/relationships" xmlns:mc="http://schemas.openxmlformats.org/markup-compatibility/2006" xmlns:mv="urn:schemas-microsoft-com:mac:vml" xmlns:p="http://schemas.openxmlformats.org/presentationml/2006/main" mc:Ignorable="mv" mc:PreserveAttributes="mv:*">
   <p:cSld>
@@ -1658,29 +1764,43 @@
           <a:p>
             <a:r>
               <a:rPr lang="en-US" dirty="0" smtClean="0"/>
-              <a:t>I visited</a:t>
+              <a:t>Actors are higher level concurrency</a:t>
             </a:r>
             <a:r>
               <a:rPr lang="en-US" baseline="0" dirty="0" smtClean="0"/>
-              <a:t> the Met a couple of months ago and I saw this intricately hand woven Persian rug. What caught my eye was this phrase “Functional yet beautiful”. I like how the attribute of being functional came before beautiful. Something has to be functional first before being beautiful. And just because it is functional does not mean it has to be any less beautiful. And that is what </a:t>
-            </a:r>
-            <a:r>
-              <a:rPr lang="en-US" baseline="0" dirty="0" err="1" smtClean="0"/>
-              <a:t>Scala</a:t>
-            </a:r>
+              <a:t> constructs</a:t>
+            </a:r>
+          </a:p>
+          <a:p>
+            <a:endParaRPr lang="en-US" baseline="0" dirty="0" smtClean="0"/>
+          </a:p>
+          <a:p>
             <a:r>
               <a:rPr lang="en-US" baseline="0" dirty="0" smtClean="0"/>
-              <a:t> means to me. Functional (pun intended), </a:t>
-            </a:r>
-            <a:r>
-              <a:rPr lang="en-US" baseline="0" dirty="0" err="1" smtClean="0"/>
-              <a:t>performant</a:t>
-            </a:r>
+              <a:t>Provide pattern matching</a:t>
+            </a:r>
+          </a:p>
+          <a:p>
+            <a:endParaRPr lang="en-US" baseline="0" dirty="0" smtClean="0"/>
+          </a:p>
+          <a:p>
             <a:r>
               <a:rPr lang="en-US" baseline="0" dirty="0" smtClean="0"/>
-              <a:t> yet beautiful.</a:t>
-            </a:r>
-            <a:endParaRPr lang="en-US" dirty="0"/>
+              <a:t>Actors are light-weight than threads? Stack frames? Locking mechanisms?</a:t>
+            </a:r>
+          </a:p>
+          <a:p>
+            <a:endParaRPr lang="en-US" baseline="0" dirty="0" smtClean="0"/>
+          </a:p>
+          <a:p>
+            <a:r>
+              <a:rPr lang="en-US" baseline="0" dirty="0" smtClean="0"/>
+              <a:t>How do they compare in performance </a:t>
+            </a:r>
+            <a:r>
+              <a:rPr lang="en-US" baseline="0" smtClean="0"/>
+              <a:t>to Threads</a:t>
+            </a:r>
           </a:p>
         </p:txBody>
       </p:sp>
@@ -1702,7 +1822,7 @@
             <a:fld id="{765C5218-4828-B544-9955-A4B6719EC9E2}" type="slidenum">
               <a:rPr lang="en-US" smtClean="0"/>
               <a:pPr/>
-              <a:t>22</a:t>
+              <a:t>19</a:t>
             </a:fld>
             <a:endParaRPr lang="en-US"/>
           </a:p>

</xml_diff>

<commit_message>
typos and ppt improvement
</commit_message>
<xml_diff>
--- a/Scala_Away_Day.pptx
+++ b/Scala_Away_Day.pptx
@@ -5,7 +5,7 @@
     <p:sldMasterId id="2147483648" r:id="rId1"/>
   </p:sldMasterIdLst>
   <p:notesMasterIdLst>
-    <p:notesMasterId r:id="rId24"/>
+    <p:notesMasterId r:id="rId27"/>
   </p:notesMasterIdLst>
   <p:sldIdLst>
     <p:sldId id="256" r:id="rId2"/>
@@ -23,13 +23,16 @@
     <p:sldId id="278" r:id="rId14"/>
     <p:sldId id="265" r:id="rId15"/>
     <p:sldId id="266" r:id="rId16"/>
-    <p:sldId id="267" r:id="rId17"/>
+    <p:sldId id="283" r:id="rId17"/>
     <p:sldId id="268" r:id="rId18"/>
     <p:sldId id="269" r:id="rId19"/>
-    <p:sldId id="270" r:id="rId20"/>
-    <p:sldId id="271" r:id="rId21"/>
-    <p:sldId id="272" r:id="rId22"/>
-    <p:sldId id="262" r:id="rId23"/>
+    <p:sldId id="284" r:id="rId20"/>
+    <p:sldId id="270" r:id="rId21"/>
+    <p:sldId id="285" r:id="rId22"/>
+    <p:sldId id="271" r:id="rId23"/>
+    <p:sldId id="272" r:id="rId24"/>
+    <p:sldId id="262" r:id="rId25"/>
+    <p:sldId id="282" r:id="rId26"/>
   </p:sldIdLst>
   <p:sldSz cx="9144000" cy="6858000" type="screen4x3"/>
   <p:notesSz cx="6858000" cy="9144000"/>
@@ -634,6 +637,256 @@
           <a:p>
             <a:r>
               <a:rPr lang="en-US" dirty="0" smtClean="0"/>
+              <a:t>Actors are higher level concurrency</a:t>
+            </a:r>
+            <a:r>
+              <a:rPr lang="en-US" baseline="0" dirty="0" smtClean="0"/>
+              <a:t> constructs</a:t>
+            </a:r>
+          </a:p>
+          <a:p>
+            <a:endParaRPr lang="en-US" baseline="0" dirty="0" smtClean="0"/>
+          </a:p>
+          <a:p>
+            <a:r>
+              <a:rPr lang="en-US" baseline="0" dirty="0" smtClean="0"/>
+              <a:t>Actors communicate via message passing</a:t>
+            </a:r>
+          </a:p>
+          <a:p>
+            <a:endParaRPr lang="en-US" baseline="0" dirty="0" smtClean="0"/>
+          </a:p>
+          <a:p>
+            <a:r>
+              <a:rPr lang="en-US" baseline="0" dirty="0" smtClean="0"/>
+              <a:t>Messages are identified via pattern matching</a:t>
+            </a:r>
+          </a:p>
+          <a:p>
+            <a:endParaRPr lang="en-US" baseline="0" dirty="0" smtClean="0"/>
+          </a:p>
+          <a:p>
+            <a:r>
+              <a:rPr lang="en-US" baseline="0" dirty="0" smtClean="0"/>
+              <a:t>Actors are light-weight than threads? Stack frames? Locking mechanisms?</a:t>
+            </a:r>
+          </a:p>
+          <a:p>
+            <a:endParaRPr lang="en-US" baseline="0" dirty="0" smtClean="0"/>
+          </a:p>
+          <a:p>
+            <a:r>
+              <a:rPr lang="en-US" baseline="0" dirty="0" smtClean="0"/>
+              <a:t>Thread-based actors </a:t>
+            </a:r>
+            <a:r>
+              <a:rPr lang="en-US" baseline="0" dirty="0" err="1" smtClean="0"/>
+              <a:t>vs</a:t>
+            </a:r>
+            <a:r>
+              <a:rPr lang="en-US" baseline="0" dirty="0" smtClean="0"/>
+              <a:t> Event based actors</a:t>
+            </a:r>
+          </a:p>
+          <a:p>
+            <a:endParaRPr lang="en-US" baseline="0" dirty="0" smtClean="0"/>
+          </a:p>
+          <a:p>
+            <a:r>
+              <a:rPr lang="en-US" baseline="0" dirty="0" smtClean="0"/>
+              <a:t>Thread based actors block a thread </a:t>
+            </a:r>
+            <a:r>
+              <a:rPr lang="en-US" baseline="0" dirty="0" err="1" smtClean="0"/>
+              <a:t>vs</a:t>
+            </a:r>
+            <a:r>
+              <a:rPr lang="en-US" baseline="0" dirty="0" smtClean="0"/>
+              <a:t> Event based actors reuse a pool of threads. Generally it is a good idea to go with event based model. But if your actor receives too many messages and is short-lived event based model might not be the right choice.</a:t>
+            </a:r>
+          </a:p>
+          <a:p>
+            <a:endParaRPr lang="en-US" baseline="0" dirty="0" smtClean="0"/>
+          </a:p>
+          <a:p>
+            <a:r>
+              <a:rPr lang="en-US" baseline="0" dirty="0" smtClean="0"/>
+              <a:t>How do they compare in performance to Thread</a:t>
+            </a:r>
+          </a:p>
+          <a:p>
+            <a:endParaRPr lang="en-US" baseline="0" dirty="0" smtClean="0"/>
+          </a:p>
+          <a:p>
+            <a:r>
+              <a:rPr lang="en-US" baseline="0" dirty="0" smtClean="0"/>
+              <a:t>Actors can be remote</a:t>
+            </a:r>
+          </a:p>
+        </p:txBody>
+      </p:sp>
+      <p:sp>
+        <p:nvSpPr>
+          <p:cNvPr id="4" name="Slide Number Placeholder 3"/>
+          <p:cNvSpPr>
+            <a:spLocks noGrp="1"/>
+          </p:cNvSpPr>
+          <p:nvPr>
+            <p:ph type="sldNum" sz="quarter" idx="10"/>
+          </p:nvPr>
+        </p:nvSpPr>
+        <p:spPr/>
+        <p:txBody>
+          <a:bodyPr/>
+          <a:lstStyle/>
+          <a:p>
+            <a:fld id="{765C5218-4828-B544-9955-A4B6719EC9E2}" type="slidenum">
+              <a:rPr lang="en-US" smtClean="0"/>
+              <a:pPr/>
+              <a:t>20</a:t>
+            </a:fld>
+            <a:endParaRPr lang="en-US"/>
+          </a:p>
+        </p:txBody>
+      </p:sp>
+    </p:spTree>
+  </p:cSld>
+  <p:clrMapOvr>
+    <a:masterClrMapping/>
+  </p:clrMapOvr>
+</p:notes>
+</file>
+
+<file path=ppt/notesSlides/notesSlide11.xml><?xml version="1.0" encoding="utf-8"?>
+<p:notes xmlns:a="http://schemas.openxmlformats.org/drawingml/2006/main" xmlns:r="http://schemas.openxmlformats.org/officeDocument/2006/relationships" xmlns:mc="http://schemas.openxmlformats.org/markup-compatibility/2006" xmlns:mv="urn:schemas-microsoft-com:mac:vml" xmlns:p="http://schemas.openxmlformats.org/presentationml/2006/main" mc:Ignorable="mv" mc:PreserveAttributes="mv:*">
+  <p:cSld>
+    <p:spTree>
+      <p:nvGrpSpPr>
+        <p:cNvPr id="1" name=""/>
+        <p:cNvGrpSpPr/>
+        <p:nvPr/>
+      </p:nvGrpSpPr>
+      <p:grpSpPr>
+        <a:xfrm>
+          <a:off x="0" y="0"/>
+          <a:ext cx="0" cy="0"/>
+          <a:chOff x="0" y="0"/>
+          <a:chExt cx="0" cy="0"/>
+        </a:xfrm>
+      </p:grpSpPr>
+      <p:sp>
+        <p:nvSpPr>
+          <p:cNvPr id="2" name="Slide Image Placeholder 1"/>
+          <p:cNvSpPr>
+            <a:spLocks noGrp="1" noRot="1" noChangeAspect="1"/>
+          </p:cNvSpPr>
+          <p:nvPr>
+            <p:ph type="sldImg"/>
+          </p:nvPr>
+        </p:nvSpPr>
+        <p:spPr/>
+      </p:sp>
+      <p:sp>
+        <p:nvSpPr>
+          <p:cNvPr id="3" name="Notes Placeholder 2"/>
+          <p:cNvSpPr>
+            <a:spLocks noGrp="1"/>
+          </p:cNvSpPr>
+          <p:nvPr>
+            <p:ph type="body" idx="1"/>
+          </p:nvPr>
+        </p:nvSpPr>
+        <p:spPr/>
+        <p:txBody>
+          <a:bodyPr>
+            <a:normAutofit/>
+          </a:bodyPr>
+          <a:lstStyle/>
+          <a:p>
+            <a:endParaRPr lang="en-US" dirty="0"/>
+          </a:p>
+        </p:txBody>
+      </p:sp>
+      <p:sp>
+        <p:nvSpPr>
+          <p:cNvPr id="4" name="Slide Number Placeholder 3"/>
+          <p:cNvSpPr>
+            <a:spLocks noGrp="1"/>
+          </p:cNvSpPr>
+          <p:nvPr>
+            <p:ph type="sldNum" sz="quarter" idx="10"/>
+          </p:nvPr>
+        </p:nvSpPr>
+        <p:spPr/>
+        <p:txBody>
+          <a:bodyPr/>
+          <a:lstStyle/>
+          <a:p>
+            <a:fld id="{765C5218-4828-B544-9955-A4B6719EC9E2}" type="slidenum">
+              <a:rPr lang="en-US" smtClean="0"/>
+              <a:pPr/>
+              <a:t>21</a:t>
+            </a:fld>
+            <a:endParaRPr lang="en-US"/>
+          </a:p>
+        </p:txBody>
+      </p:sp>
+    </p:spTree>
+  </p:cSld>
+  <p:clrMapOvr>
+    <a:masterClrMapping/>
+  </p:clrMapOvr>
+</p:notes>
+</file>
+
+<file path=ppt/notesSlides/notesSlide12.xml><?xml version="1.0" encoding="utf-8"?>
+<p:notes xmlns:a="http://schemas.openxmlformats.org/drawingml/2006/main" xmlns:r="http://schemas.openxmlformats.org/officeDocument/2006/relationships" xmlns:mc="http://schemas.openxmlformats.org/markup-compatibility/2006" xmlns:mv="urn:schemas-microsoft-com:mac:vml" xmlns:p="http://schemas.openxmlformats.org/presentationml/2006/main" mc:Ignorable="mv" mc:PreserveAttributes="mv:*">
+  <p:cSld>
+    <p:spTree>
+      <p:nvGrpSpPr>
+        <p:cNvPr id="1" name=""/>
+        <p:cNvGrpSpPr/>
+        <p:nvPr/>
+      </p:nvGrpSpPr>
+      <p:grpSpPr>
+        <a:xfrm>
+          <a:off x="0" y="0"/>
+          <a:ext cx="0" cy="0"/>
+          <a:chOff x="0" y="0"/>
+          <a:chExt cx="0" cy="0"/>
+        </a:xfrm>
+      </p:grpSpPr>
+      <p:sp>
+        <p:nvSpPr>
+          <p:cNvPr id="2" name="Slide Image Placeholder 1"/>
+          <p:cNvSpPr>
+            <a:spLocks noGrp="1" noRot="1" noChangeAspect="1"/>
+          </p:cNvSpPr>
+          <p:nvPr>
+            <p:ph type="sldImg"/>
+          </p:nvPr>
+        </p:nvSpPr>
+        <p:spPr/>
+      </p:sp>
+      <p:sp>
+        <p:nvSpPr>
+          <p:cNvPr id="3" name="Notes Placeholder 2"/>
+          <p:cNvSpPr>
+            <a:spLocks noGrp="1"/>
+          </p:cNvSpPr>
+          <p:nvPr>
+            <p:ph type="body" idx="1"/>
+          </p:nvPr>
+        </p:nvSpPr>
+        <p:spPr/>
+        <p:txBody>
+          <a:bodyPr>
+            <a:normAutofit/>
+          </a:bodyPr>
+          <a:lstStyle/>
+          <a:p>
+            <a:r>
+              <a:rPr lang="en-US" dirty="0" smtClean="0"/>
               <a:t>I visited</a:t>
             </a:r>
             <a:r>
@@ -678,7 +931,89 @@
             <a:fld id="{765C5218-4828-B544-9955-A4B6719EC9E2}" type="slidenum">
               <a:rPr lang="en-US" smtClean="0"/>
               <a:pPr/>
-              <a:t>22</a:t>
+              <a:t>24</a:t>
+            </a:fld>
+            <a:endParaRPr lang="en-US"/>
+          </a:p>
+        </p:txBody>
+      </p:sp>
+    </p:spTree>
+  </p:cSld>
+  <p:clrMapOvr>
+    <a:masterClrMapping/>
+  </p:clrMapOvr>
+</p:notes>
+</file>
+
+<file path=ppt/notesSlides/notesSlide13.xml><?xml version="1.0" encoding="utf-8"?>
+<p:notes xmlns:a="http://schemas.openxmlformats.org/drawingml/2006/main" xmlns:r="http://schemas.openxmlformats.org/officeDocument/2006/relationships" xmlns:mc="http://schemas.openxmlformats.org/markup-compatibility/2006" xmlns:mv="urn:schemas-microsoft-com:mac:vml" xmlns:p="http://schemas.openxmlformats.org/presentationml/2006/main" mc:Ignorable="mv" mc:PreserveAttributes="mv:*">
+  <p:cSld>
+    <p:spTree>
+      <p:nvGrpSpPr>
+        <p:cNvPr id="1" name=""/>
+        <p:cNvGrpSpPr/>
+        <p:nvPr/>
+      </p:nvGrpSpPr>
+      <p:grpSpPr>
+        <a:xfrm>
+          <a:off x="0" y="0"/>
+          <a:ext cx="0" cy="0"/>
+          <a:chOff x="0" y="0"/>
+          <a:chExt cx="0" cy="0"/>
+        </a:xfrm>
+      </p:grpSpPr>
+      <p:sp>
+        <p:nvSpPr>
+          <p:cNvPr id="2" name="Slide Image Placeholder 1"/>
+          <p:cNvSpPr>
+            <a:spLocks noGrp="1" noRot="1" noChangeAspect="1"/>
+          </p:cNvSpPr>
+          <p:nvPr>
+            <p:ph type="sldImg"/>
+          </p:nvPr>
+        </p:nvSpPr>
+        <p:spPr/>
+      </p:sp>
+      <p:sp>
+        <p:nvSpPr>
+          <p:cNvPr id="3" name="Notes Placeholder 2"/>
+          <p:cNvSpPr>
+            <a:spLocks noGrp="1"/>
+          </p:cNvSpPr>
+          <p:nvPr>
+            <p:ph type="body" idx="1"/>
+          </p:nvPr>
+        </p:nvSpPr>
+        <p:spPr/>
+        <p:txBody>
+          <a:bodyPr>
+            <a:normAutofit/>
+          </a:bodyPr>
+          <a:lstStyle/>
+          <a:p>
+            <a:endParaRPr lang="en-US" dirty="0"/>
+          </a:p>
+        </p:txBody>
+      </p:sp>
+      <p:sp>
+        <p:nvSpPr>
+          <p:cNvPr id="4" name="Slide Number Placeholder 3"/>
+          <p:cNvSpPr>
+            <a:spLocks noGrp="1"/>
+          </p:cNvSpPr>
+          <p:nvPr>
+            <p:ph type="sldNum" sz="quarter" idx="10"/>
+          </p:nvPr>
+        </p:nvSpPr>
+        <p:spPr/>
+        <p:txBody>
+          <a:bodyPr/>
+          <a:lstStyle/>
+          <a:p>
+            <a:fld id="{765C5218-4828-B544-9955-A4B6719EC9E2}" type="slidenum">
+              <a:rPr lang="en-US" smtClean="0"/>
+              <a:pPr/>
+              <a:t>25</a:t>
             </a:fld>
             <a:endParaRPr lang="en-US"/>
           </a:p>
@@ -1258,31 +1593,6 @@
           </a:bodyPr>
           <a:lstStyle/>
           <a:p>
-            <a:r>
-              <a:rPr lang="en-US" dirty="0" smtClean="0"/>
-              <a:t>* focus on </a:t>
-            </a:r>
-            <a:r>
-              <a:rPr lang="en-US" dirty="0" err="1" smtClean="0"/>
-              <a:t>DRYness</a:t>
-            </a:r>
-            <a:r>
-              <a:rPr lang="en-US" dirty="0" smtClean="0"/>
-              <a:t> - reducing boilerplate code</a:t>
-            </a:r>
-          </a:p>
-          <a:p>
-            <a:r>
-              <a:rPr lang="en-US" dirty="0" smtClean="0"/>
-              <a:t>	** less wordy - simple for loop doesn't require type and also </a:t>
-            </a:r>
-            <a:r>
-              <a:rPr lang="en-US" dirty="0" err="1" smtClean="0"/>
-              <a:t>val</a:t>
-            </a:r>
-            <a:endParaRPr lang="en-US" dirty="0" smtClean="0"/>
-          </a:p>
-          <a:p>
             <a:endParaRPr lang="en-US" dirty="0"/>
           </a:p>
         </p:txBody>
@@ -1762,45 +2072,7 @@
           </a:bodyPr>
           <a:lstStyle/>
           <a:p>
-            <a:r>
-              <a:rPr lang="en-US" dirty="0" smtClean="0"/>
-              <a:t>Actors are higher level concurrency</a:t>
-            </a:r>
-            <a:r>
-              <a:rPr lang="en-US" baseline="0" dirty="0" smtClean="0"/>
-              <a:t> constructs</a:t>
-            </a:r>
-          </a:p>
-          <a:p>
-            <a:endParaRPr lang="en-US" baseline="0" dirty="0" smtClean="0"/>
-          </a:p>
-          <a:p>
-            <a:r>
-              <a:rPr lang="en-US" baseline="0" dirty="0" smtClean="0"/>
-              <a:t>Provide pattern matching</a:t>
-            </a:r>
-          </a:p>
-          <a:p>
-            <a:endParaRPr lang="en-US" baseline="0" dirty="0" smtClean="0"/>
-          </a:p>
-          <a:p>
-            <a:r>
-              <a:rPr lang="en-US" baseline="0" dirty="0" smtClean="0"/>
-              <a:t>Actors are light-weight than threads? Stack frames? Locking mechanisms?</a:t>
-            </a:r>
-          </a:p>
-          <a:p>
-            <a:endParaRPr lang="en-US" baseline="0" dirty="0" smtClean="0"/>
-          </a:p>
-          <a:p>
-            <a:r>
-              <a:rPr lang="en-US" baseline="0" dirty="0" smtClean="0"/>
-              <a:t>How do they compare in performance </a:t>
-            </a:r>
-            <a:r>
-              <a:rPr lang="en-US" baseline="0" smtClean="0"/>
-              <a:t>to Threads</a:t>
-            </a:r>
+            <a:endParaRPr lang="en-US" dirty="0"/>
           </a:p>
         </p:txBody>
       </p:sp>
@@ -5382,7 +5654,7 @@
             <a:spLocks noGrp="1"/>
           </p:cNvSpPr>
           <p:nvPr>
-            <p:ph type="title"/>
+            <p:ph type="ctrTitle"/>
           </p:nvPr>
         </p:nvSpPr>
         <p:spPr/>
@@ -5392,7 +5664,7 @@
           <a:p>
             <a:r>
               <a:rPr lang="en-US" dirty="0" smtClean="0"/>
-              <a:t>Performance</a:t>
+              <a:t>Performance and Scalability constructs</a:t>
             </a:r>
             <a:endParaRPr lang="en-US" dirty="0"/>
           </a:p>
@@ -5400,22 +5672,20 @@
       </p:sp>
       <p:sp>
         <p:nvSpPr>
-          <p:cNvPr id="3" name="Content Placeholder 2"/>
-          <p:cNvSpPr>
-            <a:spLocks noGrp="1"/>
-          </p:cNvSpPr>
-          <p:nvPr>
-            <p:ph idx="1"/>
-          </p:nvPr>
-        </p:nvSpPr>
-        <p:spPr/>
-        <p:txBody>
-          <a:bodyPr>
-            <a:normAutofit/>
-          </a:bodyPr>
-          <a:lstStyle/>
-          <a:p>
-            <a:endParaRPr lang="en-US" sz="4400" dirty="0" smtClean="0"/>
+          <p:cNvPr id="3" name="Subtitle 2"/>
+          <p:cNvSpPr>
+            <a:spLocks noGrp="1"/>
+          </p:cNvSpPr>
+          <p:nvPr>
+            <p:ph type="subTitle" idx="1"/>
+          </p:nvPr>
+        </p:nvSpPr>
+        <p:spPr/>
+        <p:txBody>
+          <a:bodyPr/>
+          <a:lstStyle/>
+          <a:p>
+            <a:endParaRPr lang="en-US" dirty="0"/>
           </a:p>
         </p:txBody>
       </p:sp>
@@ -5548,30 +5818,49 @@
           </a:p>
         </p:txBody>
       </p:sp>
-      <p:pic>
-        <p:nvPicPr>
-          <p:cNvPr id="4" name="Content Placeholder 3" descr="scala_parallel_collections.tiff"/>
-          <p:cNvPicPr>
-            <a:picLocks noGrp="1" noChangeAspect="1"/>
-          </p:cNvPicPr>
+      <p:sp>
+        <p:nvSpPr>
+          <p:cNvPr id="5" name="Content Placeholder 4"/>
+          <p:cNvSpPr>
+            <a:spLocks noGrp="1"/>
+          </p:cNvSpPr>
           <p:nvPr>
             <p:ph idx="1"/>
           </p:nvPr>
-        </p:nvPicPr>
-        <p:blipFill>
-          <a:blip r:embed="rId3"/>
-          <a:srcRect t="-81710" b="-81710"/>
-          <a:stretch>
-            <a:fillRect/>
-          </a:stretch>
-        </p:blipFill>
-        <p:spPr>
-          <a:xfrm>
-            <a:off x="457200" y="1628738"/>
-            <a:ext cx="8229600" cy="4525963"/>
-          </a:xfrm>
-        </p:spPr>
-      </p:pic>
+        </p:nvSpPr>
+        <p:spPr/>
+        <p:txBody>
+          <a:bodyPr>
+            <a:normAutofit/>
+          </a:bodyPr>
+          <a:lstStyle/>
+          <a:p>
+            <a:r>
+              <a:rPr lang="en-US" sz="4400" dirty="0" smtClean="0"/>
+              <a:t>Just like regular collections </a:t>
+            </a:r>
+          </a:p>
+          <a:p>
+            <a:r>
+              <a:rPr lang="en-US" sz="4400" dirty="0" smtClean="0"/>
+              <a:t>Can be operated upon by multiple cores</a:t>
+            </a:r>
+          </a:p>
+          <a:p>
+            <a:r>
+              <a:rPr lang="en-US" sz="4400" dirty="0" smtClean="0"/>
+              <a:t>Use Divide-and-conquer algorithm</a:t>
+            </a:r>
+          </a:p>
+          <a:p>
+            <a:r>
+              <a:rPr lang="en-US" sz="4400" dirty="0" smtClean="0"/>
+              <a:t>Write-your-own</a:t>
+            </a:r>
+            <a:endParaRPr lang="en-US" sz="4400" dirty="0"/>
+          </a:p>
+        </p:txBody>
+      </p:sp>
     </p:spTree>
   </p:cSld>
   <p:clrMapOvr>
@@ -5611,7 +5900,7 @@
             <a:spLocks noGrp="1"/>
           </p:cNvSpPr>
           <p:nvPr>
-            <p:ph type="title"/>
+            <p:ph type="ctrTitle"/>
           </p:nvPr>
         </p:nvSpPr>
         <p:spPr/>
@@ -5621,7 +5910,7 @@
           <a:p>
             <a:r>
               <a:rPr lang="en-US" dirty="0" smtClean="0"/>
-              <a:t>Actors</a:t>
+              <a:t>Lets look at some code...</a:t>
             </a:r>
             <a:endParaRPr lang="en-US" dirty="0"/>
           </a:p>
@@ -5629,20 +5918,24 @@
       </p:sp>
       <p:sp>
         <p:nvSpPr>
-          <p:cNvPr id="3" name="Content Placeholder 2"/>
-          <p:cNvSpPr>
-            <a:spLocks noGrp="1"/>
-          </p:cNvSpPr>
-          <p:nvPr>
-            <p:ph idx="1"/>
-          </p:nvPr>
-        </p:nvSpPr>
-        <p:spPr/>
-        <p:txBody>
-          <a:bodyPr/>
-          <a:lstStyle/>
-          <a:p>
-            <a:endParaRPr lang="en-US"/>
+          <p:cNvPr id="3" name="Subtitle 2"/>
+          <p:cNvSpPr>
+            <a:spLocks noGrp="1"/>
+          </p:cNvSpPr>
+          <p:nvPr>
+            <p:ph type="subTitle" idx="1"/>
+          </p:nvPr>
+        </p:nvSpPr>
+        <p:spPr/>
+        <p:txBody>
+          <a:bodyPr/>
+          <a:lstStyle/>
+          <a:p>
+            <a:r>
+              <a:rPr lang="en-US" dirty="0" smtClean="0"/>
+              <a:t>Parallel collections</a:t>
+            </a:r>
+            <a:endParaRPr lang="en-US" dirty="0"/>
           </a:p>
         </p:txBody>
       </p:sp>
@@ -5788,7 +6081,7 @@
           <a:p>
             <a:r>
               <a:rPr lang="en-US" dirty="0" smtClean="0"/>
-              <a:t>Criticism</a:t>
+              <a:t>Actors</a:t>
             </a:r>
             <a:endParaRPr lang="en-US" dirty="0"/>
           </a:p>
@@ -5806,49 +6099,53 @@
         </p:nvSpPr>
         <p:spPr/>
         <p:txBody>
-          <a:bodyPr/>
-          <a:lstStyle/>
-          <a:p>
-            <a:r>
-              <a:rPr lang="en-US" dirty="0" smtClean="0"/>
-              <a:t>Slow </a:t>
-            </a:r>
-            <a:r>
-              <a:rPr lang="en-US" dirty="0" smtClean="0"/>
-              <a:t>compiler</a:t>
-            </a:r>
-          </a:p>
-          <a:p>
-            <a:pPr lvl="1"/>
-            <a:r>
-              <a:rPr lang="en-US" dirty="0" smtClean="0"/>
-              <a:t>Daemon compiler</a:t>
-            </a:r>
-          </a:p>
-          <a:p>
-            <a:pPr lvl="1"/>
-            <a:r>
-              <a:rPr lang="en-US" dirty="0" err="1" smtClean="0"/>
-              <a:t>sbt</a:t>
-            </a:r>
-            <a:r>
-              <a:rPr lang="en-US" dirty="0" smtClean="0"/>
-              <a:t> incremental compilation</a:t>
-            </a:r>
-            <a:endParaRPr lang="en-US" dirty="0" smtClean="0"/>
-          </a:p>
-          <a:p>
-            <a:r>
-              <a:rPr lang="en-US" dirty="0" smtClean="0"/>
-              <a:t>Too many features</a:t>
-            </a:r>
-          </a:p>
-          <a:p>
-            <a:r>
-              <a:rPr lang="en-US" dirty="0" smtClean="0"/>
-              <a:t>Many different ways to call a method</a:t>
-            </a:r>
-            <a:endParaRPr lang="en-US" dirty="0"/>
+          <a:bodyPr>
+            <a:noAutofit/>
+          </a:bodyPr>
+          <a:lstStyle/>
+          <a:p>
+            <a:r>
+              <a:rPr lang="en-US" sz="4400" dirty="0" smtClean="0"/>
+              <a:t>Actors are </a:t>
+            </a:r>
+            <a:r>
+              <a:rPr lang="en-US" sz="4400" dirty="0" smtClean="0"/>
+              <a:t>high-level </a:t>
+            </a:r>
+            <a:r>
+              <a:rPr lang="en-US" sz="4400" dirty="0" smtClean="0"/>
+              <a:t>concurrency </a:t>
+            </a:r>
+            <a:r>
+              <a:rPr lang="en-US" sz="4400" dirty="0" smtClean="0"/>
+              <a:t>construct as opposed to threads and shared memory model</a:t>
+            </a:r>
+          </a:p>
+          <a:p>
+            <a:r>
+              <a:rPr lang="en-US" sz="4400" dirty="0" smtClean="0"/>
+              <a:t>Actors </a:t>
+            </a:r>
+            <a:r>
+              <a:rPr lang="en-US" sz="4400" dirty="0" smtClean="0"/>
+              <a:t>communicate via message </a:t>
+            </a:r>
+            <a:r>
+              <a:rPr lang="en-US" sz="4400" dirty="0" smtClean="0"/>
+              <a:t>passing</a:t>
+            </a:r>
+          </a:p>
+          <a:p>
+            <a:r>
+              <a:rPr lang="en-US" sz="4400" dirty="0" smtClean="0"/>
+              <a:t>Pattern matching is used for message processing</a:t>
+            </a:r>
+          </a:p>
+          <a:p>
+            <a:pPr>
+              <a:buNone/>
+            </a:pPr>
+            <a:endParaRPr lang="en-US" sz="4400" dirty="0"/>
           </a:p>
         </p:txBody>
       </p:sp>
@@ -5891,7 +6188,7 @@
             <a:spLocks noGrp="1"/>
           </p:cNvSpPr>
           <p:nvPr>
-            <p:ph type="title"/>
+            <p:ph type="ctrTitle"/>
           </p:nvPr>
         </p:nvSpPr>
         <p:spPr/>
@@ -5901,7 +6198,7 @@
           <a:p>
             <a:r>
               <a:rPr lang="en-US" dirty="0" smtClean="0"/>
-              <a:t>Other items of interest</a:t>
+              <a:t>Lets look at some code...</a:t>
             </a:r>
             <a:endParaRPr lang="en-US" dirty="0"/>
           </a:p>
@@ -5909,12 +6206,12 @@
       </p:sp>
       <p:sp>
         <p:nvSpPr>
-          <p:cNvPr id="3" name="Content Placeholder 2"/>
-          <p:cNvSpPr>
-            <a:spLocks noGrp="1"/>
-          </p:cNvSpPr>
-          <p:nvPr>
-            <p:ph idx="1"/>
+          <p:cNvPr id="3" name="Subtitle 2"/>
+          <p:cNvSpPr>
+            <a:spLocks noGrp="1"/>
+          </p:cNvSpPr>
+          <p:nvPr>
+            <p:ph type="subTitle" idx="1"/>
           </p:nvPr>
         </p:nvSpPr>
         <p:spPr/>
@@ -5924,7 +6221,7 @@
           <a:p>
             <a:r>
               <a:rPr lang="en-US" dirty="0" smtClean="0"/>
-              <a:t>REPL</a:t>
+              <a:t>Actors</a:t>
             </a:r>
             <a:endParaRPr lang="en-US" dirty="0"/>
           </a:p>
@@ -5979,6 +6276,242 @@
           <a:p>
             <a:r>
               <a:rPr lang="en-US" dirty="0" smtClean="0"/>
+              <a:t>Criticism</a:t>
+            </a:r>
+            <a:endParaRPr lang="en-US" dirty="0"/>
+          </a:p>
+        </p:txBody>
+      </p:sp>
+      <p:sp>
+        <p:nvSpPr>
+          <p:cNvPr id="3" name="Content Placeholder 2"/>
+          <p:cNvSpPr>
+            <a:spLocks noGrp="1"/>
+          </p:cNvSpPr>
+          <p:nvPr>
+            <p:ph idx="1"/>
+          </p:nvPr>
+        </p:nvSpPr>
+        <p:spPr/>
+        <p:txBody>
+          <a:bodyPr>
+            <a:noAutofit/>
+          </a:bodyPr>
+          <a:lstStyle/>
+          <a:p>
+            <a:r>
+              <a:rPr lang="en-US" sz="4400" dirty="0" smtClean="0"/>
+              <a:t>Slow </a:t>
+            </a:r>
+            <a:r>
+              <a:rPr lang="en-US" sz="4400" dirty="0" smtClean="0"/>
+              <a:t>compiler</a:t>
+            </a:r>
+          </a:p>
+          <a:p>
+            <a:pPr lvl="1"/>
+            <a:r>
+              <a:rPr lang="en-US" sz="4400" dirty="0" smtClean="0"/>
+              <a:t> Daemon compiler</a:t>
+            </a:r>
+          </a:p>
+          <a:p>
+            <a:pPr lvl="1"/>
+            <a:r>
+              <a:rPr lang="en-US" sz="4400" dirty="0" smtClean="0"/>
+              <a:t> </a:t>
+            </a:r>
+            <a:r>
+              <a:rPr lang="en-US" sz="4400" dirty="0" err="1" smtClean="0"/>
+              <a:t>sbt</a:t>
+            </a:r>
+            <a:r>
+              <a:rPr lang="en-US" sz="4400" dirty="0" smtClean="0"/>
+              <a:t> incremental compilation</a:t>
+            </a:r>
+            <a:endParaRPr lang="en-US" sz="4400" dirty="0" smtClean="0"/>
+          </a:p>
+          <a:p>
+            <a:r>
+              <a:rPr lang="en-US" sz="4400" dirty="0" smtClean="0"/>
+              <a:t>Too many </a:t>
+            </a:r>
+            <a:r>
+              <a:rPr lang="en-US" sz="4400" dirty="0" smtClean="0"/>
+              <a:t>features</a:t>
+            </a:r>
+            <a:endParaRPr lang="en-US" sz="4400" dirty="0" smtClean="0"/>
+          </a:p>
+          <a:p>
+            <a:r>
+              <a:rPr lang="en-US" sz="4400" dirty="0" smtClean="0"/>
+              <a:t>Many different ways to do the same thing</a:t>
+            </a:r>
+            <a:endParaRPr lang="en-US" sz="4400" dirty="0" smtClean="0"/>
+          </a:p>
+        </p:txBody>
+      </p:sp>
+    </p:spTree>
+  </p:cSld>
+  <p:clrMapOvr>
+    <a:masterClrMapping/>
+  </p:clrMapOvr>
+  <p:timing>
+    <p:tnLst>
+      <p:par>
+        <p:cTn id="1" dur="indefinite" restart="never" nodeType="tmRoot"/>
+      </p:par>
+    </p:tnLst>
+  </p:timing>
+</p:sld>
+</file>
+
+<file path=ppt/slides/slide23.xml><?xml version="1.0" encoding="utf-8"?>
+<p:sld xmlns:a="http://schemas.openxmlformats.org/drawingml/2006/main" xmlns:r="http://schemas.openxmlformats.org/officeDocument/2006/relationships" xmlns:mc="http://schemas.openxmlformats.org/markup-compatibility/2006" xmlns:mv="urn:schemas-microsoft-com:mac:vml" xmlns:p="http://schemas.openxmlformats.org/presentationml/2006/main" mc:Ignorable="mv" mc:PreserveAttributes="mv:*">
+  <p:cSld>
+    <p:spTree>
+      <p:nvGrpSpPr>
+        <p:cNvPr id="1" name=""/>
+        <p:cNvGrpSpPr/>
+        <p:nvPr/>
+      </p:nvGrpSpPr>
+      <p:grpSpPr>
+        <a:xfrm>
+          <a:off x="0" y="0"/>
+          <a:ext cx="0" cy="0"/>
+          <a:chOff x="0" y="0"/>
+          <a:chExt cx="0" cy="0"/>
+        </a:xfrm>
+      </p:grpSpPr>
+      <p:sp>
+        <p:nvSpPr>
+          <p:cNvPr id="2" name="Title 1"/>
+          <p:cNvSpPr>
+            <a:spLocks noGrp="1"/>
+          </p:cNvSpPr>
+          <p:nvPr>
+            <p:ph type="title"/>
+          </p:nvPr>
+        </p:nvSpPr>
+        <p:spPr/>
+        <p:txBody>
+          <a:bodyPr/>
+          <a:lstStyle/>
+          <a:p>
+            <a:r>
+              <a:rPr lang="en-US" dirty="0" smtClean="0"/>
+              <a:t>Other items of interest</a:t>
+            </a:r>
+            <a:endParaRPr lang="en-US" dirty="0"/>
+          </a:p>
+        </p:txBody>
+      </p:sp>
+      <p:sp>
+        <p:nvSpPr>
+          <p:cNvPr id="3" name="Content Placeholder 2"/>
+          <p:cNvSpPr>
+            <a:spLocks noGrp="1"/>
+          </p:cNvSpPr>
+          <p:nvPr>
+            <p:ph idx="1"/>
+          </p:nvPr>
+        </p:nvSpPr>
+        <p:spPr/>
+        <p:txBody>
+          <a:bodyPr>
+            <a:normAutofit/>
+          </a:bodyPr>
+          <a:lstStyle/>
+          <a:p>
+            <a:r>
+              <a:rPr lang="en-US" sz="4400" dirty="0" smtClean="0"/>
+              <a:t>REPL</a:t>
+            </a:r>
+          </a:p>
+          <a:p>
+            <a:r>
+              <a:rPr lang="en-US" sz="4400" dirty="0" err="1" smtClean="0"/>
+              <a:t>TypeSafe</a:t>
+            </a:r>
+            <a:r>
+              <a:rPr lang="en-US" sz="4400" dirty="0" smtClean="0"/>
+              <a:t> (</a:t>
+            </a:r>
+            <a:r>
+              <a:rPr lang="en-US" sz="4400" dirty="0" err="1" smtClean="0"/>
+              <a:t>Scala</a:t>
+            </a:r>
+            <a:r>
+              <a:rPr lang="en-US" sz="4400" dirty="0" smtClean="0"/>
+              <a:t>, </a:t>
+            </a:r>
+            <a:r>
+              <a:rPr lang="en-US" sz="4400" dirty="0" err="1" smtClean="0"/>
+              <a:t>Akka</a:t>
+            </a:r>
+            <a:r>
+              <a:rPr lang="en-US" sz="4400" dirty="0" smtClean="0"/>
+              <a:t>, Play!)</a:t>
+            </a:r>
+          </a:p>
+          <a:p>
+            <a:r>
+              <a:rPr lang="en-US" sz="4400" dirty="0" err="1" smtClean="0"/>
+              <a:t>Heroku</a:t>
+            </a:r>
+            <a:endParaRPr lang="en-US" sz="4400" dirty="0"/>
+          </a:p>
+        </p:txBody>
+      </p:sp>
+    </p:spTree>
+  </p:cSld>
+  <p:clrMapOvr>
+    <a:masterClrMapping/>
+  </p:clrMapOvr>
+  <p:timing>
+    <p:tnLst>
+      <p:par>
+        <p:cTn id="1" dur="indefinite" restart="never" nodeType="tmRoot"/>
+      </p:par>
+    </p:tnLst>
+  </p:timing>
+</p:sld>
+</file>
+
+<file path=ppt/slides/slide24.xml><?xml version="1.0" encoding="utf-8"?>
+<p:sld xmlns:a="http://schemas.openxmlformats.org/drawingml/2006/main" xmlns:r="http://schemas.openxmlformats.org/officeDocument/2006/relationships" xmlns:mc="http://schemas.openxmlformats.org/markup-compatibility/2006" xmlns:mv="urn:schemas-microsoft-com:mac:vml" xmlns:p="http://schemas.openxmlformats.org/presentationml/2006/main" mc:Ignorable="mv" mc:PreserveAttributes="mv:*">
+  <p:cSld>
+    <p:spTree>
+      <p:nvGrpSpPr>
+        <p:cNvPr id="1" name=""/>
+        <p:cNvGrpSpPr/>
+        <p:nvPr/>
+      </p:nvGrpSpPr>
+      <p:grpSpPr>
+        <a:xfrm>
+          <a:off x="0" y="0"/>
+          <a:ext cx="0" cy="0"/>
+          <a:chOff x="0" y="0"/>
+          <a:chExt cx="0" cy="0"/>
+        </a:xfrm>
+      </p:grpSpPr>
+      <p:sp>
+        <p:nvSpPr>
+          <p:cNvPr id="2" name="Title 1"/>
+          <p:cNvSpPr>
+            <a:spLocks noGrp="1"/>
+          </p:cNvSpPr>
+          <p:nvPr>
+            <p:ph type="title"/>
+          </p:nvPr>
+        </p:nvSpPr>
+        <p:spPr/>
+        <p:txBody>
+          <a:bodyPr/>
+          <a:lstStyle/>
+          <a:p>
+            <a:r>
+              <a:rPr lang="en-US" dirty="0" smtClean="0"/>
               <a:t>Functional yet beautiful</a:t>
             </a:r>
             <a:endParaRPr lang="en-US" dirty="0"/>
@@ -6031,6 +6564,80 @@
               <a:t>http://www.orientalpersianrug.com/qum_persian_rugs.html</a:t>
             </a:r>
             <a:endParaRPr lang="en-US" sz="1100" dirty="0"/>
+          </a:p>
+        </p:txBody>
+      </p:sp>
+    </p:spTree>
+  </p:cSld>
+  <p:clrMapOvr>
+    <a:masterClrMapping/>
+  </p:clrMapOvr>
+  <p:timing>
+    <p:tnLst>
+      <p:par>
+        <p:cTn id="1" dur="indefinite" restart="never" nodeType="tmRoot"/>
+      </p:par>
+    </p:tnLst>
+  </p:timing>
+</p:sld>
+</file>
+
+<file path=ppt/slides/slide25.xml><?xml version="1.0" encoding="utf-8"?>
+<p:sld xmlns:a="http://schemas.openxmlformats.org/drawingml/2006/main" xmlns:r="http://schemas.openxmlformats.org/officeDocument/2006/relationships" xmlns:mc="http://schemas.openxmlformats.org/markup-compatibility/2006" xmlns:mv="urn:schemas-microsoft-com:mac:vml" xmlns:p="http://schemas.openxmlformats.org/presentationml/2006/main" mc:Ignorable="mv" mc:PreserveAttributes="mv:*">
+  <p:cSld>
+    <p:spTree>
+      <p:nvGrpSpPr>
+        <p:cNvPr id="1" name=""/>
+        <p:cNvGrpSpPr/>
+        <p:nvPr/>
+      </p:nvGrpSpPr>
+      <p:grpSpPr>
+        <a:xfrm>
+          <a:off x="0" y="0"/>
+          <a:ext cx="0" cy="0"/>
+          <a:chOff x="0" y="0"/>
+          <a:chExt cx="0" cy="0"/>
+        </a:xfrm>
+      </p:grpSpPr>
+      <p:sp>
+        <p:nvSpPr>
+          <p:cNvPr id="2" name="Title 1"/>
+          <p:cNvSpPr>
+            <a:spLocks noGrp="1"/>
+          </p:cNvSpPr>
+          <p:nvPr>
+            <p:ph type="ctrTitle"/>
+          </p:nvPr>
+        </p:nvSpPr>
+        <p:spPr/>
+        <p:txBody>
+          <a:bodyPr/>
+          <a:lstStyle/>
+          <a:p>
+            <a:r>
+              <a:rPr lang="en-US" dirty="0" smtClean="0"/>
+              <a:t>Questions?</a:t>
+            </a:r>
+            <a:endParaRPr lang="en-US" dirty="0"/>
+          </a:p>
+        </p:txBody>
+      </p:sp>
+      <p:sp>
+        <p:nvSpPr>
+          <p:cNvPr id="3" name="Subtitle 2"/>
+          <p:cNvSpPr>
+            <a:spLocks noGrp="1"/>
+          </p:cNvSpPr>
+          <p:nvPr>
+            <p:ph type="subTitle" idx="1"/>
+          </p:nvPr>
+        </p:nvSpPr>
+        <p:spPr/>
+        <p:txBody>
+          <a:bodyPr/>
+          <a:lstStyle/>
+          <a:p>
+            <a:endParaRPr lang="en-US" dirty="0"/>
           </a:p>
         </p:txBody>
       </p:sp>

</xml_diff>

<commit_message>
added tail recursion notes and code; multiple ways of calling a method
</commit_message>
<xml_diff>
--- a/Scala_Away_Day.pptx
+++ b/Scala_Away_Day.pptx
@@ -5,7 +5,7 @@
     <p:sldMasterId id="2147483648" r:id="rId1"/>
   </p:sldMasterIdLst>
   <p:notesMasterIdLst>
-    <p:notesMasterId r:id="rId28"/>
+    <p:notesMasterId r:id="rId29"/>
   </p:notesMasterIdLst>
   <p:sldIdLst>
     <p:sldId id="256" r:id="rId2"/>
@@ -31,9 +31,10 @@
     <p:sldId id="270" r:id="rId22"/>
     <p:sldId id="285" r:id="rId23"/>
     <p:sldId id="271" r:id="rId24"/>
-    <p:sldId id="272" r:id="rId25"/>
-    <p:sldId id="262" r:id="rId26"/>
-    <p:sldId id="282" r:id="rId27"/>
+    <p:sldId id="287" r:id="rId25"/>
+    <p:sldId id="272" r:id="rId26"/>
+    <p:sldId id="262" r:id="rId27"/>
+    <p:sldId id="282" r:id="rId28"/>
   </p:sldIdLst>
   <p:sldSz cx="9144000" cy="6858000" type="screen4x3"/>
   <p:notesSz cx="6858000" cy="9144000"/>
@@ -1014,7 +1015,7 @@
             <a:fld id="{765C5218-4828-B544-9955-A4B6719EC9E2}" type="slidenum">
               <a:rPr lang="en-US" smtClean="0"/>
               <a:pPr/>
-              <a:t>25</a:t>
+              <a:t>26</a:t>
             </a:fld>
             <a:endParaRPr lang="en-US"/>
           </a:p>
@@ -1096,7 +1097,7 @@
             <a:fld id="{765C5218-4828-B544-9955-A4B6719EC9E2}" type="slidenum">
               <a:rPr lang="en-US" smtClean="0"/>
               <a:pPr/>
-              <a:t>26</a:t>
+              <a:t>27</a:t>
             </a:fld>
             <a:endParaRPr lang="en-US"/>
           </a:p>
@@ -5369,7 +5370,7 @@
           <a:lstStyle/>
           <a:p>
             <a:r>
-              <a:rPr lang="en-US" dirty="0" smtClean="0"/>
+              <a:rPr lang="en-US" sz="4400" dirty="0" smtClean="0"/>
               <a:t>Higher-Order Functions are functions that either input or output functions.</a:t>
             </a:r>
           </a:p>
@@ -5820,10 +5821,10 @@
           <a:lstStyle/>
           <a:p>
             <a:r>
-              <a:rPr lang="en-US" smtClean="0"/>
+              <a:rPr lang="en-US" dirty="0" smtClean="0"/>
               <a:t>Tail recursion</a:t>
             </a:r>
-            <a:endParaRPr lang="en-US"/>
+            <a:endParaRPr lang="en-US" dirty="0"/>
           </a:p>
         </p:txBody>
       </p:sp>
@@ -5846,13 +5847,13 @@
           <a:p>
             <a:r>
               <a:rPr lang="en-US" sz="4400" dirty="0" smtClean="0"/>
-              <a:t>Special type of recursion</a:t>
+              <a:t>Special type of function recursion</a:t>
             </a:r>
           </a:p>
           <a:p>
             <a:r>
               <a:rPr lang="en-US" sz="4400" dirty="0" smtClean="0"/>
-              <a:t>Final action taken in a method is the recursive call</a:t>
+              <a:t>Final action taken in a function is the recursive call</a:t>
             </a:r>
           </a:p>
           <a:p>
@@ -6528,13 +6529,6 @@
             </a:r>
             <a:endParaRPr lang="en-US" sz="4400" dirty="0" smtClean="0"/>
           </a:p>
-          <a:p>
-            <a:r>
-              <a:rPr lang="en-US" sz="4400" dirty="0" smtClean="0"/>
-              <a:t>Many different ways to do the same thing</a:t>
-            </a:r>
-            <a:endParaRPr lang="en-US" sz="4400" dirty="0" smtClean="0"/>
-          </a:p>
         </p:txBody>
       </p:sp>
     </p:spTree>
@@ -6586,7 +6580,7 @@
           <a:p>
             <a:r>
               <a:rPr lang="en-US" dirty="0" smtClean="0"/>
-              <a:t>Other items of interest</a:t>
+              <a:t>Criticism</a:t>
             </a:r>
             <a:endParaRPr lang="en-US" dirty="0"/>
           </a:p>
@@ -6604,63 +6598,48 @@
         </p:nvSpPr>
         <p:spPr/>
         <p:txBody>
-          <a:bodyPr>
-            <a:normAutofit/>
-          </a:bodyPr>
+          <a:bodyPr/>
           <a:lstStyle/>
           <a:p>
             <a:r>
               <a:rPr lang="en-US" sz="4400" dirty="0" smtClean="0"/>
-              <a:t>REPL</a:t>
-            </a:r>
-          </a:p>
-          <a:p>
-            <a:r>
-              <a:rPr lang="en-US" sz="4400" dirty="0" err="1" smtClean="0"/>
-              <a:t>TypeSafe</a:t>
-            </a:r>
-            <a:r>
-              <a:rPr lang="en-US" sz="4400" dirty="0" smtClean="0"/>
-              <a:t> (</a:t>
-            </a:r>
-            <a:r>
-              <a:rPr lang="en-US" sz="4400" dirty="0" err="1" smtClean="0"/>
-              <a:t>Scala</a:t>
-            </a:r>
-            <a:r>
-              <a:rPr lang="en-US" sz="4400" dirty="0" smtClean="0"/>
-              <a:t>, </a:t>
-            </a:r>
-            <a:r>
-              <a:rPr lang="en-US" sz="4400" dirty="0" err="1" smtClean="0"/>
-              <a:t>Akka</a:t>
-            </a:r>
-            <a:r>
-              <a:rPr lang="en-US" sz="4400" dirty="0" smtClean="0"/>
-              <a:t>, Play!)</a:t>
-            </a:r>
-          </a:p>
-          <a:p>
-            <a:r>
-              <a:rPr lang="en-US" sz="4400" dirty="0" err="1" smtClean="0"/>
-              <a:t>Heroku</a:t>
-            </a:r>
-            <a:endParaRPr lang="en-US" sz="4400" dirty="0"/>
-          </a:p>
-        </p:txBody>
-      </p:sp>
+              <a:t>Many different ways to do the same thing</a:t>
+            </a:r>
+          </a:p>
+          <a:p>
+            <a:endParaRPr lang="en-US" dirty="0"/>
+          </a:p>
+        </p:txBody>
+      </p:sp>
+      <p:pic>
+        <p:nvPicPr>
+          <p:cNvPr id="4" name="Picture 3" descr="scala_method_call.tiff"/>
+          <p:cNvPicPr>
+            <a:picLocks noChangeAspect="1"/>
+          </p:cNvPicPr>
+          <p:nvPr/>
+        </p:nvPicPr>
+        <p:blipFill>
+          <a:blip r:embed="rId2"/>
+          <a:stretch>
+            <a:fillRect/>
+          </a:stretch>
+        </p:blipFill>
+        <p:spPr>
+          <a:xfrm>
+            <a:off x="655459" y="3208820"/>
+            <a:ext cx="8288831" cy="3126892"/>
+          </a:xfrm>
+          <a:prstGeom prst="rect">
+            <a:avLst/>
+          </a:prstGeom>
+        </p:spPr>
+      </p:pic>
     </p:spTree>
   </p:cSld>
   <p:clrMapOvr>
     <a:masterClrMapping/>
   </p:clrMapOvr>
-  <p:timing>
-    <p:tnLst>
-      <p:par>
-        <p:cTn id="1" dur="indefinite" restart="never" nodeType="tmRoot"/>
-      </p:par>
-    </p:tnLst>
-  </p:timing>
 </p:sld>
 </file>
 
@@ -6698,58 +6677,66 @@
           <a:p>
             <a:r>
               <a:rPr lang="en-US" dirty="0" smtClean="0"/>
-              <a:t>Functional yet beautiful</a:t>
+              <a:t>Other items of interest</a:t>
             </a:r>
             <a:endParaRPr lang="en-US" dirty="0"/>
           </a:p>
         </p:txBody>
       </p:sp>
-      <p:pic>
-        <p:nvPicPr>
-          <p:cNvPr id="4" name="Content Placeholder 3" descr="qum_round_persian_rugs_1.JPG"/>
-          <p:cNvPicPr>
-            <a:picLocks noGrp="1" noChangeAspect="1"/>
-          </p:cNvPicPr>
+      <p:sp>
+        <p:nvSpPr>
+          <p:cNvPr id="3" name="Content Placeholder 2"/>
+          <p:cNvSpPr>
+            <a:spLocks noGrp="1"/>
+          </p:cNvSpPr>
           <p:nvPr>
             <p:ph idx="1"/>
           </p:nvPr>
-        </p:nvPicPr>
-        <p:blipFill>
-          <a:blip r:embed="rId3"/>
-          <a:srcRect l="-42539" r="-42539"/>
-          <a:stretch>
-            <a:fillRect/>
-          </a:stretch>
-        </p:blipFill>
-        <p:spPr/>
-      </p:pic>
-      <p:sp>
-        <p:nvSpPr>
-          <p:cNvPr id="5" name="TextBox 4"/>
-          <p:cNvSpPr txBox="1"/>
-          <p:nvPr/>
-        </p:nvSpPr>
-        <p:spPr>
-          <a:xfrm>
-            <a:off x="5232121" y="6307080"/>
-            <a:ext cx="3911879" cy="261610"/>
-          </a:xfrm>
-          <a:prstGeom prst="rect">
-            <a:avLst/>
-          </a:prstGeom>
-          <a:noFill/>
-        </p:spPr>
-        <p:txBody>
-          <a:bodyPr wrap="square" rtlCol="0">
-            <a:spAutoFit/>
+        </p:nvSpPr>
+        <p:spPr/>
+        <p:txBody>
+          <a:bodyPr>
+            <a:normAutofit/>
           </a:bodyPr>
           <a:lstStyle/>
           <a:p>
             <a:r>
-              <a:rPr lang="en-US" sz="1100" dirty="0" smtClean="0"/>
-              <a:t>http://www.orientalpersianrug.com/qum_persian_rugs.html</a:t>
-            </a:r>
-            <a:endParaRPr lang="en-US" sz="1100" dirty="0"/>
+              <a:rPr lang="en-US" sz="4400" dirty="0" smtClean="0"/>
+              <a:t>REPL</a:t>
+            </a:r>
+          </a:p>
+          <a:p>
+            <a:r>
+              <a:rPr lang="en-US" sz="4400" dirty="0" err="1" smtClean="0"/>
+              <a:t>TypeSafe</a:t>
+            </a:r>
+            <a:r>
+              <a:rPr lang="en-US" sz="4400" dirty="0" smtClean="0"/>
+              <a:t> (</a:t>
+            </a:r>
+            <a:r>
+              <a:rPr lang="en-US" sz="4400" dirty="0" err="1" smtClean="0"/>
+              <a:t>Scala</a:t>
+            </a:r>
+            <a:r>
+              <a:rPr lang="en-US" sz="4400" dirty="0" smtClean="0"/>
+              <a:t>, </a:t>
+            </a:r>
+            <a:r>
+              <a:rPr lang="en-US" sz="4400" dirty="0" err="1" smtClean="0"/>
+              <a:t>Akka</a:t>
+            </a:r>
+            <a:r>
+              <a:rPr lang="en-US" sz="4400" dirty="0" smtClean="0"/>
+              <a:t>, Play!)</a:t>
+            </a:r>
+          </a:p>
+          <a:p>
+            <a:r>
+              <a:rPr lang="en-US" sz="4400" dirty="0" err="1" smtClean="0"/>
+              <a:t>Heroku</a:t>
+            </a:r>
+            <a:endParaRPr lang="en-US" sz="4400" dirty="0"/>
           </a:p>
         </p:txBody>
       </p:sp>
@@ -6769,6 +6756,110 @@
 </file>
 
 <file path=ppt/slides/slide26.xml><?xml version="1.0" encoding="utf-8"?>
+<p:sld xmlns:a="http://schemas.openxmlformats.org/drawingml/2006/main" xmlns:r="http://schemas.openxmlformats.org/officeDocument/2006/relationships" xmlns:mc="http://schemas.openxmlformats.org/markup-compatibility/2006" xmlns:mv="urn:schemas-microsoft-com:mac:vml" xmlns:p="http://schemas.openxmlformats.org/presentationml/2006/main" mc:Ignorable="mv" mc:PreserveAttributes="mv:*">
+  <p:cSld>
+    <p:spTree>
+      <p:nvGrpSpPr>
+        <p:cNvPr id="1" name=""/>
+        <p:cNvGrpSpPr/>
+        <p:nvPr/>
+      </p:nvGrpSpPr>
+      <p:grpSpPr>
+        <a:xfrm>
+          <a:off x="0" y="0"/>
+          <a:ext cx="0" cy="0"/>
+          <a:chOff x="0" y="0"/>
+          <a:chExt cx="0" cy="0"/>
+        </a:xfrm>
+      </p:grpSpPr>
+      <p:sp>
+        <p:nvSpPr>
+          <p:cNvPr id="2" name="Title 1"/>
+          <p:cNvSpPr>
+            <a:spLocks noGrp="1"/>
+          </p:cNvSpPr>
+          <p:nvPr>
+            <p:ph type="title"/>
+          </p:nvPr>
+        </p:nvSpPr>
+        <p:spPr/>
+        <p:txBody>
+          <a:bodyPr/>
+          <a:lstStyle/>
+          <a:p>
+            <a:r>
+              <a:rPr lang="en-US" dirty="0" smtClean="0"/>
+              <a:t>Functional yet beautiful</a:t>
+            </a:r>
+            <a:endParaRPr lang="en-US" dirty="0"/>
+          </a:p>
+        </p:txBody>
+      </p:sp>
+      <p:pic>
+        <p:nvPicPr>
+          <p:cNvPr id="4" name="Content Placeholder 3" descr="qum_round_persian_rugs_1.JPG"/>
+          <p:cNvPicPr>
+            <a:picLocks noGrp="1" noChangeAspect="1"/>
+          </p:cNvPicPr>
+          <p:nvPr>
+            <p:ph idx="1"/>
+          </p:nvPr>
+        </p:nvPicPr>
+        <p:blipFill>
+          <a:blip r:embed="rId3"/>
+          <a:srcRect l="-42539" r="-42539"/>
+          <a:stretch>
+            <a:fillRect/>
+          </a:stretch>
+        </p:blipFill>
+        <p:spPr/>
+      </p:pic>
+      <p:sp>
+        <p:nvSpPr>
+          <p:cNvPr id="5" name="TextBox 4"/>
+          <p:cNvSpPr txBox="1"/>
+          <p:nvPr/>
+        </p:nvSpPr>
+        <p:spPr>
+          <a:xfrm>
+            <a:off x="5232121" y="6307080"/>
+            <a:ext cx="3911879" cy="261610"/>
+          </a:xfrm>
+          <a:prstGeom prst="rect">
+            <a:avLst/>
+          </a:prstGeom>
+          <a:noFill/>
+        </p:spPr>
+        <p:txBody>
+          <a:bodyPr wrap="square" rtlCol="0">
+            <a:spAutoFit/>
+          </a:bodyPr>
+          <a:lstStyle/>
+          <a:p>
+            <a:r>
+              <a:rPr lang="en-US" sz="1100" dirty="0" smtClean="0"/>
+              <a:t>http://www.orientalpersianrug.com/qum_persian_rugs.html</a:t>
+            </a:r>
+            <a:endParaRPr lang="en-US" sz="1100" dirty="0"/>
+          </a:p>
+        </p:txBody>
+      </p:sp>
+    </p:spTree>
+  </p:cSld>
+  <p:clrMapOvr>
+    <a:masterClrMapping/>
+  </p:clrMapOvr>
+  <p:timing>
+    <p:tnLst>
+      <p:par>
+        <p:cTn id="1" dur="indefinite" restart="never" nodeType="tmRoot"/>
+      </p:par>
+    </p:tnLst>
+  </p:timing>
+</p:sld>
+</file>
+
+<file path=ppt/slides/slide27.xml><?xml version="1.0" encoding="utf-8"?>
 <p:sld xmlns:a="http://schemas.openxmlformats.org/drawingml/2006/main" xmlns:r="http://schemas.openxmlformats.org/officeDocument/2006/relationships" xmlns:mc="http://schemas.openxmlformats.org/markup-compatibility/2006" xmlns:mv="urn:schemas-microsoft-com:mac:vml" xmlns:p="http://schemas.openxmlformats.org/presentationml/2006/main" mc:Ignorable="mv" mc:PreserveAttributes="mv:*">
   <p:cSld>
     <p:spTree>
@@ -7336,17 +7427,19 @@
         </p:nvSpPr>
         <p:spPr/>
         <p:txBody>
-          <a:bodyPr/>
-          <a:lstStyle/>
-          <a:p>
-            <a:r>
-              <a:rPr lang="en-US" dirty="0" smtClean="0"/>
+          <a:bodyPr>
+            <a:normAutofit/>
+          </a:bodyPr>
+          <a:lstStyle/>
+          <a:p>
+            <a:r>
+              <a:rPr lang="en-US" sz="4400" dirty="0" smtClean="0"/>
               <a:t>Closures are blocks of code that can be passed around as parameters</a:t>
             </a:r>
           </a:p>
           <a:p>
             <a:r>
-              <a:rPr lang="en-US" dirty="0" smtClean="0"/>
+              <a:rPr lang="en-US" sz="4400" dirty="0" smtClean="0"/>
               <a:t>Closures “close over” variables outside of its scope</a:t>
             </a:r>
           </a:p>

</xml_diff>

<commit_message>
added notes on JVM
</commit_message>
<xml_diff>
--- a/Scala_Away_Day.pptx
+++ b/Scala_Away_Day.pptx
@@ -553,7 +553,71 @@
             </a:r>
             <a:r>
               <a:rPr lang="en-US" baseline="0" dirty="0" smtClean="0"/>
-              <a:t> as a viable option when you pick your next language.</a:t>
+              <a:t> as a viable option when you pick your next language</a:t>
+            </a:r>
+            <a:r>
+              <a:rPr lang="en-US" baseline="0" dirty="0" smtClean="0"/>
+              <a:t>.</a:t>
+            </a:r>
+          </a:p>
+          <a:p>
+            <a:endParaRPr lang="en-US" baseline="0" dirty="0" smtClean="0"/>
+          </a:p>
+          <a:p>
+            <a:r>
+              <a:rPr lang="en-US" baseline="0" dirty="0" smtClean="0"/>
+              <a:t>The JVM went through several waves of improvement. The initial naïve implementation would compile </a:t>
+            </a:r>
+            <a:r>
+              <a:rPr lang="en-US" baseline="0" dirty="0" err="1" smtClean="0"/>
+              <a:t>bytecode</a:t>
+            </a:r>
+            <a:r>
+              <a:rPr lang="en-US" baseline="0" dirty="0" smtClean="0"/>
+              <a:t> to machine code </a:t>
+            </a:r>
+            <a:r>
+              <a:rPr lang="en-US" baseline="0" dirty="0" err="1" smtClean="0"/>
+              <a:t>everytime</a:t>
+            </a:r>
+            <a:r>
+              <a:rPr lang="en-US" baseline="0" dirty="0" smtClean="0"/>
+              <a:t> you encountered the byte code. Significant revision was the JIT compiler that compiles byte code the first time it encounters it and then caches the machine code for subsequent usage. Then another wave was </a:t>
+            </a:r>
+            <a:r>
+              <a:rPr lang="en-US" baseline="0" dirty="0" err="1" smtClean="0"/>
+              <a:t>siginificant</a:t>
+            </a:r>
+            <a:r>
+              <a:rPr lang="en-US" baseline="0" dirty="0" smtClean="0"/>
+              <a:t> improvement was adaptive optimization which means the JVM is going to monitor to see what code gets used a lot known as “hotspot”. There is typically this 20% of the code that gets executed 80% of the time and then the JVM is going to optimize the native code heavily. The rest 80% need not be even cached.</a:t>
+            </a:r>
+          </a:p>
+          <a:p>
+            <a:endParaRPr lang="en-US" baseline="0" dirty="0" smtClean="0"/>
+          </a:p>
+          <a:p>
+            <a:r>
+              <a:rPr lang="en-US" baseline="0" dirty="0" err="1" smtClean="0"/>
+              <a:t>JVM’s</a:t>
+            </a:r>
+            <a:r>
+              <a:rPr lang="en-US" baseline="0" dirty="0" smtClean="0"/>
+              <a:t> generational garbage collection is vastly superior to mark-and-</a:t>
+            </a:r>
+            <a:r>
+              <a:rPr lang="en-US" baseline="0" smtClean="0"/>
+              <a:t>sweep algorithm. </a:t>
+            </a:r>
+            <a:endParaRPr lang="en-US" baseline="0" dirty="0" smtClean="0"/>
+          </a:p>
+          <a:p>
+            <a:endParaRPr lang="en-US" baseline="0" dirty="0" smtClean="0"/>
+          </a:p>
+          <a:p>
+            <a:r>
+              <a:rPr lang="en-US" dirty="0" smtClean="0"/>
+              <a:t>http://blog.dhananjaynene.com/2008/07/performance-comparison-c-java-python-ruby-jython-jruby-groovy/</a:t>
             </a:r>
             <a:endParaRPr lang="en-US" dirty="0"/>
           </a:p>
@@ -805,6 +869,19 @@
             <a:r>
               <a:rPr lang="en-US" baseline="0" dirty="0" smtClean="0"/>
               <a:t>Actors can be remote</a:t>
+            </a:r>
+          </a:p>
+          <a:p>
+            <a:endParaRPr lang="en-US" baseline="0" dirty="0" smtClean="0"/>
+          </a:p>
+          <a:p>
+            <a:r>
+              <a:rPr lang="en-US" baseline="0" dirty="0" err="1" smtClean="0"/>
+              <a:t>Erlang</a:t>
+            </a:r>
+            <a:r>
+              <a:rPr lang="en-US" baseline="0" dirty="0" smtClean="0"/>
+              <a:t> has uptime of 99.999% something like 5 minutes of downtime a year</a:t>
             </a:r>
           </a:p>
         </p:txBody>
@@ -6640,6 +6717,13 @@
   <p:clrMapOvr>
     <a:masterClrMapping/>
   </p:clrMapOvr>
+  <p:timing>
+    <p:tnLst>
+      <p:par>
+        <p:cTn id="1" dur="indefinite" restart="never" nodeType="tmRoot"/>
+      </p:par>
+    </p:tnLst>
+  </p:timing>
 </p:sld>
 </file>
 

</xml_diff>

<commit_message>
Added new picture of rug
</commit_message>
<xml_diff>
--- a/Scala_Away_Day.pptx
+++ b/Scala_Away_Day.pptx
@@ -534,87 +534,38 @@
           <a:p>
             <a:r>
               <a:rPr lang="en-US" dirty="0" smtClean="0"/>
-              <a:t>The general</a:t>
+              <a:t>My name is </a:t>
+            </a:r>
+            <a:r>
+              <a:rPr lang="en-US" dirty="0" err="1" smtClean="0"/>
+              <a:t>Praful</a:t>
             </a:r>
             <a:r>
               <a:rPr lang="en-US" baseline="0" dirty="0" smtClean="0"/>
-              <a:t> perception is that Ruby is a concise, expressive language than most of the languages we work on here at ThoughtWorks and similarly Java is </a:t>
+              <a:t> </a:t>
             </a:r>
             <a:r>
               <a:rPr lang="en-US" baseline="0" dirty="0" err="1" smtClean="0"/>
-              <a:t>performant</a:t>
-            </a:r>
+              <a:t>Todkar</a:t>
+            </a:r>
+            <a:endParaRPr lang="en-US" baseline="0" dirty="0" smtClean="0"/>
+          </a:p>
+          <a:p>
+            <a:endParaRPr lang="en-US" baseline="0" dirty="0" smtClean="0"/>
+          </a:p>
+          <a:p>
             <a:r>
               <a:rPr lang="en-US" baseline="0" dirty="0" smtClean="0"/>
-              <a:t>. The objective is to provide </a:t>
-            </a:r>
-            <a:r>
-              <a:rPr lang="en-US" baseline="0" dirty="0" err="1" smtClean="0"/>
-              <a:t>Scala</a:t>
-            </a:r>
+              <a:t>I am a developer from the New York office</a:t>
+            </a:r>
+          </a:p>
+          <a:p>
+            <a:endParaRPr lang="en-US" baseline="0" dirty="0" smtClean="0"/>
+          </a:p>
+          <a:p>
             <a:r>
               <a:rPr lang="en-US" baseline="0" dirty="0" smtClean="0"/>
-              <a:t> as a viable option when you pick your next language.</a:t>
-            </a:r>
-          </a:p>
-          <a:p>
-            <a:endParaRPr lang="en-US" baseline="0" dirty="0" smtClean="0"/>
-          </a:p>
-          <a:p>
-            <a:r>
-              <a:rPr lang="en-US" baseline="0" dirty="0" smtClean="0"/>
-              <a:t>The JVM went through several waves of improvement. The initial naïve implementation would compile </a:t>
-            </a:r>
-            <a:r>
-              <a:rPr lang="en-US" baseline="0" dirty="0" err="1" smtClean="0"/>
-              <a:t>bytecode</a:t>
-            </a:r>
-            <a:r>
-              <a:rPr lang="en-US" baseline="0" dirty="0" smtClean="0"/>
-              <a:t> to machine code </a:t>
-            </a:r>
-            <a:r>
-              <a:rPr lang="en-US" baseline="0" dirty="0" err="1" smtClean="0"/>
-              <a:t>everytime</a:t>
-            </a:r>
-            <a:r>
-              <a:rPr lang="en-US" baseline="0" dirty="0" smtClean="0"/>
-              <a:t> you encountered the byte code. Significant revision was the JIT compiler that compiles byte code the first time it encounters it and then caches the machine code for subsequent usage. Then another wave was </a:t>
-            </a:r>
-            <a:r>
-              <a:rPr lang="en-US" baseline="0" dirty="0" err="1" smtClean="0"/>
-              <a:t>siginificant</a:t>
-            </a:r>
-            <a:r>
-              <a:rPr lang="en-US" baseline="0" dirty="0" smtClean="0"/>
-              <a:t> improvement was adaptive optimization which means the JVM is going to monitor to see what code gets used a lot known as “hotspot”. There is typically this 20% of the code that gets executed 80% of the time and then the JVM is going to optimize the native code heavily. The rest 80% need not be even cached.</a:t>
-            </a:r>
-          </a:p>
-          <a:p>
-            <a:endParaRPr lang="en-US" baseline="0" dirty="0" smtClean="0"/>
-          </a:p>
-          <a:p>
-            <a:r>
-              <a:rPr lang="en-US" baseline="0" dirty="0" err="1" smtClean="0"/>
-              <a:t>JVM’s</a:t>
-            </a:r>
-            <a:r>
-              <a:rPr lang="en-US" baseline="0" dirty="0" smtClean="0"/>
-              <a:t> generational garbage collection is vastly superior to mark-and-</a:t>
-            </a:r>
-            <a:r>
-              <a:rPr lang="en-US" baseline="0" smtClean="0"/>
-              <a:t>sweep algorithm. </a:t>
-            </a:r>
-            <a:endParaRPr lang="en-US" baseline="0" dirty="0" smtClean="0"/>
-          </a:p>
-          <a:p>
-            <a:endParaRPr lang="en-US" baseline="0" dirty="0" smtClean="0"/>
-          </a:p>
-          <a:p>
-            <a:r>
-              <a:rPr lang="en-US" dirty="0" smtClean="0"/>
-              <a:t>http://blog.dhananjaynene.com/2008/07/performance-comparison-c-java-python-ruby-jython-jruby-groovy/</a:t>
+              <a:t>I have been with ThoughtWorks for about 5 years now</a:t>
             </a:r>
             <a:endParaRPr lang="en-US" dirty="0"/>
           </a:p>
@@ -638,7 +589,7 @@
             <a:fld id="{765C5218-4828-B544-9955-A4B6719EC9E2}" type="slidenum">
               <a:rPr lang="en-US" smtClean="0"/>
               <a:pPr/>
-              <a:t>3</a:t>
+              <a:t>1</a:t>
             </a:fld>
             <a:endParaRPr lang="en-US"/>
           </a:p>
@@ -694,11 +645,292 @@
         <p:spPr/>
         <p:txBody>
           <a:bodyPr>
-            <a:normAutofit/>
+            <a:normAutofit fontScale="92500" lnSpcReduction="10000"/>
           </a:bodyPr>
           <a:lstStyle/>
           <a:p>
-            <a:endParaRPr lang="en-US" dirty="0"/>
+            <a:r>
+              <a:rPr lang="en-US" dirty="0" smtClean="0"/>
+              <a:t>Examples</a:t>
+            </a:r>
+            <a:r>
+              <a:rPr lang="en-US" baseline="0" dirty="0" smtClean="0"/>
+              <a:t> of parallel operations: filtering a collection, removing certain elements, searching elements from a collection, sorting a collection, selecting max of an array</a:t>
+            </a:r>
+          </a:p>
+          <a:p>
+            <a:endParaRPr lang="en-US" dirty="0" smtClean="0"/>
+          </a:p>
+          <a:p>
+            <a:r>
+              <a:rPr lang="en-US" dirty="0" err="1" smtClean="0"/>
+              <a:t>Scala</a:t>
+            </a:r>
+            <a:r>
+              <a:rPr lang="en-US" dirty="0" smtClean="0"/>
+              <a:t> by default uses </a:t>
+            </a:r>
+            <a:r>
+              <a:rPr lang="en-US" sz="1200" kern="1200" dirty="0" err="1" smtClean="0">
+                <a:solidFill>
+                  <a:schemeClr val="tx1"/>
+                </a:solidFill>
+                <a:latin typeface="+mn-lt"/>
+                <a:ea typeface="+mn-ea"/>
+                <a:cs typeface="+mn-cs"/>
+              </a:rPr>
+              <a:t>ForkJoin</a:t>
+            </a:r>
+            <a:r>
+              <a:rPr lang="en-US" sz="1200" kern="1200" baseline="0" dirty="0" smtClean="0">
+                <a:solidFill>
+                  <a:schemeClr val="tx1"/>
+                </a:solidFill>
+                <a:latin typeface="+mn-lt"/>
+                <a:ea typeface="+mn-ea"/>
+                <a:cs typeface="+mn-cs"/>
+              </a:rPr>
+              <a:t> framework underneath on Java 1.6 and greater. For 1.5 it falls back to </a:t>
+            </a:r>
+            <a:r>
+              <a:rPr lang="en-US" sz="1200" kern="1200" baseline="0" dirty="0" err="1" smtClean="0">
+                <a:solidFill>
+                  <a:schemeClr val="tx1"/>
+                </a:solidFill>
+                <a:latin typeface="+mn-lt"/>
+                <a:ea typeface="+mn-ea"/>
+                <a:cs typeface="+mn-cs"/>
+              </a:rPr>
+              <a:t>ThreadPoolExecutor</a:t>
+            </a:r>
+            <a:r>
+              <a:rPr lang="en-US" sz="1200" kern="1200" baseline="0" dirty="0" smtClean="0">
+                <a:solidFill>
+                  <a:schemeClr val="tx1"/>
+                </a:solidFill>
+                <a:latin typeface="+mn-lt"/>
+                <a:ea typeface="+mn-ea"/>
+                <a:cs typeface="+mn-cs"/>
+              </a:rPr>
+              <a:t>.</a:t>
+            </a:r>
+          </a:p>
+          <a:p>
+            <a:endParaRPr lang="en-US" sz="1200" kern="1200" baseline="0" dirty="0" smtClean="0">
+              <a:solidFill>
+                <a:schemeClr val="tx1"/>
+              </a:solidFill>
+              <a:latin typeface="+mn-lt"/>
+              <a:ea typeface="+mn-ea"/>
+              <a:cs typeface="+mn-cs"/>
+            </a:endParaRPr>
+          </a:p>
+          <a:p>
+            <a:r>
+              <a:rPr lang="en-US" sz="1200" kern="1200" baseline="0" dirty="0" smtClean="0">
+                <a:solidFill>
+                  <a:schemeClr val="tx1"/>
+                </a:solidFill>
+                <a:latin typeface="+mn-lt"/>
+                <a:ea typeface="+mn-ea"/>
+                <a:cs typeface="+mn-cs"/>
+              </a:rPr>
+              <a:t>The collection is broken down in partitions and will be generally reassembled in the same order.</a:t>
+            </a:r>
+          </a:p>
+          <a:p>
+            <a:endParaRPr lang="en-US" sz="1200" kern="1200" baseline="0" dirty="0" smtClean="0">
+              <a:solidFill>
+                <a:schemeClr val="tx1"/>
+              </a:solidFill>
+              <a:latin typeface="+mn-lt"/>
+              <a:ea typeface="+mn-ea"/>
+              <a:cs typeface="+mn-cs"/>
+            </a:endParaRPr>
+          </a:p>
+          <a:p>
+            <a:r>
+              <a:rPr lang="en-US" sz="1200" kern="1200" baseline="0" dirty="0" smtClean="0">
+                <a:solidFill>
+                  <a:schemeClr val="tx1"/>
+                </a:solidFill>
+                <a:latin typeface="+mn-lt"/>
+                <a:ea typeface="+mn-ea"/>
+                <a:cs typeface="+mn-cs"/>
+              </a:rPr>
+              <a:t>Remember this is a framework not a set of collections. You could create your own if you implement the combiner and splitter.</a:t>
+            </a:r>
+          </a:p>
+          <a:p>
+            <a:endParaRPr lang="en-US" sz="1200" kern="1200" baseline="0" dirty="0" smtClean="0">
+              <a:solidFill>
+                <a:schemeClr val="tx1"/>
+              </a:solidFill>
+              <a:latin typeface="+mn-lt"/>
+              <a:ea typeface="+mn-ea"/>
+              <a:cs typeface="+mn-cs"/>
+            </a:endParaRPr>
+          </a:p>
+          <a:p>
+            <a:r>
+              <a:rPr lang="en-US" sz="1200" kern="1200" baseline="0" dirty="0" smtClean="0">
+                <a:solidFill>
+                  <a:schemeClr val="tx1"/>
+                </a:solidFill>
+                <a:latin typeface="+mn-lt"/>
+                <a:ea typeface="+mn-ea"/>
+                <a:cs typeface="+mn-cs"/>
+              </a:rPr>
+              <a:t>Sometimes sequential processing is going to be faster because in parallel processing there is a cost associated with spitting the input and combining the results.</a:t>
+            </a:r>
+          </a:p>
+          <a:p>
+            <a:endParaRPr lang="en-US" sz="1200" kern="1200" baseline="0" dirty="0" smtClean="0">
+              <a:solidFill>
+                <a:schemeClr val="tx1"/>
+              </a:solidFill>
+              <a:latin typeface="+mn-lt"/>
+              <a:ea typeface="+mn-ea"/>
+              <a:cs typeface="+mn-cs"/>
+            </a:endParaRPr>
+          </a:p>
+          <a:p>
+            <a:r>
+              <a:rPr lang="en-US" sz="1200" kern="1200" baseline="0" dirty="0" smtClean="0">
+                <a:solidFill>
+                  <a:schemeClr val="tx1"/>
+                </a:solidFill>
+                <a:latin typeface="+mn-lt"/>
+                <a:ea typeface="+mn-ea"/>
+                <a:cs typeface="+mn-cs"/>
+              </a:rPr>
+              <a:t>Concurrent collections are collections that can be concurrently modified. Parallel collections are collections that can be processed in </a:t>
+            </a:r>
+            <a:r>
+              <a:rPr lang="en-US" sz="1200" kern="1200" baseline="0" dirty="0" err="1" smtClean="0">
+                <a:solidFill>
+                  <a:schemeClr val="tx1"/>
+                </a:solidFill>
+                <a:latin typeface="+mn-lt"/>
+                <a:ea typeface="+mn-ea"/>
+                <a:cs typeface="+mn-cs"/>
+              </a:rPr>
+              <a:t>parallell</a:t>
+            </a:r>
+            <a:r>
+              <a:rPr lang="en-US" sz="1200" kern="1200" baseline="0" dirty="0" smtClean="0">
+                <a:solidFill>
+                  <a:schemeClr val="tx1"/>
+                </a:solidFill>
+                <a:latin typeface="+mn-lt"/>
+                <a:ea typeface="+mn-ea"/>
+                <a:cs typeface="+mn-cs"/>
+              </a:rPr>
+              <a:t>.</a:t>
+            </a:r>
+          </a:p>
+          <a:p>
+            <a:endParaRPr lang="en-US" sz="1200" kern="1200" baseline="0" dirty="0" smtClean="0">
+              <a:solidFill>
+                <a:schemeClr val="tx1"/>
+              </a:solidFill>
+              <a:latin typeface="+mn-lt"/>
+              <a:ea typeface="+mn-ea"/>
+              <a:cs typeface="+mn-cs"/>
+            </a:endParaRPr>
+          </a:p>
+          <a:p>
+            <a:r>
+              <a:rPr lang="en-US" sz="1200" kern="1200" baseline="0" dirty="0" smtClean="0">
+                <a:solidFill>
+                  <a:schemeClr val="tx1"/>
+                </a:solidFill>
+                <a:latin typeface="+mn-lt"/>
+                <a:ea typeface="+mn-ea"/>
+                <a:cs typeface="+mn-cs"/>
+              </a:rPr>
+              <a:t>One key difference is that F-J seems to be designed to work on a single Java VM, while M-R is explicitly designed to work on a large cluster of machines. These are very different scenarios.</a:t>
+            </a:r>
+          </a:p>
+          <a:p>
+            <a:endParaRPr lang="en-US" sz="1200" kern="1200" baseline="0" dirty="0" smtClean="0">
+              <a:solidFill>
+                <a:schemeClr val="tx1"/>
+              </a:solidFill>
+              <a:latin typeface="+mn-lt"/>
+              <a:ea typeface="+mn-ea"/>
+              <a:cs typeface="+mn-cs"/>
+            </a:endParaRPr>
+          </a:p>
+          <a:p>
+            <a:r>
+              <a:rPr lang="en-US" sz="1200" kern="1200" baseline="0" dirty="0" smtClean="0">
+                <a:solidFill>
+                  <a:schemeClr val="tx1"/>
+                </a:solidFill>
+                <a:latin typeface="+mn-lt"/>
+                <a:ea typeface="+mn-ea"/>
+                <a:cs typeface="+mn-cs"/>
+              </a:rPr>
+              <a:t>F-J = Fork/Join; M-R = Map/Reduce</a:t>
+            </a:r>
+          </a:p>
+          <a:p>
+            <a:endParaRPr lang="en-US" sz="1200" kern="1200" baseline="0" dirty="0" smtClean="0">
+              <a:solidFill>
+                <a:schemeClr val="tx1"/>
+              </a:solidFill>
+              <a:latin typeface="+mn-lt"/>
+              <a:ea typeface="+mn-ea"/>
+              <a:cs typeface="+mn-cs"/>
+            </a:endParaRPr>
+          </a:p>
+          <a:p>
+            <a:r>
+              <a:rPr lang="en-US" sz="1200" kern="1200" baseline="0" dirty="0" smtClean="0">
+                <a:solidFill>
+                  <a:schemeClr val="tx1"/>
+                </a:solidFill>
+                <a:latin typeface="+mn-lt"/>
+                <a:ea typeface="+mn-ea"/>
+                <a:cs typeface="+mn-cs"/>
+              </a:rPr>
+              <a:t>F-J offers facilities to partition a task into several subtasks, in a recursive-looking fashion; more tiers, possibility of 'inter-fork' communication at this stage, much more traditional programming. Does not extend (at least in the paper) beyond a single machine. Great for taking advantage of your eight-core.</a:t>
+            </a:r>
+          </a:p>
+          <a:p>
+            <a:endParaRPr lang="en-US" sz="1200" kern="1200" baseline="0" dirty="0" smtClean="0">
+              <a:solidFill>
+                <a:schemeClr val="tx1"/>
+              </a:solidFill>
+              <a:latin typeface="+mn-lt"/>
+              <a:ea typeface="+mn-ea"/>
+              <a:cs typeface="+mn-cs"/>
+            </a:endParaRPr>
+          </a:p>
+          <a:p>
+            <a:r>
+              <a:rPr lang="en-US" sz="1200" kern="1200" baseline="0" dirty="0" smtClean="0">
+                <a:solidFill>
+                  <a:schemeClr val="tx1"/>
+                </a:solidFill>
+                <a:latin typeface="+mn-lt"/>
+                <a:ea typeface="+mn-ea"/>
+                <a:cs typeface="+mn-cs"/>
+              </a:rPr>
+              <a:t>M-R only does one big split, with the mapped splits not talking between each other at all, and then reduces everything together. A single tier, no inter-split communication until reduce, and massively scalable. Great for taking advantage of your share of the cloud</a:t>
+            </a:r>
+            <a:r>
+              <a:rPr lang="en-US" sz="1200" kern="1200" baseline="0" dirty="0" smtClean="0">
+                <a:solidFill>
+                  <a:schemeClr val="tx1"/>
+                </a:solidFill>
+                <a:latin typeface="+mn-lt"/>
+                <a:ea typeface="+mn-ea"/>
+                <a:cs typeface="+mn-cs"/>
+              </a:rPr>
+              <a:t>.</a:t>
+            </a:r>
           </a:p>
         </p:txBody>
       </p:sp>
@@ -720,7 +952,7 @@
             <a:fld id="{765C5218-4828-B544-9955-A4B6719EC9E2}" type="slidenum">
               <a:rPr lang="en-US" smtClean="0"/>
               <a:pPr/>
-              <a:t>17</a:t>
+              <a:t>16</a:t>
             </a:fld>
             <a:endParaRPr lang="en-US"/>
           </a:p>
@@ -780,79 +1012,7 @@
           </a:bodyPr>
           <a:lstStyle/>
           <a:p>
-            <a:r>
-              <a:rPr lang="en-US" baseline="0" dirty="0" smtClean="0"/>
-              <a:t>Actors </a:t>
-            </a:r>
-            <a:r>
-              <a:rPr lang="en-US" baseline="0" dirty="0" smtClean="0"/>
-              <a:t>are light-weight than threads? Stack frames? Locking mechanisms?</a:t>
-            </a:r>
-          </a:p>
-          <a:p>
-            <a:endParaRPr lang="en-US" baseline="0" dirty="0" smtClean="0"/>
-          </a:p>
-          <a:p>
-            <a:r>
-              <a:rPr lang="en-US" baseline="0" dirty="0" smtClean="0"/>
-              <a:t>Thread-based actors </a:t>
-            </a:r>
-            <a:r>
-              <a:rPr lang="en-US" baseline="0" dirty="0" err="1" smtClean="0"/>
-              <a:t>vs</a:t>
-            </a:r>
-            <a:r>
-              <a:rPr lang="en-US" baseline="0" dirty="0" smtClean="0"/>
-              <a:t> Event based actors</a:t>
-            </a:r>
-          </a:p>
-          <a:p>
-            <a:endParaRPr lang="en-US" baseline="0" dirty="0" smtClean="0"/>
-          </a:p>
-          <a:p>
-            <a:r>
-              <a:rPr lang="en-US" baseline="0" dirty="0" smtClean="0"/>
-              <a:t>Thread based actors block a thread </a:t>
-            </a:r>
-            <a:r>
-              <a:rPr lang="en-US" baseline="0" dirty="0" err="1" smtClean="0"/>
-              <a:t>vs</a:t>
-            </a:r>
-            <a:r>
-              <a:rPr lang="en-US" baseline="0" dirty="0" smtClean="0"/>
-              <a:t> Event based actors reuse a pool of threads. Generally it is a good idea to go with event based model. But if your actor receives too many messages and is short-lived event based model might not be the right choice.</a:t>
-            </a:r>
-          </a:p>
-          <a:p>
-            <a:endParaRPr lang="en-US" baseline="0" dirty="0" smtClean="0"/>
-          </a:p>
-          <a:p>
-            <a:r>
-              <a:rPr lang="en-US" baseline="0" dirty="0" smtClean="0"/>
-              <a:t>How do they compare in performance to Thread</a:t>
-            </a:r>
-          </a:p>
-          <a:p>
-            <a:endParaRPr lang="en-US" baseline="0" dirty="0" smtClean="0"/>
-          </a:p>
-          <a:p>
-            <a:r>
-              <a:rPr lang="en-US" baseline="0" dirty="0" smtClean="0"/>
-              <a:t>Actors can be remote</a:t>
-            </a:r>
-          </a:p>
-          <a:p>
-            <a:endParaRPr lang="en-US" baseline="0" dirty="0" smtClean="0"/>
-          </a:p>
-          <a:p>
-            <a:r>
-              <a:rPr lang="en-US" baseline="0" dirty="0" err="1" smtClean="0"/>
-              <a:t>Erlang</a:t>
-            </a:r>
-            <a:r>
-              <a:rPr lang="en-US" baseline="0" dirty="0" smtClean="0"/>
-              <a:t> has uptime of 99.999% something like 5 minutes of downtime a year</a:t>
-            </a:r>
+            <a:endParaRPr lang="en-US" dirty="0"/>
           </a:p>
         </p:txBody>
       </p:sp>
@@ -874,7 +1034,7 @@
             <a:fld id="{765C5218-4828-B544-9955-A4B6719EC9E2}" type="slidenum">
               <a:rPr lang="en-US" smtClean="0"/>
               <a:pPr/>
-              <a:t>18</a:t>
+              <a:t>17</a:t>
             </a:fld>
             <a:endParaRPr lang="en-US"/>
           </a:p>
@@ -934,7 +1094,79 @@
           </a:bodyPr>
           <a:lstStyle/>
           <a:p>
-            <a:endParaRPr lang="en-US" dirty="0"/>
+            <a:r>
+              <a:rPr lang="en-US" baseline="0" dirty="0" smtClean="0"/>
+              <a:t>Actors </a:t>
+            </a:r>
+            <a:r>
+              <a:rPr lang="en-US" baseline="0" dirty="0" smtClean="0"/>
+              <a:t>are light-weight than threads? Stack frames? Locking mechanisms?</a:t>
+            </a:r>
+          </a:p>
+          <a:p>
+            <a:endParaRPr lang="en-US" baseline="0" dirty="0" smtClean="0"/>
+          </a:p>
+          <a:p>
+            <a:r>
+              <a:rPr lang="en-US" baseline="0" dirty="0" smtClean="0"/>
+              <a:t>Thread-based actors </a:t>
+            </a:r>
+            <a:r>
+              <a:rPr lang="en-US" baseline="0" dirty="0" err="1" smtClean="0"/>
+              <a:t>vs</a:t>
+            </a:r>
+            <a:r>
+              <a:rPr lang="en-US" baseline="0" dirty="0" smtClean="0"/>
+              <a:t> Event based actors</a:t>
+            </a:r>
+          </a:p>
+          <a:p>
+            <a:endParaRPr lang="en-US" baseline="0" dirty="0" smtClean="0"/>
+          </a:p>
+          <a:p>
+            <a:r>
+              <a:rPr lang="en-US" baseline="0" dirty="0" smtClean="0"/>
+              <a:t>Thread based actors block a thread </a:t>
+            </a:r>
+            <a:r>
+              <a:rPr lang="en-US" baseline="0" dirty="0" err="1" smtClean="0"/>
+              <a:t>vs</a:t>
+            </a:r>
+            <a:r>
+              <a:rPr lang="en-US" baseline="0" dirty="0" smtClean="0"/>
+              <a:t> Event based actors reuse a pool of threads. Generally it is a good idea to go with event based model. But if your actor receives too many messages and is short-lived event based model might not be the right choice.</a:t>
+            </a:r>
+          </a:p>
+          <a:p>
+            <a:endParaRPr lang="en-US" baseline="0" dirty="0" smtClean="0"/>
+          </a:p>
+          <a:p>
+            <a:r>
+              <a:rPr lang="en-US" baseline="0" dirty="0" smtClean="0"/>
+              <a:t>How do they compare in performance to Thread</a:t>
+            </a:r>
+          </a:p>
+          <a:p>
+            <a:endParaRPr lang="en-US" baseline="0" dirty="0" smtClean="0"/>
+          </a:p>
+          <a:p>
+            <a:r>
+              <a:rPr lang="en-US" baseline="0" dirty="0" smtClean="0"/>
+              <a:t>Actors can be remote</a:t>
+            </a:r>
+          </a:p>
+          <a:p>
+            <a:endParaRPr lang="en-US" baseline="0" dirty="0" smtClean="0"/>
+          </a:p>
+          <a:p>
+            <a:r>
+              <a:rPr lang="en-US" baseline="0" dirty="0" err="1" smtClean="0"/>
+              <a:t>Erlang</a:t>
+            </a:r>
+            <a:r>
+              <a:rPr lang="en-US" baseline="0" dirty="0" smtClean="0"/>
+              <a:t> has uptime of 99.999% something like 5 minutes of downtime a year</a:t>
+            </a:r>
           </a:p>
         </p:txBody>
       </p:sp>
@@ -956,7 +1188,7 @@
             <a:fld id="{765C5218-4828-B544-9955-A4B6719EC9E2}" type="slidenum">
               <a:rPr lang="en-US" smtClean="0"/>
               <a:pPr/>
-              <a:t>19</a:t>
+              <a:t>18</a:t>
             </a:fld>
             <a:endParaRPr lang="en-US"/>
           </a:p>
@@ -1016,30 +1248,6 @@
           </a:bodyPr>
           <a:lstStyle/>
           <a:p>
-            <a:r>
-              <a:rPr lang="en-US" dirty="0" smtClean="0"/>
-              <a:t>I visited</a:t>
-            </a:r>
-            <a:r>
-              <a:rPr lang="en-US" baseline="0" dirty="0" smtClean="0"/>
-              <a:t> the Met a couple of months ago and I saw this intricately hand woven Persian rug. What caught my eye was this phrase “Functional yet beautiful”. I like how the attribute of being functional came before beautiful. Something has to be functional first before being beautiful. And just because it is functional does not mean it has to be any less beautiful. And that is what </a:t>
-            </a:r>
-            <a:r>
-              <a:rPr lang="en-US" baseline="0" dirty="0" err="1" smtClean="0"/>
-              <a:t>Scala</a:t>
-            </a:r>
-            <a:r>
-              <a:rPr lang="en-US" baseline="0" dirty="0" smtClean="0"/>
-              <a:t> means to me. Functional (pun intended), </a:t>
-            </a:r>
-            <a:r>
-              <a:rPr lang="en-US" baseline="0" dirty="0" err="1" smtClean="0"/>
-              <a:t>performant</a:t>
-            </a:r>
-            <a:r>
-              <a:rPr lang="en-US" baseline="0" dirty="0" smtClean="0"/>
-              <a:t> yet beautiful.</a:t>
-            </a:r>
             <a:endParaRPr lang="en-US" dirty="0"/>
           </a:p>
         </p:txBody>
@@ -1062,7 +1270,7 @@
             <a:fld id="{765C5218-4828-B544-9955-A4B6719EC9E2}" type="slidenum">
               <a:rPr lang="en-US" smtClean="0"/>
               <a:pPr/>
-              <a:t>22</a:t>
+              <a:t>19</a:t>
             </a:fld>
             <a:endParaRPr lang="en-US"/>
           </a:p>
@@ -1122,6 +1330,112 @@
           </a:bodyPr>
           <a:lstStyle/>
           <a:p>
+            <a:r>
+              <a:rPr lang="en-US" dirty="0" smtClean="0"/>
+              <a:t>I visited</a:t>
+            </a:r>
+            <a:r>
+              <a:rPr lang="en-US" baseline="0" dirty="0" smtClean="0"/>
+              <a:t> the Met a couple of months ago and I saw this intricately hand woven Persian rug. What caught my eye was this phrase “Functional yet beautiful”. I like how the attribute of being functional came before beautiful. Something has to be functional first before being beautiful. And just because it is functional does not mean it has to be any less beautiful. And that is what </a:t>
+            </a:r>
+            <a:r>
+              <a:rPr lang="en-US" baseline="0" dirty="0" err="1" smtClean="0"/>
+              <a:t>Scala</a:t>
+            </a:r>
+            <a:r>
+              <a:rPr lang="en-US" baseline="0" dirty="0" smtClean="0"/>
+              <a:t> means to me. Functional (pun intended), </a:t>
+            </a:r>
+            <a:r>
+              <a:rPr lang="en-US" baseline="0" dirty="0" err="1" smtClean="0"/>
+              <a:t>performant</a:t>
+            </a:r>
+            <a:r>
+              <a:rPr lang="en-US" baseline="0" dirty="0" smtClean="0"/>
+              <a:t> yet beautiful.</a:t>
+            </a:r>
+            <a:endParaRPr lang="en-US" dirty="0"/>
+          </a:p>
+        </p:txBody>
+      </p:sp>
+      <p:sp>
+        <p:nvSpPr>
+          <p:cNvPr id="4" name="Slide Number Placeholder 3"/>
+          <p:cNvSpPr>
+            <a:spLocks noGrp="1"/>
+          </p:cNvSpPr>
+          <p:nvPr>
+            <p:ph type="sldNum" sz="quarter" idx="10"/>
+          </p:nvPr>
+        </p:nvSpPr>
+        <p:spPr/>
+        <p:txBody>
+          <a:bodyPr/>
+          <a:lstStyle/>
+          <a:p>
+            <a:fld id="{765C5218-4828-B544-9955-A4B6719EC9E2}" type="slidenum">
+              <a:rPr lang="en-US" smtClean="0"/>
+              <a:pPr/>
+              <a:t>22</a:t>
+            </a:fld>
+            <a:endParaRPr lang="en-US"/>
+          </a:p>
+        </p:txBody>
+      </p:sp>
+    </p:spTree>
+  </p:cSld>
+  <p:clrMapOvr>
+    <a:masterClrMapping/>
+  </p:clrMapOvr>
+</p:notes>
+</file>
+
+<file path=ppt/notesSlides/notesSlide15.xml><?xml version="1.0" encoding="utf-8"?>
+<p:notes xmlns:a="http://schemas.openxmlformats.org/drawingml/2006/main" xmlns:r="http://schemas.openxmlformats.org/officeDocument/2006/relationships" xmlns:mc="http://schemas.openxmlformats.org/markup-compatibility/2006" xmlns:mv="urn:schemas-microsoft-com:mac:vml" xmlns:p="http://schemas.openxmlformats.org/presentationml/2006/main" mc:Ignorable="mv" mc:PreserveAttributes="mv:*">
+  <p:cSld>
+    <p:spTree>
+      <p:nvGrpSpPr>
+        <p:cNvPr id="1" name=""/>
+        <p:cNvGrpSpPr/>
+        <p:nvPr/>
+      </p:nvGrpSpPr>
+      <p:grpSpPr>
+        <a:xfrm>
+          <a:off x="0" y="0"/>
+          <a:ext cx="0" cy="0"/>
+          <a:chOff x="0" y="0"/>
+          <a:chExt cx="0" cy="0"/>
+        </a:xfrm>
+      </p:grpSpPr>
+      <p:sp>
+        <p:nvSpPr>
+          <p:cNvPr id="2" name="Slide Image Placeholder 1"/>
+          <p:cNvSpPr>
+            <a:spLocks noGrp="1" noRot="1" noChangeAspect="1"/>
+          </p:cNvSpPr>
+          <p:nvPr>
+            <p:ph type="sldImg"/>
+          </p:nvPr>
+        </p:nvSpPr>
+        <p:spPr/>
+      </p:sp>
+      <p:sp>
+        <p:nvSpPr>
+          <p:cNvPr id="3" name="Notes Placeholder 2"/>
+          <p:cNvSpPr>
+            <a:spLocks noGrp="1"/>
+          </p:cNvSpPr>
+          <p:nvPr>
+            <p:ph type="body" idx="1"/>
+          </p:nvPr>
+        </p:nvSpPr>
+        <p:spPr/>
+        <p:txBody>
+          <a:bodyPr>
+            <a:normAutofit/>
+          </a:bodyPr>
+          <a:lstStyle/>
+          <a:p>
             <a:endParaRPr lang="en-US" dirty="0"/>
           </a:p>
         </p:txBody>
@@ -1204,6 +1518,90 @@
           </a:bodyPr>
           <a:lstStyle/>
           <a:p>
+            <a:r>
+              <a:rPr lang="en-US" dirty="0" smtClean="0"/>
+              <a:t>The general</a:t>
+            </a:r>
+            <a:r>
+              <a:rPr lang="en-US" baseline="0" dirty="0" smtClean="0"/>
+              <a:t> perception is that Ruby is a concise, expressive language than most of the languages we work on here at ThoughtWorks and similarly Java is </a:t>
+            </a:r>
+            <a:r>
+              <a:rPr lang="en-US" baseline="0" dirty="0" err="1" smtClean="0"/>
+              <a:t>performant</a:t>
+            </a:r>
+            <a:r>
+              <a:rPr lang="en-US" baseline="0" dirty="0" smtClean="0"/>
+              <a:t>. The objective is to provide </a:t>
+            </a:r>
+            <a:r>
+              <a:rPr lang="en-US" baseline="0" dirty="0" err="1" smtClean="0"/>
+              <a:t>Scala</a:t>
+            </a:r>
+            <a:r>
+              <a:rPr lang="en-US" baseline="0" dirty="0" smtClean="0"/>
+              <a:t> as a viable option when you pick your next language.</a:t>
+            </a:r>
+          </a:p>
+          <a:p>
+            <a:endParaRPr lang="en-US" baseline="0" dirty="0" smtClean="0"/>
+          </a:p>
+          <a:p>
+            <a:r>
+              <a:rPr lang="en-US" baseline="0" dirty="0" smtClean="0"/>
+              <a:t>The JVM went through several waves of improvement. The initial naïve implementation would compile </a:t>
+            </a:r>
+            <a:r>
+              <a:rPr lang="en-US" baseline="0" dirty="0" err="1" smtClean="0"/>
+              <a:t>bytecode</a:t>
+            </a:r>
+            <a:r>
+              <a:rPr lang="en-US" baseline="0" dirty="0" smtClean="0"/>
+              <a:t> to machine code </a:t>
+            </a:r>
+            <a:r>
+              <a:rPr lang="en-US" baseline="0" dirty="0" err="1" smtClean="0"/>
+              <a:t>everytime</a:t>
+            </a:r>
+            <a:r>
+              <a:rPr lang="en-US" baseline="0" dirty="0" smtClean="0"/>
+              <a:t> you encountered the byte code. Significant revision was the JIT compiler that compiles byte code the first time it encounters it and then caches the machine code for subsequent usage. Then another wave was </a:t>
+            </a:r>
+            <a:r>
+              <a:rPr lang="en-US" baseline="0" dirty="0" err="1" smtClean="0"/>
+              <a:t>siginificant</a:t>
+            </a:r>
+            <a:r>
+              <a:rPr lang="en-US" baseline="0" dirty="0" smtClean="0"/>
+              <a:t> improvement was adaptive optimization which means the JVM is going to monitor to see what code gets used a lot known as “hotspot”. There is typically this 20% of the code that gets executed 80% of the time and then the JVM is going to optimize the native code heavily. The rest 80% need not be even cached.</a:t>
+            </a:r>
+          </a:p>
+          <a:p>
+            <a:endParaRPr lang="en-US" baseline="0" dirty="0" smtClean="0"/>
+          </a:p>
+          <a:p>
+            <a:r>
+              <a:rPr lang="en-US" baseline="0" dirty="0" err="1" smtClean="0"/>
+              <a:t>JVM’s</a:t>
+            </a:r>
+            <a:r>
+              <a:rPr lang="en-US" baseline="0" dirty="0" smtClean="0"/>
+              <a:t> generational garbage collection is vastly superior to mark-and-</a:t>
+            </a:r>
+            <a:r>
+              <a:rPr lang="en-US" baseline="0" smtClean="0"/>
+              <a:t>sweep algorithm. </a:t>
+            </a:r>
+            <a:endParaRPr lang="en-US" baseline="0" dirty="0" smtClean="0"/>
+          </a:p>
+          <a:p>
+            <a:endParaRPr lang="en-US" baseline="0" dirty="0" smtClean="0"/>
+          </a:p>
+          <a:p>
+            <a:r>
+              <a:rPr lang="en-US" dirty="0" smtClean="0"/>
+              <a:t>http://blog.dhananjaynene.com/2008/07/performance-comparison-c-java-python-ruby-jython-jruby-groovy/</a:t>
+            </a:r>
             <a:endParaRPr lang="en-US" dirty="0"/>
           </a:p>
         </p:txBody>
@@ -1226,7 +1624,7 @@
             <a:fld id="{765C5218-4828-B544-9955-A4B6719EC9E2}" type="slidenum">
               <a:rPr lang="en-US" smtClean="0"/>
               <a:pPr/>
-              <a:t>5</a:t>
+              <a:t>3</a:t>
             </a:fld>
             <a:endParaRPr lang="en-US"/>
           </a:p>
@@ -1286,14 +1684,6 @@
           </a:bodyPr>
           <a:lstStyle/>
           <a:p>
-            <a:r>
-              <a:rPr lang="en-US" dirty="0" smtClean="0"/>
-              <a:t>Not to</a:t>
-            </a:r>
-            <a:r>
-              <a:rPr lang="en-US" baseline="0" dirty="0" smtClean="0"/>
-              <a:t> look down upon any language.</a:t>
-            </a:r>
             <a:endParaRPr lang="en-US" dirty="0"/>
           </a:p>
         </p:txBody>
@@ -1316,7 +1706,7 @@
             <a:fld id="{765C5218-4828-B544-9955-A4B6719EC9E2}" type="slidenum">
               <a:rPr lang="en-US" smtClean="0"/>
               <a:pPr/>
-              <a:t>6</a:t>
+              <a:t>5</a:t>
             </a:fld>
             <a:endParaRPr lang="en-US"/>
           </a:p>
@@ -1378,48 +1768,11 @@
           <a:p>
             <a:r>
               <a:rPr lang="en-US" dirty="0" smtClean="0"/>
-              <a:t>When</a:t>
+              <a:t>Not to</a:t>
             </a:r>
             <a:r>
               <a:rPr lang="en-US" baseline="0" dirty="0" smtClean="0"/>
-              <a:t> I first came to Ruby, the thing that really impressed me was closures. I was thinking this is great. Clean and concise.</a:t>
-            </a:r>
-          </a:p>
-          <a:p>
-            <a:endParaRPr lang="en-US" dirty="0" smtClean="0"/>
-          </a:p>
-          <a:p>
-            <a:r>
-              <a:rPr lang="en-US" dirty="0" smtClean="0"/>
-              <a:t>In Ruby, blocks</a:t>
-            </a:r>
-            <a:r>
-              <a:rPr lang="en-US" baseline="0" dirty="0" smtClean="0"/>
-              <a:t> cannot live on their own. They need to be converted to </a:t>
-            </a:r>
-            <a:r>
-              <a:rPr lang="en-US" baseline="0" dirty="0" err="1" smtClean="0"/>
-              <a:t>Procs</a:t>
-            </a:r>
-            <a:r>
-              <a:rPr lang="en-US" baseline="0" dirty="0" smtClean="0"/>
-              <a:t> using </a:t>
-            </a:r>
-            <a:r>
-              <a:rPr lang="en-US" baseline="0" dirty="0" err="1" smtClean="0"/>
-              <a:t>Proc.new</a:t>
-            </a:r>
-            <a:r>
-              <a:rPr lang="en-US" baseline="0" dirty="0" smtClean="0"/>
-              <a:t> or lambda, which is a shorthand for </a:t>
-            </a:r>
-            <a:r>
-              <a:rPr lang="en-US" baseline="0" dirty="0" err="1" smtClean="0"/>
-              <a:t>Proc.new</a:t>
-            </a:r>
-            <a:r>
-              <a:rPr lang="en-US" baseline="0" dirty="0" smtClean="0"/>
-              <a:t> with subtle difference like lambda checks for number of arguments.</a:t>
+              <a:t> look down upon any language.</a:t>
             </a:r>
             <a:endParaRPr lang="en-US" dirty="0"/>
           </a:p>
@@ -1443,7 +1796,7 @@
             <a:fld id="{765C5218-4828-B544-9955-A4B6719EC9E2}" type="slidenum">
               <a:rPr lang="en-US" smtClean="0"/>
               <a:pPr/>
-              <a:t>8</a:t>
+              <a:t>6</a:t>
             </a:fld>
             <a:endParaRPr lang="en-US"/>
           </a:p>
@@ -1504,20 +1857,49 @@
           <a:lstStyle/>
           <a:p>
             <a:r>
-              <a:rPr lang="en-US" dirty="0" err="1" smtClean="0"/>
-              <a:t>val</a:t>
-            </a:r>
-            <a:r>
               <a:rPr lang="en-US" dirty="0" smtClean="0"/>
-              <a:t> would</a:t>
+              <a:t>When</a:t>
             </a:r>
             <a:r>
               <a:rPr lang="en-US" baseline="0" dirty="0" smtClean="0"/>
-              <a:t> not let you reassign the “from” variable thus avoiding surprises</a:t>
-            </a:r>
+              <a:t> I first came to Ruby, the thing that really impressed me was closures. I was thinking this is great. Clean and concise.</a:t>
+            </a:r>
+          </a:p>
+          <a:p>
+            <a:endParaRPr lang="en-US" dirty="0" smtClean="0"/>
+          </a:p>
+          <a:p>
             <a:r>
               <a:rPr lang="en-US" dirty="0" smtClean="0"/>
-              <a:t> </a:t>
+              <a:t>In Ruby, blocks</a:t>
+            </a:r>
+            <a:r>
+              <a:rPr lang="en-US" baseline="0" dirty="0" smtClean="0"/>
+              <a:t> cannot live on their own. They need to be converted to </a:t>
+            </a:r>
+            <a:r>
+              <a:rPr lang="en-US" baseline="0" dirty="0" err="1" smtClean="0"/>
+              <a:t>Procs</a:t>
+            </a:r>
+            <a:r>
+              <a:rPr lang="en-US" baseline="0" dirty="0" smtClean="0"/>
+              <a:t> using </a:t>
+            </a:r>
+            <a:r>
+              <a:rPr lang="en-US" baseline="0" dirty="0" err="1" smtClean="0"/>
+              <a:t>Proc.new</a:t>
+            </a:r>
+            <a:r>
+              <a:rPr lang="en-US" baseline="0" dirty="0" smtClean="0"/>
+              <a:t> or lambda, which is a shorthand for </a:t>
+            </a:r>
+            <a:r>
+              <a:rPr lang="en-US" baseline="0" dirty="0" err="1" smtClean="0"/>
+              <a:t>Proc.new</a:t>
+            </a:r>
+            <a:r>
+              <a:rPr lang="en-US" baseline="0" dirty="0" smtClean="0"/>
+              <a:t> with subtle difference like lambda checks for number of arguments.</a:t>
             </a:r>
             <a:endParaRPr lang="en-US" dirty="0"/>
           </a:p>
@@ -1541,7 +1923,7 @@
             <a:fld id="{765C5218-4828-B544-9955-A4B6719EC9E2}" type="slidenum">
               <a:rPr lang="en-US" smtClean="0"/>
               <a:pPr/>
-              <a:t>10</a:t>
+              <a:t>8</a:t>
             </a:fld>
             <a:endParaRPr lang="en-US"/>
           </a:p>
@@ -1602,12 +1984,20 @@
           <a:lstStyle/>
           <a:p>
             <a:r>
+              <a:rPr lang="en-US" dirty="0" err="1" smtClean="0"/>
+              <a:t>val</a:t>
+            </a:r>
+            <a:r>
               <a:rPr lang="en-US" dirty="0" smtClean="0"/>
-              <a:t>Consistency:</a:t>
+              <a:t> would</a:t>
             </a:r>
             <a:r>
               <a:rPr lang="en-US" baseline="0" dirty="0" smtClean="0"/>
-              <a:t> Language itself uses implicit conversions</a:t>
+              <a:t> not let you reassign the “from” variable thus avoiding surprises</a:t>
+            </a:r>
+            <a:r>
+              <a:rPr lang="en-US" dirty="0" smtClean="0"/>
+              <a:t> </a:t>
             </a:r>
             <a:endParaRPr lang="en-US" dirty="0"/>
           </a:p>
@@ -1631,7 +2021,7 @@
             <a:fld id="{765C5218-4828-B544-9955-A4B6719EC9E2}" type="slidenum">
               <a:rPr lang="en-US" smtClean="0"/>
               <a:pPr/>
-              <a:t>12</a:t>
+              <a:t>10</a:t>
             </a:fld>
             <a:endParaRPr lang="en-US"/>
           </a:p>
@@ -1691,6 +2081,14 @@
           </a:bodyPr>
           <a:lstStyle/>
           <a:p>
+            <a:r>
+              <a:rPr lang="en-US" dirty="0" smtClean="0"/>
+              <a:t>Consistency:</a:t>
+            </a:r>
+            <a:r>
+              <a:rPr lang="en-US" baseline="0" dirty="0" smtClean="0"/>
+              <a:t> Language itself uses implicit conversions</a:t>
+            </a:r>
             <a:endParaRPr lang="en-US" dirty="0"/>
           </a:p>
         </p:txBody>
@@ -1713,7 +2111,7 @@
             <a:fld id="{765C5218-4828-B544-9955-A4B6719EC9E2}" type="slidenum">
               <a:rPr lang="en-US" smtClean="0"/>
               <a:pPr/>
-              <a:t>13</a:t>
+              <a:t>12</a:t>
             </a:fld>
             <a:endParaRPr lang="en-US"/>
           </a:p>
@@ -1795,7 +2193,7 @@
             <a:fld id="{765C5218-4828-B544-9955-A4B6719EC9E2}" type="slidenum">
               <a:rPr lang="en-US" smtClean="0"/>
               <a:pPr/>
-              <a:t>15</a:t>
+              <a:t>13</a:t>
             </a:fld>
             <a:endParaRPr lang="en-US"/>
           </a:p>
@@ -1851,292 +2249,11 @@
         <p:spPr/>
         <p:txBody>
           <a:bodyPr>
-            <a:normAutofit fontScale="92500" lnSpcReduction="10000"/>
+            <a:normAutofit/>
           </a:bodyPr>
           <a:lstStyle/>
           <a:p>
-            <a:r>
-              <a:rPr lang="en-US" dirty="0" smtClean="0"/>
-              <a:t>Examples</a:t>
-            </a:r>
-            <a:r>
-              <a:rPr lang="en-US" baseline="0" dirty="0" smtClean="0"/>
-              <a:t> of parallel operations: filtering a collection, removing certain elements, searching elements from a collection, sorting a collection, selecting max of an array</a:t>
-            </a:r>
-          </a:p>
-          <a:p>
-            <a:endParaRPr lang="en-US" dirty="0" smtClean="0"/>
-          </a:p>
-          <a:p>
-            <a:r>
-              <a:rPr lang="en-US" dirty="0" err="1" smtClean="0"/>
-              <a:t>Scala</a:t>
-            </a:r>
-            <a:r>
-              <a:rPr lang="en-US" dirty="0" smtClean="0"/>
-              <a:t> by default uses </a:t>
-            </a:r>
-            <a:r>
-              <a:rPr lang="en-US" sz="1200" kern="1200" dirty="0" err="1" smtClean="0">
-                <a:solidFill>
-                  <a:schemeClr val="tx1"/>
-                </a:solidFill>
-                <a:latin typeface="+mn-lt"/>
-                <a:ea typeface="+mn-ea"/>
-                <a:cs typeface="+mn-cs"/>
-              </a:rPr>
-              <a:t>ForkJoin</a:t>
-            </a:r>
-            <a:r>
-              <a:rPr lang="en-US" sz="1200" kern="1200" baseline="0" dirty="0" smtClean="0">
-                <a:solidFill>
-                  <a:schemeClr val="tx1"/>
-                </a:solidFill>
-                <a:latin typeface="+mn-lt"/>
-                <a:ea typeface="+mn-ea"/>
-                <a:cs typeface="+mn-cs"/>
-              </a:rPr>
-              <a:t> framework underneath on Java 1.6 and greater. For 1.5 it falls back to </a:t>
-            </a:r>
-            <a:r>
-              <a:rPr lang="en-US" sz="1200" kern="1200" baseline="0" dirty="0" err="1" smtClean="0">
-                <a:solidFill>
-                  <a:schemeClr val="tx1"/>
-                </a:solidFill>
-                <a:latin typeface="+mn-lt"/>
-                <a:ea typeface="+mn-ea"/>
-                <a:cs typeface="+mn-cs"/>
-              </a:rPr>
-              <a:t>ThreadPoolExecutor</a:t>
-            </a:r>
-            <a:r>
-              <a:rPr lang="en-US" sz="1200" kern="1200" baseline="0" dirty="0" smtClean="0">
-                <a:solidFill>
-                  <a:schemeClr val="tx1"/>
-                </a:solidFill>
-                <a:latin typeface="+mn-lt"/>
-                <a:ea typeface="+mn-ea"/>
-                <a:cs typeface="+mn-cs"/>
-              </a:rPr>
-              <a:t>.</a:t>
-            </a:r>
-          </a:p>
-          <a:p>
-            <a:endParaRPr lang="en-US" sz="1200" kern="1200" baseline="0" dirty="0" smtClean="0">
-              <a:solidFill>
-                <a:schemeClr val="tx1"/>
-              </a:solidFill>
-              <a:latin typeface="+mn-lt"/>
-              <a:ea typeface="+mn-ea"/>
-              <a:cs typeface="+mn-cs"/>
-            </a:endParaRPr>
-          </a:p>
-          <a:p>
-            <a:r>
-              <a:rPr lang="en-US" sz="1200" kern="1200" baseline="0" dirty="0" smtClean="0">
-                <a:solidFill>
-                  <a:schemeClr val="tx1"/>
-                </a:solidFill>
-                <a:latin typeface="+mn-lt"/>
-                <a:ea typeface="+mn-ea"/>
-                <a:cs typeface="+mn-cs"/>
-              </a:rPr>
-              <a:t>The collection is broken down in partitions and will be generally reassembled in the same order.</a:t>
-            </a:r>
-          </a:p>
-          <a:p>
-            <a:endParaRPr lang="en-US" sz="1200" kern="1200" baseline="0" dirty="0" smtClean="0">
-              <a:solidFill>
-                <a:schemeClr val="tx1"/>
-              </a:solidFill>
-              <a:latin typeface="+mn-lt"/>
-              <a:ea typeface="+mn-ea"/>
-              <a:cs typeface="+mn-cs"/>
-            </a:endParaRPr>
-          </a:p>
-          <a:p>
-            <a:r>
-              <a:rPr lang="en-US" sz="1200" kern="1200" baseline="0" dirty="0" smtClean="0">
-                <a:solidFill>
-                  <a:schemeClr val="tx1"/>
-                </a:solidFill>
-                <a:latin typeface="+mn-lt"/>
-                <a:ea typeface="+mn-ea"/>
-                <a:cs typeface="+mn-cs"/>
-              </a:rPr>
-              <a:t>Remember this is a framework not a set of collections. You could create your own if you implement the combiner and splitter.</a:t>
-            </a:r>
-          </a:p>
-          <a:p>
-            <a:endParaRPr lang="en-US" sz="1200" kern="1200" baseline="0" dirty="0" smtClean="0">
-              <a:solidFill>
-                <a:schemeClr val="tx1"/>
-              </a:solidFill>
-              <a:latin typeface="+mn-lt"/>
-              <a:ea typeface="+mn-ea"/>
-              <a:cs typeface="+mn-cs"/>
-            </a:endParaRPr>
-          </a:p>
-          <a:p>
-            <a:r>
-              <a:rPr lang="en-US" sz="1200" kern="1200" baseline="0" dirty="0" smtClean="0">
-                <a:solidFill>
-                  <a:schemeClr val="tx1"/>
-                </a:solidFill>
-                <a:latin typeface="+mn-lt"/>
-                <a:ea typeface="+mn-ea"/>
-                <a:cs typeface="+mn-cs"/>
-              </a:rPr>
-              <a:t>Sometimes sequential processing is going to be faster because in parallel processing there is a cost associated with spitting the input and combining the results.</a:t>
-            </a:r>
-          </a:p>
-          <a:p>
-            <a:endParaRPr lang="en-US" sz="1200" kern="1200" baseline="0" dirty="0" smtClean="0">
-              <a:solidFill>
-                <a:schemeClr val="tx1"/>
-              </a:solidFill>
-              <a:latin typeface="+mn-lt"/>
-              <a:ea typeface="+mn-ea"/>
-              <a:cs typeface="+mn-cs"/>
-            </a:endParaRPr>
-          </a:p>
-          <a:p>
-            <a:r>
-              <a:rPr lang="en-US" sz="1200" kern="1200" baseline="0" dirty="0" smtClean="0">
-                <a:solidFill>
-                  <a:schemeClr val="tx1"/>
-                </a:solidFill>
-                <a:latin typeface="+mn-lt"/>
-                <a:ea typeface="+mn-ea"/>
-                <a:cs typeface="+mn-cs"/>
-              </a:rPr>
-              <a:t>Concurrent collections are collections that can be concurrently modified. Parallel collections are collections that can be processed in </a:t>
-            </a:r>
-            <a:r>
-              <a:rPr lang="en-US" sz="1200" kern="1200" baseline="0" dirty="0" err="1" smtClean="0">
-                <a:solidFill>
-                  <a:schemeClr val="tx1"/>
-                </a:solidFill>
-                <a:latin typeface="+mn-lt"/>
-                <a:ea typeface="+mn-ea"/>
-                <a:cs typeface="+mn-cs"/>
-              </a:rPr>
-              <a:t>parallell</a:t>
-            </a:r>
-            <a:r>
-              <a:rPr lang="en-US" sz="1200" kern="1200" baseline="0" dirty="0" smtClean="0">
-                <a:solidFill>
-                  <a:schemeClr val="tx1"/>
-                </a:solidFill>
-                <a:latin typeface="+mn-lt"/>
-                <a:ea typeface="+mn-ea"/>
-                <a:cs typeface="+mn-cs"/>
-              </a:rPr>
-              <a:t>.</a:t>
-            </a:r>
-          </a:p>
-          <a:p>
-            <a:endParaRPr lang="en-US" sz="1200" kern="1200" baseline="0" dirty="0" smtClean="0">
-              <a:solidFill>
-                <a:schemeClr val="tx1"/>
-              </a:solidFill>
-              <a:latin typeface="+mn-lt"/>
-              <a:ea typeface="+mn-ea"/>
-              <a:cs typeface="+mn-cs"/>
-            </a:endParaRPr>
-          </a:p>
-          <a:p>
-            <a:r>
-              <a:rPr lang="en-US" sz="1200" kern="1200" baseline="0" dirty="0" smtClean="0">
-                <a:solidFill>
-                  <a:schemeClr val="tx1"/>
-                </a:solidFill>
-                <a:latin typeface="+mn-lt"/>
-                <a:ea typeface="+mn-ea"/>
-                <a:cs typeface="+mn-cs"/>
-              </a:rPr>
-              <a:t>One key difference is that F-J seems to be designed to work on a single Java VM, while M-R is explicitly designed to work on a large cluster of machines. These are very different scenarios.</a:t>
-            </a:r>
-          </a:p>
-          <a:p>
-            <a:endParaRPr lang="en-US" sz="1200" kern="1200" baseline="0" dirty="0" smtClean="0">
-              <a:solidFill>
-                <a:schemeClr val="tx1"/>
-              </a:solidFill>
-              <a:latin typeface="+mn-lt"/>
-              <a:ea typeface="+mn-ea"/>
-              <a:cs typeface="+mn-cs"/>
-            </a:endParaRPr>
-          </a:p>
-          <a:p>
-            <a:r>
-              <a:rPr lang="en-US" sz="1200" kern="1200" baseline="0" dirty="0" smtClean="0">
-                <a:solidFill>
-                  <a:schemeClr val="tx1"/>
-                </a:solidFill>
-                <a:latin typeface="+mn-lt"/>
-                <a:ea typeface="+mn-ea"/>
-                <a:cs typeface="+mn-cs"/>
-              </a:rPr>
-              <a:t>F-J = Fork/Join; M-R = Map/Reduce</a:t>
-            </a:r>
-          </a:p>
-          <a:p>
-            <a:endParaRPr lang="en-US" sz="1200" kern="1200" baseline="0" dirty="0" smtClean="0">
-              <a:solidFill>
-                <a:schemeClr val="tx1"/>
-              </a:solidFill>
-              <a:latin typeface="+mn-lt"/>
-              <a:ea typeface="+mn-ea"/>
-              <a:cs typeface="+mn-cs"/>
-            </a:endParaRPr>
-          </a:p>
-          <a:p>
-            <a:r>
-              <a:rPr lang="en-US" sz="1200" kern="1200" baseline="0" dirty="0" smtClean="0">
-                <a:solidFill>
-                  <a:schemeClr val="tx1"/>
-                </a:solidFill>
-                <a:latin typeface="+mn-lt"/>
-                <a:ea typeface="+mn-ea"/>
-                <a:cs typeface="+mn-cs"/>
-              </a:rPr>
-              <a:t>F-J offers facilities to partition a task into several subtasks, in a recursive-looking fashion; more tiers, possibility of 'inter-fork' communication at this stage, much more traditional programming. Does not extend (at least in the paper) beyond a single machine. Great for taking advantage of your eight-core.</a:t>
-            </a:r>
-          </a:p>
-          <a:p>
-            <a:endParaRPr lang="en-US" sz="1200" kern="1200" baseline="0" dirty="0" smtClean="0">
-              <a:solidFill>
-                <a:schemeClr val="tx1"/>
-              </a:solidFill>
-              <a:latin typeface="+mn-lt"/>
-              <a:ea typeface="+mn-ea"/>
-              <a:cs typeface="+mn-cs"/>
-            </a:endParaRPr>
-          </a:p>
-          <a:p>
-            <a:r>
-              <a:rPr lang="en-US" sz="1200" kern="1200" baseline="0" dirty="0" smtClean="0">
-                <a:solidFill>
-                  <a:schemeClr val="tx1"/>
-                </a:solidFill>
-                <a:latin typeface="+mn-lt"/>
-                <a:ea typeface="+mn-ea"/>
-                <a:cs typeface="+mn-cs"/>
-              </a:rPr>
-              <a:t>M-R only does one big split, with the mapped splits not talking between each other at all, and then reduces everything together. A single tier, no inter-split communication until reduce, and massively scalable. Great for taking advantage of your share of the cloud</a:t>
-            </a:r>
-            <a:r>
-              <a:rPr lang="en-US" sz="1200" kern="1200" baseline="0" dirty="0" smtClean="0">
-                <a:solidFill>
-                  <a:schemeClr val="tx1"/>
-                </a:solidFill>
-                <a:latin typeface="+mn-lt"/>
-                <a:ea typeface="+mn-ea"/>
-                <a:cs typeface="+mn-cs"/>
-              </a:rPr>
-              <a:t>.</a:t>
-            </a:r>
+            <a:endParaRPr lang="en-US" dirty="0"/>
           </a:p>
         </p:txBody>
       </p:sp>
@@ -2158,7 +2275,7 @@
             <a:fld id="{765C5218-4828-B544-9955-A4B6719EC9E2}" type="slidenum">
               <a:rPr lang="en-US" smtClean="0"/>
               <a:pPr/>
-              <a:t>16</a:t>
+              <a:t>15</a:t>
             </a:fld>
             <a:endParaRPr lang="en-US"/>
           </a:p>
@@ -5172,13 +5289,13 @@
           <a:p>
             <a:r>
               <a:rPr lang="en-US" dirty="0" smtClean="0">
-                <a:hlinkClick r:id="rId2"/>
+                <a:hlinkClick r:id="rId3"/>
               </a:rPr>
               <a:t>praful@</a:t>
             </a:r>
             <a:r>
               <a:rPr lang="en-US" dirty="0" smtClean="0">
-                <a:hlinkClick r:id="rId2"/>
+                <a:hlinkClick r:id="rId3"/>
               </a:rPr>
               <a:t>thoughtworks.com</a:t>
             </a:r>
@@ -6418,12 +6535,16 @@
         </p:nvPicPr>
         <p:blipFill>
           <a:blip r:embed="rId3"/>
-          <a:srcRect l="-42539" r="-42539"/>
           <a:stretch>
             <a:fillRect/>
           </a:stretch>
         </p:blipFill>
-        <p:spPr/>
+        <p:spPr>
+          <a:xfrm>
+            <a:off x="1386717" y="1600200"/>
+            <a:ext cx="6370565" cy="4525963"/>
+          </a:xfrm>
+        </p:spPr>
       </p:pic>
       <p:sp>
         <p:nvSpPr>
@@ -6433,8 +6554,8 @@
         </p:nvSpPr>
         <p:spPr>
           <a:xfrm>
-            <a:off x="5232121" y="6307080"/>
-            <a:ext cx="3911879" cy="261610"/>
+            <a:off x="1386717" y="6307080"/>
+            <a:ext cx="6208088" cy="261610"/>
           </a:xfrm>
           <a:prstGeom prst="rect">
             <a:avLst/>
@@ -6447,9 +6568,26 @@
           </a:bodyPr>
           <a:lstStyle/>
           <a:p>
-            <a:r>
-              <a:rPr lang="en-US" sz="1100" dirty="0" smtClean="0"/>
-              <a:t>http://www.orientalpersianrug.com/qum_persian_rugs.html</a:t>
+            <a:pPr algn="ctr"/>
+            <a:r>
+              <a:rPr lang="en-US" sz="1100" i="1" dirty="0" smtClean="0"/>
+              <a:t>Rug from Qom, Iran</a:t>
+            </a:r>
+            <a:r>
+              <a:rPr lang="en-US" sz="1100" i="1" dirty="0" smtClean="0"/>
+              <a:t> http</a:t>
+            </a:r>
+            <a:r>
+              <a:rPr lang="en-US" sz="1100" i="1" dirty="0" smtClean="0"/>
+              <a:t>://</a:t>
+            </a:r>
+            <a:r>
+              <a:rPr lang="en-US" sz="1100" i="1" dirty="0" err="1" smtClean="0"/>
+              <a:t>upload.wikimedia.org/wikipedia/commons/c/ca/Farsh_Qom.JPG</a:t>
+            </a:r>
+            <a:r>
+              <a:rPr lang="en-US" sz="1100" i="1" dirty="0" smtClean="0"/>
+              <a:t>)</a:t>
             </a:r>
             <a:endParaRPr lang="en-US" sz="1100" dirty="0"/>
           </a:p>

</xml_diff>